<commit_message>
Beginning presentation for exam
</commit_message>
<xml_diff>
--- a/syseng_hwco/proj/Artifact/Presentations/Presentation_exam.pptx
+++ b/syseng_hwco/proj/Artifact/Presentations/Presentation_exam.pptx
@@ -342,7 +342,7 @@
               <a:pPr>
                 <a:defRPr/>
               </a:pPr>
-              <a:t>04-03-2011</a:t>
+              <a:t>20-03-2011</a:t>
             </a:fld>
             <a:endParaRPr lang="da-DK"/>
           </a:p>
@@ -401,7 +401,7 @@
               <a:pPr>
                 <a:defRPr/>
               </a:pPr>
-              <a:t>‹#›</a:t>
+              <a:t>‹nr.›</a:t>
             </a:fld>
             <a:endParaRPr lang="da-DK"/>
           </a:p>
@@ -534,7 +534,7 @@
               <a:pPr>
                 <a:defRPr/>
               </a:pPr>
-              <a:t>04-03-2011</a:t>
+              <a:t>20-03-2011</a:t>
             </a:fld>
             <a:endParaRPr lang="da-DK"/>
           </a:p>
@@ -593,7 +593,7 @@
               <a:pPr>
                 <a:defRPr/>
               </a:pPr>
-              <a:t>‹#›</a:t>
+              <a:t>‹nr.›</a:t>
             </a:fld>
             <a:endParaRPr lang="da-DK"/>
           </a:p>
@@ -736,7 +736,7 @@
               <a:pPr>
                 <a:defRPr/>
               </a:pPr>
-              <a:t>04-03-2011</a:t>
+              <a:t>20-03-2011</a:t>
             </a:fld>
             <a:endParaRPr lang="da-DK"/>
           </a:p>
@@ -795,7 +795,7 @@
               <a:pPr>
                 <a:defRPr/>
               </a:pPr>
-              <a:t>‹#›</a:t>
+              <a:t>‹nr.›</a:t>
             </a:fld>
             <a:endParaRPr lang="da-DK"/>
           </a:p>
@@ -1052,7 +1052,7 @@
               <a:pPr>
                 <a:defRPr/>
               </a:pPr>
-              <a:t>04-03-2011</a:t>
+              <a:t>20-03-2011</a:t>
             </a:fld>
             <a:endParaRPr lang="da-DK"/>
           </a:p>
@@ -1111,7 +1111,7 @@
               <a:pPr>
                 <a:defRPr/>
               </a:pPr>
-              <a:t>‹#›</a:t>
+              <a:t>‹nr.›</a:t>
             </a:fld>
             <a:endParaRPr lang="da-DK"/>
           </a:p>
@@ -1311,7 +1311,7 @@
               <a:pPr>
                 <a:defRPr/>
               </a:pPr>
-              <a:t>04-03-2011</a:t>
+              <a:t>20-03-2011</a:t>
             </a:fld>
             <a:endParaRPr lang="da-DK"/>
           </a:p>
@@ -1370,7 +1370,7 @@
               <a:pPr>
                 <a:defRPr/>
               </a:pPr>
-              <a:t>‹#›</a:t>
+              <a:t>‹nr.›</a:t>
             </a:fld>
             <a:endParaRPr lang="da-DK"/>
           </a:p>
@@ -1485,7 +1485,7 @@
               <a:pPr>
                 <a:defRPr/>
               </a:pPr>
-              <a:t>04-03-2011</a:t>
+              <a:t>20-03-2011</a:t>
             </a:fld>
             <a:endParaRPr lang="da-DK"/>
           </a:p>
@@ -1544,7 +1544,7 @@
               <a:pPr>
                 <a:defRPr/>
               </a:pPr>
-              <a:t>‹#›</a:t>
+              <a:t>‹nr.›</a:t>
             </a:fld>
             <a:endParaRPr lang="da-DK"/>
           </a:p>
@@ -1677,7 +1677,7 @@
               <a:pPr>
                 <a:defRPr/>
               </a:pPr>
-              <a:t>04-03-2011</a:t>
+              <a:t>20-03-2011</a:t>
             </a:fld>
             <a:endParaRPr lang="da-DK"/>
           </a:p>
@@ -1736,7 +1736,7 @@
               <a:pPr>
                 <a:defRPr/>
               </a:pPr>
-              <a:t>‹#›</a:t>
+              <a:t>‹nr.›</a:t>
             </a:fld>
             <a:endParaRPr lang="da-DK"/>
           </a:p>
@@ -1945,7 +1945,7 @@
               <a:pPr>
                 <a:defRPr/>
               </a:pPr>
-              <a:t>04-03-2011</a:t>
+              <a:t>20-03-2011</a:t>
             </a:fld>
             <a:endParaRPr lang="da-DK"/>
           </a:p>
@@ -2004,7 +2004,7 @@
               <a:pPr>
                 <a:defRPr/>
               </a:pPr>
-              <a:t>‹#›</a:t>
+              <a:t>‹nr.›</a:t>
             </a:fld>
             <a:endParaRPr lang="da-DK"/>
           </a:p>
@@ -2255,7 +2255,7 @@
               <a:pPr>
                 <a:defRPr/>
               </a:pPr>
-              <a:t>04-03-2011</a:t>
+              <a:t>20-03-2011</a:t>
             </a:fld>
             <a:endParaRPr lang="da-DK"/>
           </a:p>
@@ -2314,7 +2314,7 @@
               <a:pPr>
                 <a:defRPr/>
               </a:pPr>
-              <a:t>‹#›</a:t>
+              <a:t>‹nr.›</a:t>
             </a:fld>
             <a:endParaRPr lang="da-DK"/>
           </a:p>
@@ -2699,7 +2699,7 @@
               <a:pPr>
                 <a:defRPr/>
               </a:pPr>
-              <a:t>04-03-2011</a:t>
+              <a:t>20-03-2011</a:t>
             </a:fld>
             <a:endParaRPr lang="da-DK"/>
           </a:p>
@@ -2758,7 +2758,7 @@
               <a:pPr>
                 <a:defRPr/>
               </a:pPr>
-              <a:t>‹#›</a:t>
+              <a:t>‹nr.›</a:t>
             </a:fld>
             <a:endParaRPr lang="da-DK"/>
           </a:p>
@@ -2839,7 +2839,7 @@
               <a:pPr>
                 <a:defRPr/>
               </a:pPr>
-              <a:t>04-03-2011</a:t>
+              <a:t>20-03-2011</a:t>
             </a:fld>
             <a:endParaRPr lang="da-DK"/>
           </a:p>
@@ -2898,7 +2898,7 @@
               <a:pPr>
                 <a:defRPr/>
               </a:pPr>
-              <a:t>‹#›</a:t>
+              <a:t>‹nr.›</a:t>
             </a:fld>
             <a:endParaRPr lang="da-DK"/>
           </a:p>
@@ -2956,7 +2956,7 @@
               <a:pPr>
                 <a:defRPr/>
               </a:pPr>
-              <a:t>04-03-2011</a:t>
+              <a:t>20-03-2011</a:t>
             </a:fld>
             <a:endParaRPr lang="da-DK"/>
           </a:p>
@@ -3015,7 +3015,7 @@
               <a:pPr>
                 <a:defRPr/>
               </a:pPr>
-              <a:t>‹#›</a:t>
+              <a:t>‹nr.›</a:t>
             </a:fld>
             <a:endParaRPr lang="da-DK"/>
           </a:p>
@@ -3255,7 +3255,7 @@
               <a:pPr>
                 <a:defRPr/>
               </a:pPr>
-              <a:t>04-03-2011</a:t>
+              <a:t>20-03-2011</a:t>
             </a:fld>
             <a:endParaRPr lang="da-DK"/>
           </a:p>
@@ -3314,7 +3314,7 @@
               <a:pPr>
                 <a:defRPr/>
               </a:pPr>
-              <a:t>‹#›</a:t>
+              <a:t>‹nr.›</a:t>
             </a:fld>
             <a:endParaRPr lang="da-DK"/>
           </a:p>
@@ -3533,7 +3533,7 @@
               <a:pPr>
                 <a:defRPr/>
               </a:pPr>
-              <a:t>04-03-2011</a:t>
+              <a:t>20-03-2011</a:t>
             </a:fld>
             <a:endParaRPr lang="da-DK"/>
           </a:p>
@@ -3592,7 +3592,7 @@
               <a:pPr>
                 <a:defRPr/>
               </a:pPr>
-              <a:t>‹#›</a:t>
+              <a:t>‹nr.›</a:t>
             </a:fld>
             <a:endParaRPr lang="da-DK"/>
           </a:p>
@@ -3788,7 +3788,7 @@
               <a:pPr>
                 <a:defRPr/>
               </a:pPr>
-              <a:t>04-03-2011</a:t>
+              <a:t>20-03-2011</a:t>
             </a:fld>
             <a:endParaRPr lang="da-DK"/>
           </a:p>
@@ -3889,7 +3889,7 @@
               <a:pPr>
                 <a:defRPr/>
               </a:pPr>
-              <a:t>‹#›</a:t>
+              <a:t>‹nr.›</a:t>
             </a:fld>
             <a:endParaRPr lang="da-DK"/>
           </a:p>
@@ -4431,7 +4431,7 @@
           <p:nvPr/>
         </p:nvPicPr>
         <p:blipFill>
-          <a:blip r:embed="rId2"/>
+          <a:blip r:embed="rId2" cstate="print"/>
           <a:srcRect/>
           <a:stretch>
             <a:fillRect/>
@@ -4696,7 +4696,7 @@
           <p:nvPr/>
         </p:nvPicPr>
         <p:blipFill>
-          <a:blip r:embed="rId2"/>
+          <a:blip r:embed="rId2" cstate="print"/>
           <a:srcRect l="533" t="22685" r="41597" b="9277"/>
           <a:stretch>
             <a:fillRect/>
@@ -4790,7 +4790,7 @@
           <p:nvPr/>
         </p:nvPicPr>
         <p:blipFill>
-          <a:blip r:embed="rId2"/>
+          <a:blip r:embed="rId2" cstate="print"/>
           <a:srcRect/>
           <a:stretch>
             <a:fillRect/>
@@ -4876,7 +4876,7 @@
           <p:nvPr/>
         </p:nvPicPr>
         <p:blipFill>
-          <a:blip r:embed="rId2"/>
+          <a:blip r:embed="rId2" cstate="print"/>
           <a:srcRect l="7350" t="2519" r="7603" b="9277"/>
           <a:stretch>
             <a:fillRect/>
@@ -4958,14 +4958,14 @@
         <p:nvPicPr>
           <p:cNvPr id="55299" name="Picture 3"/>
           <p:cNvPicPr>
-            <a:picLocks noChangeAspect="1" noChangeArrowheads="1"/>
+            <a:picLocks noGrp="1" noChangeAspect="1" noChangeArrowheads="1"/>
           </p:cNvPicPr>
           <p:nvPr>
             <p:ph type="body" idx="1"/>
           </p:nvPr>
         </p:nvPicPr>
         <p:blipFill>
-          <a:blip r:embed="rId2"/>
+          <a:blip r:embed="rId2" cstate="print"/>
           <a:srcRect/>
           <a:stretch>
             <a:fillRect/>
@@ -5021,9 +5021,10 @@
           <a:lstStyle/>
           <a:p>
             <a:r>
-              <a:rPr lang="da-DK" smtClean="0"/>
-              <a:t>Status (1)</a:t>
-            </a:r>
+              <a:rPr lang="da-DK" dirty="0" smtClean="0"/>
+              <a:t>Agenda</a:t>
+            </a:r>
+            <a:endParaRPr lang="da-DK" dirty="0" smtClean="0"/>
           </a:p>
         </p:txBody>
       </p:sp>
@@ -5043,37 +5044,70 @@
           <a:lstStyle/>
           <a:p>
             <a:r>
-              <a:rPr lang="da-DK" smtClean="0"/>
-              <a:t>Opfølgning fra sidste gang</a:t>
+              <a:rPr lang="da-DK" dirty="0" smtClean="0"/>
+              <a:t>Opgaven (Hvad skal vi lave?)</a:t>
+            </a:r>
+          </a:p>
+          <a:p>
+            <a:r>
+              <a:rPr lang="da-DK" dirty="0" smtClean="0"/>
+              <a:t>Målsætninger (Hvad ønsker vi at få ud af det?)</a:t>
+            </a:r>
+          </a:p>
+          <a:p>
+            <a:r>
+              <a:rPr lang="da-DK" dirty="0" smtClean="0"/>
+              <a:t>Projektet (Hvordan laver vi det?)</a:t>
             </a:r>
           </a:p>
           <a:p>
             <a:pPr lvl="1"/>
             <a:r>
-              <a:rPr lang="da-DK" smtClean="0"/>
-              <a:t>R(V)TM (done)</a:t>
+              <a:rPr lang="da-DK" dirty="0" smtClean="0"/>
+              <a:t>INCOSE</a:t>
             </a:r>
           </a:p>
           <a:p>
             <a:pPr lvl="1"/>
             <a:r>
-              <a:rPr lang="da-DK" smtClean="0"/>
-              <a:t>Risk management (mangler stadigvæk)</a:t>
-            </a:r>
+              <a:rPr lang="da-DK" dirty="0" err="1" smtClean="0"/>
+              <a:t>SysML</a:t>
+            </a:r>
+            <a:endParaRPr lang="da-DK" dirty="0" smtClean="0"/>
           </a:p>
           <a:p>
             <a:pPr lvl="1"/>
             <a:r>
-              <a:rPr lang="da-DK" smtClean="0"/>
-              <a:t>Arkitektur til krav mapping (mangler)</a:t>
-            </a:r>
-          </a:p>
-          <a:p>
-            <a:pPr lvl="1"/>
-            <a:r>
-              <a:rPr lang="da-DK" smtClean="0"/>
-              <a:t>Detaljerede tidsplan (mangler) </a:t>
-            </a:r>
+              <a:rPr lang="da-DK" dirty="0" err="1" smtClean="0"/>
+              <a:t>SystemC</a:t>
+            </a:r>
+            <a:endParaRPr lang="da-DK" dirty="0" smtClean="0"/>
+          </a:p>
+          <a:p>
+            <a:r>
+              <a:rPr lang="da-DK" dirty="0" smtClean="0"/>
+              <a:t>Konklusion (Hvad har vi lært/fået ud af det?)</a:t>
+            </a:r>
+          </a:p>
+          <a:p>
+            <a:r>
+              <a:rPr lang="da-DK" dirty="0" err="1" smtClean="0"/>
+              <a:t>Læringsmål</a:t>
+            </a:r>
+            <a:r>
+              <a:rPr lang="da-DK" dirty="0" smtClean="0"/>
+              <a:t> (Har vi lært det vi burde?)</a:t>
+            </a:r>
+            <a:endParaRPr lang="da-DK" dirty="0" smtClean="0"/>
+          </a:p>
+          <a:p>
+            <a:endParaRPr lang="da-DK" dirty="0" smtClean="0"/>
+          </a:p>
+          <a:p>
+            <a:endParaRPr lang="da-DK" dirty="0" smtClean="0"/>
+          </a:p>
+          <a:p>
+            <a:endParaRPr lang="da-DK" dirty="0" smtClean="0"/>
           </a:p>
         </p:txBody>
       </p:sp>
@@ -5125,9 +5159,10 @@
           <a:lstStyle/>
           <a:p>
             <a:r>
-              <a:rPr lang="da-DK" smtClean="0"/>
-              <a:t>Status(2)</a:t>
-            </a:r>
+              <a:rPr lang="da-DK" dirty="0" smtClean="0"/>
+              <a:t>Opgaven</a:t>
+            </a:r>
+            <a:endParaRPr lang="da-DK" dirty="0" smtClean="0"/>
           </a:p>
         </p:txBody>
       </p:sp>
@@ -5147,69 +5182,19 @@
           <a:lstStyle/>
           <a:p>
             <a:r>
-              <a:rPr lang="da-DK" smtClean="0"/>
-              <a:t>SysML Arkitektur</a:t>
-            </a:r>
-          </a:p>
-          <a:p>
-            <a:pPr lvl="1"/>
-            <a:r>
-              <a:rPr lang="da-DK" smtClean="0"/>
-              <a:t>Kvalitet attributter</a:t>
-            </a:r>
-          </a:p>
-          <a:p>
-            <a:r>
-              <a:rPr lang="da-DK" smtClean="0"/>
-              <a:t>SysML </a:t>
-            </a:r>
-            <a:r>
-              <a:rPr lang="da-DK" smtClean="0">
-                <a:sym typeface="Wingdings" pitchFamily="2" charset="2"/>
-              </a:rPr>
-              <a:t></a:t>
-            </a:r>
-            <a:r>
-              <a:rPr lang="da-DK" smtClean="0"/>
-              <a:t> SystemC</a:t>
-            </a:r>
-          </a:p>
-          <a:p>
-            <a:pPr lvl="1"/>
-            <a:r>
-              <a:rPr lang="da-DK" smtClean="0"/>
-              <a:t>Manuelt transformation</a:t>
-            </a:r>
-          </a:p>
-          <a:p>
-            <a:pPr lvl="1"/>
-            <a:r>
-              <a:rPr lang="da-DK" smtClean="0"/>
-              <a:t>Automatisk transformation</a:t>
-            </a:r>
-          </a:p>
-          <a:p>
-            <a:r>
-              <a:rPr lang="da-DK" smtClean="0"/>
-              <a:t>SystemC</a:t>
-            </a:r>
-          </a:p>
-          <a:p>
-            <a:pPr lvl="1"/>
-            <a:r>
-              <a:rPr lang="da-DK" smtClean="0"/>
-              <a:t>Design</a:t>
-            </a:r>
-          </a:p>
-          <a:p>
-            <a:pPr lvl="1"/>
-            <a:r>
-              <a:rPr lang="da-DK" smtClean="0"/>
-              <a:t>Implementation</a:t>
-            </a:r>
-          </a:p>
-          <a:p>
-            <a:endParaRPr lang="da-DK" smtClean="0"/>
+              <a:rPr lang="da-DK" dirty="0" err="1" smtClean="0"/>
+              <a:t>SysML</a:t>
+            </a:r>
+            <a:r>
+              <a:rPr lang="da-DK" dirty="0" smtClean="0"/>
+              <a:t> Arkitektur</a:t>
+            </a:r>
+          </a:p>
+          <a:p>
+            <a:pPr>
+              <a:buNone/>
+            </a:pPr>
+            <a:endParaRPr lang="da-DK" dirty="0" smtClean="0"/>
           </a:p>
         </p:txBody>
       </p:sp>
@@ -5271,14 +5256,14 @@
         <p:nvPicPr>
           <p:cNvPr id="44036" name="Picture 4"/>
           <p:cNvPicPr>
-            <a:picLocks noChangeAspect="1" noChangeArrowheads="1"/>
+            <a:picLocks noGrp="1" noChangeAspect="1" noChangeArrowheads="1"/>
           </p:cNvPicPr>
           <p:nvPr>
             <p:ph type="body" idx="1"/>
           </p:nvPr>
         </p:nvPicPr>
         <p:blipFill>
-          <a:blip r:embed="rId2"/>
+          <a:blip r:embed="rId2" cstate="print"/>
           <a:srcRect l="1871" t="16556" r="6250" b="17619"/>
           <a:stretch>
             <a:fillRect/>
@@ -5349,14 +5334,14 @@
         <p:nvPicPr>
           <p:cNvPr id="43011" name="Picture 3"/>
           <p:cNvPicPr>
-            <a:picLocks noChangeAspect="1" noChangeArrowheads="1"/>
+            <a:picLocks noGrp="1" noChangeAspect="1" noChangeArrowheads="1"/>
           </p:cNvPicPr>
           <p:nvPr>
             <p:ph type="body" idx="1"/>
           </p:nvPr>
         </p:nvPicPr>
         <p:blipFill>
-          <a:blip r:embed="rId2"/>
+          <a:blip r:embed="rId2" cstate="print"/>
           <a:srcRect l="1871" t="29253" r="4495" b="30972"/>
           <a:stretch>
             <a:fillRect/>

</xml_diff>

<commit_message>
Finishing draft 1 for exam presentation
</commit_message>
<xml_diff>
--- a/syseng_hwco/proj/Artifact/Presentations/Presentation_exam.pptx
+++ b/syseng_hwco/proj/Artifact/Presentations/Presentation_exam.pptx
@@ -12,18 +12,18 @@
     <p:sldId id="288" r:id="rId6"/>
     <p:sldId id="289" r:id="rId7"/>
     <p:sldId id="291" r:id="rId8"/>
-    <p:sldId id="277" r:id="rId9"/>
+    <p:sldId id="292" r:id="rId9"/>
     <p:sldId id="276" r:id="rId10"/>
-    <p:sldId id="279" r:id="rId11"/>
-    <p:sldId id="280" r:id="rId12"/>
+    <p:sldId id="294" r:id="rId11"/>
+    <p:sldId id="279" r:id="rId12"/>
     <p:sldId id="281" r:id="rId13"/>
-    <p:sldId id="284" r:id="rId14"/>
-    <p:sldId id="283" r:id="rId15"/>
-    <p:sldId id="287" r:id="rId16"/>
-    <p:sldId id="282" r:id="rId17"/>
-    <p:sldId id="278" r:id="rId18"/>
-    <p:sldId id="285" r:id="rId19"/>
-    <p:sldId id="286" r:id="rId20"/>
+    <p:sldId id="282" r:id="rId14"/>
+    <p:sldId id="293" r:id="rId15"/>
+    <p:sldId id="295" r:id="rId16"/>
+    <p:sldId id="285" r:id="rId17"/>
+    <p:sldId id="286" r:id="rId18"/>
+    <p:sldId id="296" r:id="rId19"/>
+    <p:sldId id="297" r:id="rId20"/>
   </p:sldIdLst>
   <p:sldSz cx="9144000" cy="6858000" type="screen4x3"/>
   <p:notesSz cx="6858000" cy="9144000"/>
@@ -153,6 +153,215 @@
     </a:lvl9pPr>
   </p:defaultTextStyle>
 </p:presentation>
+</file>
+
+<file path=ppt/charts/chart1.xml><?xml version="1.0" encoding="utf-8"?>
+<c:chartSpace xmlns:c="http://schemas.openxmlformats.org/drawingml/2006/chart" xmlns:a="http://schemas.openxmlformats.org/drawingml/2006/main" xmlns:r="http://schemas.openxmlformats.org/officeDocument/2006/relationships">
+  <c:date1904 val="1"/>
+  <c:lang val="da-DK"/>
+  <c:chart>
+    <c:autoTitleDeleted val="1"/>
+    <c:plotArea>
+      <c:layout/>
+      <c:scatterChart>
+        <c:scatterStyle val="lineMarker"/>
+        <c:ser>
+          <c:idx val="0"/>
+          <c:order val="0"/>
+          <c:tx>
+            <c:v>CC430</c:v>
+          </c:tx>
+          <c:spPr>
+            <a:ln w="28575">
+              <a:noFill/>
+            </a:ln>
+          </c:spPr>
+          <c:xVal>
+            <c:numRef>
+              <c:f>'Ark1'!$F$5</c:f>
+              <c:numCache>
+                <c:formatCode>General</c:formatCode>
+                <c:ptCount val="1"/>
+                <c:pt idx="0">
+                  <c:v>0.15160000000000001</c:v>
+                </c:pt>
+              </c:numCache>
+            </c:numRef>
+          </c:xVal>
+          <c:yVal>
+            <c:numRef>
+              <c:f>'Ark1'!$G$5</c:f>
+              <c:numCache>
+                <c:formatCode>General</c:formatCode>
+                <c:ptCount val="1"/>
+                <c:pt idx="0">
+                  <c:v>18.149999999999999</c:v>
+                </c:pt>
+              </c:numCache>
+            </c:numRef>
+          </c:yVal>
+        </c:ser>
+        <c:ser>
+          <c:idx val="1"/>
+          <c:order val="1"/>
+          <c:tx>
+            <c:v>TMS320VC5401</c:v>
+          </c:tx>
+          <c:spPr>
+            <a:ln w="28575">
+              <a:noFill/>
+            </a:ln>
+          </c:spPr>
+          <c:xVal>
+            <c:numRef>
+              <c:f>'Ark1'!$F$6</c:f>
+              <c:numCache>
+                <c:formatCode>General</c:formatCode>
+                <c:ptCount val="1"/>
+                <c:pt idx="0">
+                  <c:v>5.2640000000000013E-2</c:v>
+                </c:pt>
+              </c:numCache>
+            </c:numRef>
+          </c:xVal>
+          <c:yVal>
+            <c:numRef>
+              <c:f>'Ark1'!$G$6</c:f>
+              <c:numCache>
+                <c:formatCode>General</c:formatCode>
+                <c:ptCount val="1"/>
+                <c:pt idx="0">
+                  <c:v>23.57</c:v>
+                </c:pt>
+              </c:numCache>
+            </c:numRef>
+          </c:yVal>
+        </c:ser>
+        <c:ser>
+          <c:idx val="2"/>
+          <c:order val="2"/>
+          <c:tx>
+            <c:v>PIC16F1516</c:v>
+          </c:tx>
+          <c:spPr>
+            <a:ln w="28575">
+              <a:noFill/>
+            </a:ln>
+          </c:spPr>
+          <c:xVal>
+            <c:numRef>
+              <c:f>'Ark1'!$F$7</c:f>
+              <c:numCache>
+                <c:formatCode>General</c:formatCode>
+                <c:ptCount val="1"/>
+                <c:pt idx="0">
+                  <c:v>0.60640000000000005</c:v>
+                </c:pt>
+              </c:numCache>
+            </c:numRef>
+          </c:xVal>
+          <c:yVal>
+            <c:numRef>
+              <c:f>'Ark1'!$G$7</c:f>
+              <c:numCache>
+                <c:formatCode>General</c:formatCode>
+                <c:ptCount val="1"/>
+                <c:pt idx="0">
+                  <c:v>10.97</c:v>
+                </c:pt>
+              </c:numCache>
+            </c:numRef>
+          </c:yVal>
+        </c:ser>
+        <c:axId val="102235520"/>
+        <c:axId val="120264192"/>
+      </c:scatterChart>
+      <c:valAx>
+        <c:axId val="102235520"/>
+        <c:scaling>
+          <c:orientation val="minMax"/>
+        </c:scaling>
+        <c:axPos val="b"/>
+        <c:title>
+          <c:tx>
+            <c:rich>
+              <a:bodyPr/>
+              <a:lstStyle/>
+              <a:p>
+                <a:pPr>
+                  <a:defRPr/>
+                </a:pPr>
+                <a:r>
+                  <a:rPr lang="da-DK"/>
+                  <a:t>Execution time</a:t>
+                </a:r>
+              </a:p>
+            </c:rich>
+          </c:tx>
+          <c:layout/>
+        </c:title>
+        <c:numFmt formatCode="General" sourceLinked="1"/>
+        <c:majorTickMark val="none"/>
+        <c:tickLblPos val="nextTo"/>
+        <c:crossAx val="120264192"/>
+        <c:crosses val="autoZero"/>
+        <c:crossBetween val="midCat"/>
+      </c:valAx>
+      <c:valAx>
+        <c:axId val="120264192"/>
+        <c:scaling>
+          <c:orientation val="minMax"/>
+        </c:scaling>
+        <c:axPos val="l"/>
+        <c:majorGridlines/>
+        <c:title>
+          <c:tx>
+            <c:rich>
+              <a:bodyPr/>
+              <a:lstStyle/>
+              <a:p>
+                <a:pPr>
+                  <a:defRPr/>
+                </a:pPr>
+                <a:r>
+                  <a:rPr lang="da-DK"/>
+                  <a:t>Cost</a:t>
+                </a:r>
+              </a:p>
+            </c:rich>
+          </c:tx>
+          <c:layout/>
+        </c:title>
+        <c:numFmt formatCode="General" sourceLinked="1"/>
+        <c:majorTickMark val="none"/>
+        <c:tickLblPos val="nextTo"/>
+        <c:crossAx val="102235520"/>
+        <c:crosses val="autoZero"/>
+        <c:crossBetween val="midCat"/>
+      </c:valAx>
+      <c:spPr>
+        <a:effectLst>
+          <a:outerShdw blurRad="50800" dist="38100" dir="2700000" algn="tl" rotWithShape="0">
+            <a:prstClr val="black">
+              <a:alpha val="28000"/>
+            </a:prstClr>
+          </a:outerShdw>
+        </a:effectLst>
+      </c:spPr>
+    </c:plotArea>
+    <c:legend>
+      <c:legendPos val="r"/>
+      <c:layout/>
+    </c:legend>
+    <c:plotVisOnly val="1"/>
+  </c:chart>
+  <c:spPr>
+    <a:ln>
+      <a:noFill/>
+    </a:ln>
+  </c:spPr>
+  <c:externalData r:id="rId1"/>
+</c:chartSpace>
 </file>
 
 <file path=ppt/slideLayouts/slideLayout1.xml><?xml version="1.0" encoding="utf-8"?>
@@ -4406,7 +4615,7 @@
       </p:grpSpPr>
       <p:sp>
         <p:nvSpPr>
-          <p:cNvPr id="47106" name="Rectangle 2"/>
+          <p:cNvPr id="2" name="Titel 1"/>
           <p:cNvSpPr>
             <a:spLocks noGrp="1"/>
           </p:cNvSpPr>
@@ -4420,24 +4629,34 @@
           <a:lstStyle/>
           <a:p>
             <a:r>
-              <a:rPr lang="da-DK" smtClean="0"/>
-              <a:t>SysML</a:t>
-            </a:r>
-          </a:p>
-        </p:txBody>
-      </p:sp>
-      <p:sp>
-        <p:nvSpPr>
-          <p:cNvPr id="47109" name="Rectangle 5"/>
-          <p:cNvSpPr>
-            <a:spLocks noChangeArrowheads="1"/>
-          </p:cNvSpPr>
-          <p:nvPr/>
-        </p:nvSpPr>
+              <a:rPr lang="da-DK" dirty="0" smtClean="0"/>
+              <a:t>Risiko analyse</a:t>
+            </a:r>
+            <a:endParaRPr lang="da-DK" dirty="0"/>
+          </a:p>
+        </p:txBody>
+      </p:sp>
+      <p:pic>
+        <p:nvPicPr>
+          <p:cNvPr id="4" name="Pladsholder til indhold 3"/>
+          <p:cNvPicPr>
+            <a:picLocks noGrp="1"/>
+          </p:cNvPicPr>
+          <p:nvPr>
+            <p:ph idx="1"/>
+          </p:nvPr>
+        </p:nvPicPr>
+        <p:blipFill>
+          <a:blip r:embed="rId2" cstate="print"/>
+          <a:srcRect l="920"/>
+          <a:stretch>
+            <a:fillRect/>
+          </a:stretch>
+        </p:blipFill>
         <p:spPr bwMode="auto">
           <a:xfrm>
-            <a:off x="0" y="0"/>
-            <a:ext cx="9144000" cy="0"/>
+            <a:off x="1043608" y="1772816"/>
+            <a:ext cx="7200800" cy="4320480"/>
           </a:xfrm>
           <a:prstGeom prst="rect">
             <a:avLst/>
@@ -4449,50 +4668,13 @@
             <a:headEnd/>
             <a:tailEnd/>
           </a:ln>
-          <a:effectLst/>
         </p:spPr>
-        <p:txBody>
-          <a:bodyPr wrap="none" anchor="ctr">
-            <a:spAutoFit/>
-          </a:bodyPr>
-          <a:lstStyle/>
-          <a:p>
-            <a:endParaRPr lang="da-DK"/>
-          </a:p>
-        </p:txBody>
-      </p:sp>
-      <p:graphicFrame>
-        <p:nvGraphicFramePr>
-          <p:cNvPr id="47108" name="Object 4"/>
-          <p:cNvGraphicFramePr>
-            <a:graphicFrameLocks noChangeAspect="1"/>
-          </p:cNvGraphicFramePr>
-          <p:nvPr/>
-        </p:nvGraphicFramePr>
-        <p:xfrm>
-          <a:off x="1476375" y="1341438"/>
-          <a:ext cx="6096000" cy="4848225"/>
-        </p:xfrm>
-        <a:graphic>
-          <a:graphicData uri="http://schemas.openxmlformats.org/presentationml/2006/ole">
-            <p:oleObj spid="_x0000_s47108" name="Visio" r:id="rId3" imgW="6154522" imgH="4894783" progId="Visio.Drawing.11">
-              <p:embed/>
-            </p:oleObj>
-          </a:graphicData>
-        </a:graphic>
-      </p:graphicFrame>
+      </p:pic>
     </p:spTree>
   </p:cSld>
   <p:clrMapOvr>
     <a:masterClrMapping/>
   </p:clrMapOvr>
-  <p:timing>
-    <p:tnLst>
-      <p:par>
-        <p:cTn id="1" dur="indefinite" restart="never" nodeType="tmRoot"/>
-      </p:par>
-    </p:tnLst>
-  </p:timing>
 </p:sld>
 </file>
 
@@ -4515,7 +4697,7 @@
       </p:grpSpPr>
       <p:sp>
         <p:nvSpPr>
-          <p:cNvPr id="48130" name="Rectangle 2"/>
+          <p:cNvPr id="47106" name="Rectangle 2"/>
           <p:cNvSpPr>
             <a:spLocks noGrp="1"/>
           </p:cNvSpPr>
@@ -4528,7 +4710,6 @@
           <a:bodyPr/>
           <a:lstStyle/>
           <a:p>
-            <a:pPr algn="l"/>
             <a:r>
               <a:rPr lang="da-DK" smtClean="0"/>
               <a:t>SysML</a:t>
@@ -4538,7 +4719,7 @@
       </p:sp>
       <p:sp>
         <p:nvSpPr>
-          <p:cNvPr id="48133" name="Rectangle 5"/>
+          <p:cNvPr id="47109" name="Rectangle 5"/>
           <p:cNvSpPr>
             <a:spLocks noChangeArrowheads="1"/>
           </p:cNvSpPr>
@@ -4546,7 +4727,7 @@
         </p:nvSpPr>
         <p:spPr bwMode="auto">
           <a:xfrm>
-            <a:off x="0" y="-161925"/>
+            <a:off x="0" y="0"/>
             <a:ext cx="9144000" cy="0"/>
           </a:xfrm>
           <a:prstGeom prst="rect">
@@ -4573,21 +4754,19 @@
       </p:sp>
       <p:graphicFrame>
         <p:nvGraphicFramePr>
-          <p:cNvPr id="48134" name="Object 6"/>
+          <p:cNvPr id="47108" name="Object 4"/>
           <p:cNvGraphicFramePr>
             <a:graphicFrameLocks noChangeAspect="1"/>
           </p:cNvGraphicFramePr>
-          <p:nvPr>
-            <p:ph idx="1"/>
-          </p:nvPr>
+          <p:nvPr/>
         </p:nvGraphicFramePr>
         <p:xfrm>
-          <a:off x="2660650" y="260350"/>
-          <a:ext cx="5353050" cy="6337300"/>
+          <a:off x="1476375" y="1341438"/>
+          <a:ext cx="6096000" cy="4848225"/>
         </p:xfrm>
         <a:graphic>
           <a:graphicData uri="http://schemas.openxmlformats.org/presentationml/2006/ole">
-            <p:oleObj spid="_x0000_s48134" name="Visio" r:id="rId3" imgW="6190793" imgH="7328916" progId="Visio.Drawing.11">
+            <p:oleObj spid="_x0000_s47108" name="Visio" r:id="rId3" imgW="6154522" imgH="4894783" progId="Visio.Drawing.11">
               <p:embed/>
             </p:oleObj>
           </a:graphicData>
@@ -4737,373 +4916,6 @@
       </p:grpSpPr>
       <p:sp>
         <p:nvSpPr>
-          <p:cNvPr id="53250" name="Rectangle 2"/>
-          <p:cNvSpPr>
-            <a:spLocks noGrp="1"/>
-          </p:cNvSpPr>
-          <p:nvPr>
-            <p:ph type="title"/>
-          </p:nvPr>
-        </p:nvSpPr>
-        <p:spPr/>
-        <p:txBody>
-          <a:bodyPr/>
-          <a:lstStyle/>
-          <a:p>
-            <a:r>
-              <a:rPr lang="da-DK" smtClean="0"/>
-              <a:t>SysML</a:t>
-            </a:r>
-          </a:p>
-        </p:txBody>
-      </p:sp>
-      <p:sp>
-        <p:nvSpPr>
-          <p:cNvPr id="53253" name="Rectangle 5"/>
-          <p:cNvSpPr>
-            <a:spLocks noChangeArrowheads="1"/>
-          </p:cNvSpPr>
-          <p:nvPr/>
-        </p:nvSpPr>
-        <p:spPr bwMode="auto">
-          <a:xfrm>
-            <a:off x="0" y="1838325"/>
-            <a:ext cx="9144000" cy="0"/>
-          </a:xfrm>
-          <a:prstGeom prst="rect">
-            <a:avLst/>
-          </a:prstGeom>
-          <a:noFill/>
-          <a:ln w="9525">
-            <a:noFill/>
-            <a:miter lim="800000"/>
-            <a:headEnd/>
-            <a:tailEnd/>
-          </a:ln>
-          <a:effectLst/>
-        </p:spPr>
-        <p:txBody>
-          <a:bodyPr wrap="none" anchor="ctr">
-            <a:spAutoFit/>
-          </a:bodyPr>
-          <a:lstStyle/>
-          <a:p>
-            <a:endParaRPr lang="da-DK"/>
-          </a:p>
-        </p:txBody>
-      </p:sp>
-      <p:graphicFrame>
-        <p:nvGraphicFramePr>
-          <p:cNvPr id="53252" name="Object 4"/>
-          <p:cNvGraphicFramePr>
-            <a:graphicFrameLocks noChangeAspect="1"/>
-          </p:cNvGraphicFramePr>
-          <p:nvPr/>
-        </p:nvGraphicFramePr>
-        <p:xfrm>
-          <a:off x="179388" y="1412875"/>
-          <a:ext cx="8496300" cy="4454525"/>
-        </p:xfrm>
-        <a:graphic>
-          <a:graphicData uri="http://schemas.openxmlformats.org/presentationml/2006/ole">
-            <p:oleObj spid="_x0000_s53252" name="Visio" r:id="rId3" imgW="8314639" imgH="4354678" progId="Visio.Drawing.11">
-              <p:embed/>
-            </p:oleObj>
-          </a:graphicData>
-        </a:graphic>
-      </p:graphicFrame>
-    </p:spTree>
-  </p:cSld>
-  <p:clrMapOvr>
-    <a:masterClrMapping/>
-  </p:clrMapOvr>
-  <p:timing>
-    <p:tnLst>
-      <p:par>
-        <p:cTn id="1" dur="indefinite" restart="never" nodeType="tmRoot"/>
-      </p:par>
-    </p:tnLst>
-  </p:timing>
-</p:sld>
-</file>
-
-<file path=ppt/slides/slide14.xml><?xml version="1.0" encoding="utf-8"?>
-<p:sld xmlns:a="http://schemas.openxmlformats.org/drawingml/2006/main" xmlns:r="http://schemas.openxmlformats.org/officeDocument/2006/relationships" xmlns:p="http://schemas.openxmlformats.org/presentationml/2006/main">
-  <p:cSld>
-    <p:spTree>
-      <p:nvGrpSpPr>
-        <p:cNvPr id="1" name=""/>
-        <p:cNvGrpSpPr/>
-        <p:nvPr/>
-      </p:nvGrpSpPr>
-      <p:grpSpPr>
-        <a:xfrm>
-          <a:off x="0" y="0"/>
-          <a:ext cx="0" cy="0"/>
-          <a:chOff x="0" y="0"/>
-          <a:chExt cx="0" cy="0"/>
-        </a:xfrm>
-      </p:grpSpPr>
-      <p:sp>
-        <p:nvSpPr>
-          <p:cNvPr id="52226" name="Rectangle 2"/>
-          <p:cNvSpPr>
-            <a:spLocks noGrp="1"/>
-          </p:cNvSpPr>
-          <p:nvPr>
-            <p:ph type="title"/>
-          </p:nvPr>
-        </p:nvSpPr>
-        <p:spPr/>
-        <p:txBody>
-          <a:bodyPr/>
-          <a:lstStyle/>
-          <a:p>
-            <a:r>
-              <a:rPr lang="da-DK" smtClean="0"/>
-              <a:t>SysML</a:t>
-            </a:r>
-          </a:p>
-        </p:txBody>
-      </p:sp>
-      <p:pic>
-        <p:nvPicPr>
-          <p:cNvPr id="52228" name="Picture 4"/>
-          <p:cNvPicPr>
-            <a:picLocks noChangeAspect="1" noChangeArrowheads="1"/>
-          </p:cNvPicPr>
-          <p:nvPr/>
-        </p:nvPicPr>
-        <p:blipFill>
-          <a:blip r:embed="rId2" cstate="print"/>
-          <a:srcRect/>
-          <a:stretch>
-            <a:fillRect/>
-          </a:stretch>
-        </p:blipFill>
-        <p:spPr bwMode="auto">
-          <a:xfrm>
-            <a:off x="755650" y="1557338"/>
-            <a:ext cx="8064500" cy="3575050"/>
-          </a:xfrm>
-          <a:prstGeom prst="rect">
-            <a:avLst/>
-          </a:prstGeom>
-          <a:noFill/>
-          <a:ln w="9525">
-            <a:noFill/>
-            <a:miter lim="800000"/>
-            <a:headEnd/>
-            <a:tailEnd/>
-          </a:ln>
-        </p:spPr>
-      </p:pic>
-    </p:spTree>
-  </p:cSld>
-  <p:clrMapOvr>
-    <a:masterClrMapping/>
-  </p:clrMapOvr>
-  <p:timing>
-    <p:tnLst>
-      <p:par>
-        <p:cTn id="1" dur="indefinite" restart="never" nodeType="tmRoot"/>
-      </p:par>
-    </p:tnLst>
-  </p:timing>
-</p:sld>
-</file>
-
-<file path=ppt/slides/slide15.xml><?xml version="1.0" encoding="utf-8"?>
-<p:sld xmlns:a="http://schemas.openxmlformats.org/drawingml/2006/main" xmlns:r="http://schemas.openxmlformats.org/officeDocument/2006/relationships" xmlns:p="http://schemas.openxmlformats.org/presentationml/2006/main">
-  <p:cSld>
-    <p:spTree>
-      <p:nvGrpSpPr>
-        <p:cNvPr id="1" name=""/>
-        <p:cNvGrpSpPr/>
-        <p:nvPr/>
-      </p:nvGrpSpPr>
-      <p:grpSpPr>
-        <a:xfrm>
-          <a:off x="0" y="0"/>
-          <a:ext cx="0" cy="0"/>
-          <a:chOff x="0" y="0"/>
-          <a:chExt cx="0" cy="0"/>
-        </a:xfrm>
-      </p:grpSpPr>
-      <p:sp>
-        <p:nvSpPr>
-          <p:cNvPr id="57346" name="Rectangle 2"/>
-          <p:cNvSpPr>
-            <a:spLocks noGrp="1"/>
-          </p:cNvSpPr>
-          <p:nvPr>
-            <p:ph type="title"/>
-          </p:nvPr>
-        </p:nvSpPr>
-        <p:spPr/>
-        <p:txBody>
-          <a:bodyPr/>
-          <a:lstStyle/>
-          <a:p>
-            <a:r>
-              <a:rPr lang="da-DK" smtClean="0"/>
-              <a:t>SysML</a:t>
-            </a:r>
-          </a:p>
-        </p:txBody>
-      </p:sp>
-      <p:sp>
-        <p:nvSpPr>
-          <p:cNvPr id="57349" name="Rectangle 5"/>
-          <p:cNvSpPr>
-            <a:spLocks noChangeArrowheads="1"/>
-          </p:cNvSpPr>
-          <p:nvPr/>
-        </p:nvSpPr>
-        <p:spPr bwMode="auto">
-          <a:xfrm>
-            <a:off x="0" y="1466850"/>
-            <a:ext cx="9144000" cy="0"/>
-          </a:xfrm>
-          <a:prstGeom prst="rect">
-            <a:avLst/>
-          </a:prstGeom>
-          <a:noFill/>
-          <a:ln w="9525">
-            <a:noFill/>
-            <a:miter lim="800000"/>
-            <a:headEnd/>
-            <a:tailEnd/>
-          </a:ln>
-          <a:effectLst/>
-        </p:spPr>
-        <p:txBody>
-          <a:bodyPr wrap="none" anchor="ctr">
-            <a:spAutoFit/>
-          </a:bodyPr>
-          <a:lstStyle/>
-          <a:p>
-            <a:endParaRPr lang="da-DK"/>
-          </a:p>
-        </p:txBody>
-      </p:sp>
-      <p:graphicFrame>
-        <p:nvGraphicFramePr>
-          <p:cNvPr id="57348" name="Object 4"/>
-          <p:cNvGraphicFramePr>
-            <a:graphicFrameLocks noChangeAspect="1"/>
-          </p:cNvGraphicFramePr>
-          <p:nvPr/>
-        </p:nvGraphicFramePr>
-        <p:xfrm>
-          <a:off x="2700338" y="1125538"/>
-          <a:ext cx="5976937" cy="3959225"/>
-        </p:xfrm>
-        <a:graphic>
-          <a:graphicData uri="http://schemas.openxmlformats.org/presentationml/2006/ole">
-            <p:oleObj spid="_x0000_s57348" name="Visio" r:id="rId3" imgW="5074615" imgH="3922776" progId="Visio.Drawing.11">
-              <p:embed/>
-            </p:oleObj>
-          </a:graphicData>
-        </a:graphic>
-      </p:graphicFrame>
-      <p:sp>
-        <p:nvSpPr>
-          <p:cNvPr id="57351" name="Text Box 7"/>
-          <p:cNvSpPr txBox="1">
-            <a:spLocks noChangeArrowheads="1"/>
-          </p:cNvSpPr>
-          <p:nvPr/>
-        </p:nvSpPr>
-        <p:spPr bwMode="auto">
-          <a:xfrm>
-            <a:off x="323850" y="4797425"/>
-            <a:ext cx="4176713" cy="915988"/>
-          </a:xfrm>
-          <a:prstGeom prst="rect">
-            <a:avLst/>
-          </a:prstGeom>
-          <a:noFill/>
-          <a:ln w="9525">
-            <a:noFill/>
-            <a:miter lim="800000"/>
-            <a:headEnd/>
-            <a:tailEnd/>
-          </a:ln>
-          <a:effectLst/>
-        </p:spPr>
-        <p:txBody>
-          <a:bodyPr>
-            <a:spAutoFit/>
-          </a:bodyPr>
-          <a:lstStyle/>
-          <a:p>
-            <a:pPr marL="342900" indent="-342900">
-              <a:buFontTx/>
-              <a:buChar char="•"/>
-            </a:pPr>
-            <a:r>
-              <a:rPr lang="en-GB"/>
-              <a:t>Single data stream</a:t>
-            </a:r>
-          </a:p>
-          <a:p>
-            <a:pPr marL="342900" indent="-342900">
-              <a:buFontTx/>
-              <a:buChar char="•"/>
-            </a:pPr>
-            <a:r>
-              <a:rPr lang="en-GB"/>
-              <a:t>Multiple ports (data streams)</a:t>
-            </a:r>
-          </a:p>
-          <a:p>
-            <a:pPr marL="342900" indent="-342900">
-              <a:buFontTx/>
-              <a:buChar char="•"/>
-            </a:pPr>
-            <a:r>
-              <a:rPr lang="en-GB"/>
-              <a:t>Multiple protocols.</a:t>
-            </a:r>
-            <a:endParaRPr lang="da-DK"/>
-          </a:p>
-        </p:txBody>
-      </p:sp>
-    </p:spTree>
-  </p:cSld>
-  <p:clrMapOvr>
-    <a:masterClrMapping/>
-  </p:clrMapOvr>
-  <p:timing>
-    <p:tnLst>
-      <p:par>
-        <p:cTn id="1" dur="indefinite" restart="never" nodeType="tmRoot"/>
-      </p:par>
-    </p:tnLst>
-  </p:timing>
-</p:sld>
-</file>
-
-<file path=ppt/slides/slide16.xml><?xml version="1.0" encoding="utf-8"?>
-<p:sld xmlns:a="http://schemas.openxmlformats.org/drawingml/2006/main" xmlns:r="http://schemas.openxmlformats.org/officeDocument/2006/relationships" xmlns:p="http://schemas.openxmlformats.org/presentationml/2006/main">
-  <p:cSld>
-    <p:spTree>
-      <p:nvGrpSpPr>
-        <p:cNvPr id="1" name=""/>
-        <p:cNvGrpSpPr/>
-        <p:nvPr/>
-      </p:nvGrpSpPr>
-      <p:grpSpPr>
-        <a:xfrm>
-          <a:off x="0" y="0"/>
-          <a:ext cx="0" cy="0"/>
-          <a:chOff x="0" y="0"/>
-          <a:chExt cx="0" cy="0"/>
-        </a:xfrm>
-      </p:grpSpPr>
-      <p:sp>
-        <p:nvSpPr>
           <p:cNvPr id="51202" name="Rectangle 2"/>
           <p:cNvSpPr>
             <a:spLocks noGrp="1"/>
@@ -5179,6 +4991,788 @@
 </p:sld>
 </file>
 
+<file path=ppt/slides/slide14.xml><?xml version="1.0" encoding="utf-8"?>
+<p:sld xmlns:a="http://schemas.openxmlformats.org/drawingml/2006/main" xmlns:r="http://schemas.openxmlformats.org/officeDocument/2006/relationships" xmlns:p="http://schemas.openxmlformats.org/presentationml/2006/main">
+  <p:cSld>
+    <p:spTree>
+      <p:nvGrpSpPr>
+        <p:cNvPr id="1" name=""/>
+        <p:cNvGrpSpPr/>
+        <p:nvPr/>
+      </p:nvGrpSpPr>
+      <p:grpSpPr>
+        <a:xfrm>
+          <a:off x="0" y="0"/>
+          <a:ext cx="0" cy="0"/>
+          <a:chOff x="0" y="0"/>
+          <a:chExt cx="0" cy="0"/>
+        </a:xfrm>
+      </p:grpSpPr>
+      <p:sp>
+        <p:nvSpPr>
+          <p:cNvPr id="2" name="Titel 1"/>
+          <p:cNvSpPr>
+            <a:spLocks noGrp="1"/>
+          </p:cNvSpPr>
+          <p:nvPr>
+            <p:ph type="title"/>
+          </p:nvPr>
+        </p:nvSpPr>
+        <p:spPr/>
+        <p:txBody>
+          <a:bodyPr/>
+          <a:lstStyle/>
+          <a:p>
+            <a:r>
+              <a:rPr lang="da-DK" dirty="0" smtClean="0"/>
+              <a:t>Design </a:t>
+            </a:r>
+            <a:r>
+              <a:rPr lang="da-DK" dirty="0" err="1" smtClean="0"/>
+              <a:t>space</a:t>
+            </a:r>
+            <a:r>
+              <a:rPr lang="da-DK" dirty="0" smtClean="0"/>
+              <a:t> </a:t>
+            </a:r>
+            <a:r>
+              <a:rPr lang="da-DK" dirty="0" err="1" smtClean="0"/>
+              <a:t>exploration</a:t>
+            </a:r>
+            <a:endParaRPr lang="da-DK" dirty="0"/>
+          </a:p>
+        </p:txBody>
+      </p:sp>
+      <p:graphicFrame>
+        <p:nvGraphicFramePr>
+          <p:cNvPr id="4" name="Pladsholder til indhold 3"/>
+          <p:cNvGraphicFramePr>
+            <a:graphicFrameLocks noGrp="1"/>
+          </p:cNvGraphicFramePr>
+          <p:nvPr>
+            <p:ph idx="1"/>
+          </p:nvPr>
+        </p:nvGraphicFramePr>
+        <p:xfrm>
+          <a:off x="457200" y="1600200"/>
+          <a:ext cx="8229600" cy="2761488"/>
+        </p:xfrm>
+        <a:graphic>
+          <a:graphicData uri="http://schemas.openxmlformats.org/drawingml/2006/table">
+            <a:tbl>
+              <a:tblPr firstRow="1" bandRow="1">
+                <a:tableStyleId>{5C22544A-7EE6-4342-B048-85BDC9FD1C3A}</a:tableStyleId>
+              </a:tblPr>
+              <a:tblGrid>
+                <a:gridCol w="2057400"/>
+                <a:gridCol w="2057400"/>
+                <a:gridCol w="2057400"/>
+                <a:gridCol w="2057400"/>
+              </a:tblGrid>
+              <a:tr h="370840">
+                <a:tc>
+                  <a:txBody>
+                    <a:bodyPr/>
+                    <a:lstStyle/>
+                    <a:p>
+                      <a:pPr>
+                        <a:lnSpc>
+                          <a:spcPct val="115000"/>
+                        </a:lnSpc>
+                        <a:spcAft>
+                          <a:spcPts val="0"/>
+                        </a:spcAft>
+                      </a:pPr>
+                      <a:r>
+                        <a:rPr lang="en-GB" sz="2400" dirty="0">
+                          <a:latin typeface="Calibri"/>
+                          <a:ea typeface="Calibri"/>
+                          <a:cs typeface="Times New Roman"/>
+                        </a:rPr>
+                        <a:t>Platform</a:t>
+                      </a:r>
+                      <a:endParaRPr lang="da-DK" sz="2400" dirty="0">
+                        <a:latin typeface="Calibri"/>
+                        <a:ea typeface="Calibri"/>
+                        <a:cs typeface="Times New Roman"/>
+                      </a:endParaRPr>
+                    </a:p>
+                  </a:txBody>
+                  <a:tcPr marL="68580" marR="68580" marT="0" marB="0"/>
+                </a:tc>
+                <a:tc>
+                  <a:txBody>
+                    <a:bodyPr/>
+                    <a:lstStyle/>
+                    <a:p>
+                      <a:pPr>
+                        <a:lnSpc>
+                          <a:spcPct val="115000"/>
+                        </a:lnSpc>
+                        <a:spcAft>
+                          <a:spcPts val="0"/>
+                        </a:spcAft>
+                      </a:pPr>
+                      <a:r>
+                        <a:rPr lang="en-GB" sz="2400" dirty="0">
+                          <a:latin typeface="Calibri"/>
+                          <a:ea typeface="Calibri"/>
+                          <a:cs typeface="Times New Roman"/>
+                        </a:rPr>
+                        <a:t>Price</a:t>
+                      </a:r>
+                      <a:endParaRPr lang="da-DK" sz="2400" dirty="0">
+                        <a:latin typeface="Calibri"/>
+                        <a:ea typeface="Calibri"/>
+                        <a:cs typeface="Times New Roman"/>
+                      </a:endParaRPr>
+                    </a:p>
+                    <a:p>
+                      <a:pPr>
+                        <a:lnSpc>
+                          <a:spcPct val="115000"/>
+                        </a:lnSpc>
+                        <a:spcAft>
+                          <a:spcPts val="0"/>
+                        </a:spcAft>
+                      </a:pPr>
+                      <a:r>
+                        <a:rPr lang="en-GB" sz="2400" dirty="0">
+                          <a:latin typeface="Calibri"/>
+                          <a:ea typeface="Calibri"/>
+                          <a:cs typeface="Times New Roman"/>
+                        </a:rPr>
+                        <a:t>(USD)</a:t>
+                      </a:r>
+                      <a:endParaRPr lang="da-DK" sz="2400" dirty="0">
+                        <a:latin typeface="Calibri"/>
+                        <a:ea typeface="Calibri"/>
+                        <a:cs typeface="Times New Roman"/>
+                      </a:endParaRPr>
+                    </a:p>
+                  </a:txBody>
+                  <a:tcPr marL="68580" marR="68580" marT="0" marB="0"/>
+                </a:tc>
+                <a:tc>
+                  <a:txBody>
+                    <a:bodyPr/>
+                    <a:lstStyle/>
+                    <a:p>
+                      <a:pPr>
+                        <a:lnSpc>
+                          <a:spcPct val="115000"/>
+                        </a:lnSpc>
+                        <a:spcAft>
+                          <a:spcPts val="0"/>
+                        </a:spcAft>
+                      </a:pPr>
+                      <a:r>
+                        <a:rPr lang="en-GB" sz="2400" dirty="0">
+                          <a:latin typeface="Calibri"/>
+                          <a:ea typeface="Calibri"/>
+                          <a:cs typeface="Times New Roman"/>
+                        </a:rPr>
+                        <a:t>Risk</a:t>
+                      </a:r>
+                      <a:r>
+                        <a:rPr lang="en-GB" sz="2400" dirty="0" smtClean="0">
+                          <a:latin typeface="Calibri"/>
+                          <a:ea typeface="Calibri"/>
+                          <a:cs typeface="Times New Roman"/>
+                        </a:rPr>
+                        <a:t>/</a:t>
+                      </a:r>
+                    </a:p>
+                    <a:p>
+                      <a:pPr>
+                        <a:lnSpc>
+                          <a:spcPct val="115000"/>
+                        </a:lnSpc>
+                        <a:spcAft>
+                          <a:spcPts val="0"/>
+                        </a:spcAft>
+                      </a:pPr>
+                      <a:r>
+                        <a:rPr lang="en-GB" sz="2400" dirty="0" smtClean="0">
+                          <a:latin typeface="Calibri"/>
+                          <a:ea typeface="Calibri"/>
+                          <a:cs typeface="Times New Roman"/>
+                        </a:rPr>
+                        <a:t>Complexity</a:t>
+                      </a:r>
+                      <a:endParaRPr lang="da-DK" sz="2400" dirty="0">
+                        <a:latin typeface="Calibri"/>
+                        <a:ea typeface="Calibri"/>
+                        <a:cs typeface="Times New Roman"/>
+                      </a:endParaRPr>
+                    </a:p>
+                  </a:txBody>
+                  <a:tcPr marL="68580" marR="68580" marT="0" marB="0"/>
+                </a:tc>
+                <a:tc>
+                  <a:txBody>
+                    <a:bodyPr/>
+                    <a:lstStyle/>
+                    <a:p>
+                      <a:pPr>
+                        <a:lnSpc>
+                          <a:spcPct val="115000"/>
+                        </a:lnSpc>
+                        <a:spcAft>
+                          <a:spcPts val="0"/>
+                        </a:spcAft>
+                      </a:pPr>
+                      <a:r>
+                        <a:rPr lang="en-GB" sz="2400" dirty="0">
+                          <a:latin typeface="Calibri"/>
+                          <a:ea typeface="Calibri"/>
+                          <a:cs typeface="Times New Roman"/>
+                        </a:rPr>
+                        <a:t>Power</a:t>
+                      </a:r>
+                      <a:endParaRPr lang="da-DK" sz="2400" dirty="0">
+                        <a:latin typeface="Calibri"/>
+                        <a:ea typeface="Calibri"/>
+                        <a:cs typeface="Times New Roman"/>
+                      </a:endParaRPr>
+                    </a:p>
+                    <a:p>
+                      <a:pPr>
+                        <a:lnSpc>
+                          <a:spcPct val="115000"/>
+                        </a:lnSpc>
+                        <a:spcAft>
+                          <a:spcPts val="0"/>
+                        </a:spcAft>
+                      </a:pPr>
+                      <a:r>
+                        <a:rPr lang="en-GB" sz="2400" dirty="0">
+                          <a:latin typeface="Calibri"/>
+                          <a:ea typeface="Calibri"/>
+                          <a:cs typeface="Times New Roman"/>
+                        </a:rPr>
+                        <a:t>(sleep/audio)</a:t>
+                      </a:r>
+                      <a:endParaRPr lang="da-DK" sz="2400" dirty="0">
+                        <a:latin typeface="Calibri"/>
+                        <a:ea typeface="Calibri"/>
+                        <a:cs typeface="Times New Roman"/>
+                      </a:endParaRPr>
+                    </a:p>
+                  </a:txBody>
+                  <a:tcPr marL="68580" marR="68580" marT="0" marB="0"/>
+                </a:tc>
+              </a:tr>
+              <a:tr h="370840">
+                <a:tc>
+                  <a:txBody>
+                    <a:bodyPr/>
+                    <a:lstStyle/>
+                    <a:p>
+                      <a:r>
+                        <a:rPr lang="en-GB" sz="1800" kern="1200" dirty="0" smtClean="0">
+                          <a:solidFill>
+                            <a:schemeClr val="dk1"/>
+                          </a:solidFill>
+                          <a:latin typeface="+mn-lt"/>
+                          <a:ea typeface="+mn-ea"/>
+                          <a:cs typeface="+mn-cs"/>
+                        </a:rPr>
+                        <a:t>Microcontroller + ISM ASIC</a:t>
+                      </a:r>
+                      <a:endParaRPr lang="da-DK" dirty="0"/>
+                    </a:p>
+                  </a:txBody>
+                  <a:tcPr/>
+                </a:tc>
+                <a:tc>
+                  <a:txBody>
+                    <a:bodyPr/>
+                    <a:lstStyle/>
+                    <a:p>
+                      <a:r>
+                        <a:rPr lang="da-DK" dirty="0" smtClean="0"/>
+                        <a:t>18.15</a:t>
+                      </a:r>
+                      <a:endParaRPr lang="da-DK" dirty="0"/>
+                    </a:p>
+                  </a:txBody>
+                  <a:tcPr/>
+                </a:tc>
+                <a:tc>
+                  <a:txBody>
+                    <a:bodyPr/>
+                    <a:lstStyle/>
+                    <a:p>
+                      <a:r>
+                        <a:rPr lang="da-DK" dirty="0" smtClean="0"/>
+                        <a:t>1</a:t>
+                      </a:r>
+                      <a:endParaRPr lang="da-DK" dirty="0"/>
+                    </a:p>
+                  </a:txBody>
+                  <a:tcPr/>
+                </a:tc>
+                <a:tc>
+                  <a:txBody>
+                    <a:bodyPr/>
+                    <a:lstStyle/>
+                    <a:p>
+                      <a:r>
+                        <a:rPr lang="en-GB" sz="1800" kern="1200" dirty="0" smtClean="0">
+                          <a:solidFill>
+                            <a:schemeClr val="dk1"/>
+                          </a:solidFill>
+                          <a:latin typeface="+mn-lt"/>
+                          <a:ea typeface="+mn-ea"/>
+                          <a:cs typeface="+mn-cs"/>
+                        </a:rPr>
+                        <a:t>22µW/</a:t>
+                      </a:r>
+                      <a:endParaRPr lang="da-DK" sz="1800" kern="1200" dirty="0" smtClean="0">
+                        <a:solidFill>
+                          <a:schemeClr val="dk1"/>
+                        </a:solidFill>
+                        <a:latin typeface="+mn-lt"/>
+                        <a:ea typeface="+mn-ea"/>
+                        <a:cs typeface="+mn-cs"/>
+                      </a:endParaRPr>
+                    </a:p>
+                    <a:p>
+                      <a:r>
+                        <a:rPr lang="en-GB" sz="1800" kern="1200" dirty="0" smtClean="0">
+                          <a:solidFill>
+                            <a:schemeClr val="dk1"/>
+                          </a:solidFill>
+                          <a:latin typeface="+mn-lt"/>
+                          <a:ea typeface="+mn-ea"/>
+                          <a:cs typeface="+mn-cs"/>
+                        </a:rPr>
+                        <a:t>max. 648mW</a:t>
+                      </a:r>
+                      <a:endParaRPr lang="da-DK" sz="1800" kern="1200" dirty="0" smtClean="0">
+                        <a:solidFill>
+                          <a:schemeClr val="dk1"/>
+                        </a:solidFill>
+                        <a:latin typeface="+mn-lt"/>
+                        <a:ea typeface="+mn-ea"/>
+                        <a:cs typeface="+mn-cs"/>
+                      </a:endParaRPr>
+                    </a:p>
+                  </a:txBody>
+                  <a:tcPr/>
+                </a:tc>
+              </a:tr>
+              <a:tr h="370840">
+                <a:tc>
+                  <a:txBody>
+                    <a:bodyPr/>
+                    <a:lstStyle/>
+                    <a:p>
+                      <a:r>
+                        <a:rPr lang="en-GB" sz="1800" kern="1200" dirty="0" smtClean="0">
+                          <a:solidFill>
+                            <a:schemeClr val="dk1"/>
+                          </a:solidFill>
+                          <a:latin typeface="+mn-lt"/>
+                          <a:ea typeface="+mn-ea"/>
+                          <a:cs typeface="+mn-cs"/>
+                        </a:rPr>
+                        <a:t>Microcontroller , DSP + ISM ASIC</a:t>
+                      </a:r>
+                      <a:endParaRPr lang="da-DK" dirty="0"/>
+                    </a:p>
+                  </a:txBody>
+                  <a:tcPr/>
+                </a:tc>
+                <a:tc>
+                  <a:txBody>
+                    <a:bodyPr/>
+                    <a:lstStyle/>
+                    <a:p>
+                      <a:r>
+                        <a:rPr lang="da-DK" dirty="0" smtClean="0"/>
+                        <a:t>23.57</a:t>
+                      </a:r>
+                      <a:endParaRPr lang="da-DK" dirty="0"/>
+                    </a:p>
+                  </a:txBody>
+                  <a:tcPr/>
+                </a:tc>
+                <a:tc>
+                  <a:txBody>
+                    <a:bodyPr/>
+                    <a:lstStyle/>
+                    <a:p>
+                      <a:r>
+                        <a:rPr lang="da-DK" dirty="0" smtClean="0"/>
+                        <a:t>3</a:t>
+                      </a:r>
+                      <a:endParaRPr lang="da-DK" dirty="0"/>
+                    </a:p>
+                  </a:txBody>
+                  <a:tcPr/>
+                </a:tc>
+                <a:tc>
+                  <a:txBody>
+                    <a:bodyPr/>
+                    <a:lstStyle/>
+                    <a:p>
+                      <a:r>
+                        <a:rPr lang="en-GB" sz="1800" kern="1200" dirty="0" smtClean="0">
+                          <a:solidFill>
+                            <a:schemeClr val="dk1"/>
+                          </a:solidFill>
+                          <a:latin typeface="+mn-lt"/>
+                          <a:ea typeface="+mn-ea"/>
+                          <a:cs typeface="+mn-cs"/>
+                        </a:rPr>
+                        <a:t>70.69 µW /</a:t>
+                      </a:r>
+                      <a:endParaRPr lang="da-DK" sz="1800" kern="1200" dirty="0" smtClean="0">
+                        <a:solidFill>
+                          <a:schemeClr val="dk1"/>
+                        </a:solidFill>
+                        <a:latin typeface="+mn-lt"/>
+                        <a:ea typeface="+mn-ea"/>
+                        <a:cs typeface="+mn-cs"/>
+                      </a:endParaRPr>
+                    </a:p>
+                    <a:p>
+                      <a:r>
+                        <a:rPr lang="en-GB" sz="1800" kern="1200" dirty="0" smtClean="0">
+                          <a:solidFill>
+                            <a:schemeClr val="dk1"/>
+                          </a:solidFill>
+                          <a:latin typeface="+mn-lt"/>
+                          <a:ea typeface="+mn-ea"/>
+                          <a:cs typeface="+mn-cs"/>
+                        </a:rPr>
+                        <a:t>max. 815mW</a:t>
+                      </a:r>
+                      <a:endParaRPr lang="da-DK" sz="1800" kern="1200" dirty="0" smtClean="0">
+                        <a:solidFill>
+                          <a:schemeClr val="dk1"/>
+                        </a:solidFill>
+                        <a:latin typeface="+mn-lt"/>
+                        <a:ea typeface="+mn-ea"/>
+                        <a:cs typeface="+mn-cs"/>
+                      </a:endParaRPr>
+                    </a:p>
+                  </a:txBody>
+                  <a:tcPr/>
+                </a:tc>
+              </a:tr>
+              <a:tr h="370840">
+                <a:tc>
+                  <a:txBody>
+                    <a:bodyPr/>
+                    <a:lstStyle/>
+                    <a:p>
+                      <a:r>
+                        <a:rPr lang="en-GB" sz="1800" kern="1200" dirty="0" smtClean="0">
+                          <a:solidFill>
+                            <a:schemeClr val="dk1"/>
+                          </a:solidFill>
+                          <a:latin typeface="+mn-lt"/>
+                          <a:ea typeface="+mn-ea"/>
+                          <a:cs typeface="+mn-cs"/>
+                        </a:rPr>
+                        <a:t>FPGA, ADC + Oscillator</a:t>
+                      </a:r>
+                      <a:endParaRPr lang="da-DK" dirty="0"/>
+                    </a:p>
+                  </a:txBody>
+                  <a:tcPr/>
+                </a:tc>
+                <a:tc>
+                  <a:txBody>
+                    <a:bodyPr/>
+                    <a:lstStyle/>
+                    <a:p>
+                      <a:r>
+                        <a:rPr lang="da-DK" dirty="0" smtClean="0"/>
+                        <a:t>1295</a:t>
+                      </a:r>
+                      <a:endParaRPr lang="da-DK" dirty="0"/>
+                    </a:p>
+                  </a:txBody>
+                  <a:tcPr/>
+                </a:tc>
+                <a:tc>
+                  <a:txBody>
+                    <a:bodyPr/>
+                    <a:lstStyle/>
+                    <a:p>
+                      <a:r>
+                        <a:rPr lang="da-DK" dirty="0" smtClean="0"/>
+                        <a:t>10</a:t>
+                      </a:r>
+                      <a:endParaRPr lang="da-DK" dirty="0"/>
+                    </a:p>
+                  </a:txBody>
+                  <a:tcPr/>
+                </a:tc>
+                <a:tc>
+                  <a:txBody>
+                    <a:bodyPr/>
+                    <a:lstStyle/>
+                    <a:p>
+                      <a:r>
+                        <a:rPr lang="en-GB" sz="1800" kern="1200" dirty="0" smtClean="0">
+                          <a:solidFill>
+                            <a:schemeClr val="dk1"/>
+                          </a:solidFill>
+                          <a:latin typeface="+mn-lt"/>
+                          <a:ea typeface="+mn-ea"/>
+                          <a:cs typeface="+mn-cs"/>
+                        </a:rPr>
+                        <a:t>88mW / min. 4W</a:t>
+                      </a:r>
+                      <a:endParaRPr lang="da-DK" dirty="0" smtClean="0"/>
+                    </a:p>
+                  </a:txBody>
+                  <a:tcPr/>
+                </a:tc>
+              </a:tr>
+            </a:tbl>
+          </a:graphicData>
+        </a:graphic>
+      </p:graphicFrame>
+      <p:sp>
+        <p:nvSpPr>
+          <p:cNvPr id="5" name="Tekstboks 4"/>
+          <p:cNvSpPr txBox="1"/>
+          <p:nvPr/>
+        </p:nvSpPr>
+        <p:spPr>
+          <a:xfrm>
+            <a:off x="683568" y="5013176"/>
+            <a:ext cx="7333033" cy="523220"/>
+          </a:xfrm>
+          <a:prstGeom prst="rect">
+            <a:avLst/>
+          </a:prstGeom>
+          <a:noFill/>
+        </p:spPr>
+        <p:txBody>
+          <a:bodyPr wrap="none" rtlCol="0">
+            <a:spAutoFit/>
+          </a:bodyPr>
+          <a:lstStyle/>
+          <a:p>
+            <a:r>
+              <a:rPr lang="da-DK" sz="2800" dirty="0" err="1" smtClean="0"/>
+              <a:t>Other</a:t>
+            </a:r>
+            <a:r>
+              <a:rPr lang="da-DK" sz="2800" dirty="0" smtClean="0"/>
+              <a:t> options: Performance, </a:t>
+            </a:r>
+            <a:r>
+              <a:rPr lang="da-DK" sz="2800" dirty="0" err="1" smtClean="0"/>
+              <a:t>extendability</a:t>
+            </a:r>
+            <a:r>
+              <a:rPr lang="da-DK" sz="2800" dirty="0" smtClean="0"/>
+              <a:t>, …</a:t>
+            </a:r>
+            <a:endParaRPr lang="da-DK" sz="2800" dirty="0"/>
+          </a:p>
+        </p:txBody>
+      </p:sp>
+    </p:spTree>
+  </p:cSld>
+  <p:clrMapOvr>
+    <a:masterClrMapping/>
+  </p:clrMapOvr>
+</p:sld>
+</file>
+
+<file path=ppt/slides/slide15.xml><?xml version="1.0" encoding="utf-8"?>
+<p:sld xmlns:a="http://schemas.openxmlformats.org/drawingml/2006/main" xmlns:r="http://schemas.openxmlformats.org/officeDocument/2006/relationships" xmlns:p="http://schemas.openxmlformats.org/presentationml/2006/main">
+  <p:cSld>
+    <p:spTree>
+      <p:nvGrpSpPr>
+        <p:cNvPr id="1" name=""/>
+        <p:cNvGrpSpPr/>
+        <p:nvPr/>
+      </p:nvGrpSpPr>
+      <p:grpSpPr>
+        <a:xfrm>
+          <a:off x="0" y="0"/>
+          <a:ext cx="0" cy="0"/>
+          <a:chOff x="0" y="0"/>
+          <a:chExt cx="0" cy="0"/>
+        </a:xfrm>
+      </p:grpSpPr>
+      <p:sp>
+        <p:nvSpPr>
+          <p:cNvPr id="2" name="Titel 1"/>
+          <p:cNvSpPr>
+            <a:spLocks noGrp="1"/>
+          </p:cNvSpPr>
+          <p:nvPr>
+            <p:ph type="title"/>
+          </p:nvPr>
+        </p:nvSpPr>
+        <p:spPr/>
+        <p:txBody>
+          <a:bodyPr/>
+          <a:lstStyle/>
+          <a:p>
+            <a:r>
+              <a:rPr lang="da-DK" dirty="0" err="1" smtClean="0"/>
+              <a:t>Perato</a:t>
+            </a:r>
+            <a:r>
+              <a:rPr lang="da-DK" dirty="0" smtClean="0"/>
+              <a:t> points</a:t>
+            </a:r>
+            <a:endParaRPr lang="da-DK" dirty="0"/>
+          </a:p>
+        </p:txBody>
+      </p:sp>
+      <p:graphicFrame>
+        <p:nvGraphicFramePr>
+          <p:cNvPr id="4" name="Pladsholder til indhold 3"/>
+          <p:cNvGraphicFramePr>
+            <a:graphicFrameLocks noGrp="1"/>
+          </p:cNvGraphicFramePr>
+          <p:nvPr>
+            <p:ph idx="1"/>
+          </p:nvPr>
+        </p:nvGraphicFramePr>
+        <p:xfrm>
+          <a:off x="457200" y="1600200"/>
+          <a:ext cx="8229600" cy="4525963"/>
+        </p:xfrm>
+        <a:graphic>
+          <a:graphicData uri="http://schemas.openxmlformats.org/drawingml/2006/chart">
+            <c:chart xmlns:c="http://schemas.openxmlformats.org/drawingml/2006/chart" xmlns:r="http://schemas.openxmlformats.org/officeDocument/2006/relationships" r:id="rId2"/>
+          </a:graphicData>
+        </a:graphic>
+      </p:graphicFrame>
+    </p:spTree>
+  </p:cSld>
+  <p:clrMapOvr>
+    <a:masterClrMapping/>
+  </p:clrMapOvr>
+</p:sld>
+</file>
+
+<file path=ppt/slides/slide16.xml><?xml version="1.0" encoding="utf-8"?>
+<p:sld xmlns:a="http://schemas.openxmlformats.org/drawingml/2006/main" xmlns:r="http://schemas.openxmlformats.org/officeDocument/2006/relationships" xmlns:p="http://schemas.openxmlformats.org/presentationml/2006/main">
+  <p:cSld>
+    <p:spTree>
+      <p:nvGrpSpPr>
+        <p:cNvPr id="1" name=""/>
+        <p:cNvGrpSpPr/>
+        <p:nvPr/>
+      </p:nvGrpSpPr>
+      <p:grpSpPr>
+        <a:xfrm>
+          <a:off x="0" y="0"/>
+          <a:ext cx="0" cy="0"/>
+          <a:chOff x="0" y="0"/>
+          <a:chExt cx="0" cy="0"/>
+        </a:xfrm>
+      </p:grpSpPr>
+      <p:sp>
+        <p:nvSpPr>
+          <p:cNvPr id="54274" name="Rectangle 2"/>
+          <p:cNvSpPr>
+            <a:spLocks noGrp="1"/>
+          </p:cNvSpPr>
+          <p:nvPr>
+            <p:ph type="title"/>
+          </p:nvPr>
+        </p:nvSpPr>
+        <p:spPr/>
+        <p:txBody>
+          <a:bodyPr/>
+          <a:lstStyle/>
+          <a:p>
+            <a:r>
+              <a:rPr lang="da-DK" smtClean="0"/>
+              <a:t>SystemC design (Audio)</a:t>
+            </a:r>
+          </a:p>
+        </p:txBody>
+      </p:sp>
+      <p:sp>
+        <p:nvSpPr>
+          <p:cNvPr id="82946" name="Rectangle 2"/>
+          <p:cNvSpPr>
+            <a:spLocks noChangeArrowheads="1"/>
+          </p:cNvSpPr>
+          <p:nvPr/>
+        </p:nvSpPr>
+        <p:spPr bwMode="auto">
+          <a:xfrm>
+            <a:off x="0" y="0"/>
+            <a:ext cx="9144000" cy="0"/>
+          </a:xfrm>
+          <a:prstGeom prst="rect">
+            <a:avLst/>
+          </a:prstGeom>
+          <a:noFill/>
+          <a:ln w="9525">
+            <a:noFill/>
+            <a:miter lim="800000"/>
+            <a:headEnd/>
+            <a:tailEnd/>
+          </a:ln>
+          <a:effectLst/>
+        </p:spPr>
+        <p:txBody>
+          <a:bodyPr vert="horz" wrap="none" lIns="91440" tIns="45720" rIns="91440" bIns="45720" numCol="1" anchor="ctr" anchorCtr="0" compatLnSpc="1">
+            <a:prstTxWarp prst="textNoShape">
+              <a:avLst/>
+            </a:prstTxWarp>
+            <a:spAutoFit/>
+          </a:bodyPr>
+          <a:lstStyle/>
+          <a:p>
+            <a:endParaRPr lang="da-DK"/>
+          </a:p>
+        </p:txBody>
+      </p:sp>
+      <p:graphicFrame>
+        <p:nvGraphicFramePr>
+          <p:cNvPr id="82945" name="Object 1"/>
+          <p:cNvGraphicFramePr>
+            <a:graphicFrameLocks noChangeAspect="1"/>
+          </p:cNvGraphicFramePr>
+          <p:nvPr/>
+        </p:nvGraphicFramePr>
+        <p:xfrm>
+          <a:off x="395536" y="1196752"/>
+          <a:ext cx="8424936" cy="5466258"/>
+        </p:xfrm>
+        <a:graphic>
+          <a:graphicData uri="http://schemas.openxmlformats.org/presentationml/2006/ole">
+            <p:oleObj spid="_x0000_s82945" name="Visio" r:id="rId3" imgW="10420486" imgH="6766560" progId="Visio.Drawing.11">
+              <p:embed/>
+            </p:oleObj>
+          </a:graphicData>
+        </a:graphic>
+      </p:graphicFrame>
+    </p:spTree>
+  </p:cSld>
+  <p:clrMapOvr>
+    <a:masterClrMapping/>
+  </p:clrMapOvr>
+  <p:timing>
+    <p:tnLst>
+      <p:par>
+        <p:cTn id="1" dur="indefinite" restart="never" nodeType="tmRoot"/>
+      </p:par>
+    </p:tnLst>
+  </p:timing>
+</p:sld>
+</file>
+
 <file path=ppt/slides/slide17.xml><?xml version="1.0" encoding="utf-8"?>
 <p:sld xmlns:a="http://schemas.openxmlformats.org/drawingml/2006/main" xmlns:r="http://schemas.openxmlformats.org/officeDocument/2006/relationships" xmlns:p="http://schemas.openxmlformats.org/presentationml/2006/main">
   <p:cSld>
@@ -5198,7 +5792,7 @@
       </p:grpSpPr>
       <p:sp>
         <p:nvSpPr>
-          <p:cNvPr id="46082" name="Rectangle 2"/>
+          <p:cNvPr id="55298" name="Rectangle 2"/>
           <p:cNvSpPr>
             <a:spLocks noGrp="1"/>
           </p:cNvSpPr>
@@ -5211,39 +5805,25 @@
           <a:bodyPr/>
           <a:lstStyle/>
           <a:p>
-            <a:pPr algn="l"/>
             <a:r>
               <a:rPr lang="da-DK" smtClean="0"/>
-              <a:t>SysML </a:t>
-            </a:r>
-            <a:r>
-              <a:rPr lang="da-DK" smtClean="0">
-                <a:sym typeface="Wingdings" pitchFamily="2" charset="2"/>
-              </a:rPr>
-              <a:t> SystemC</a:t>
-            </a:r>
-          </a:p>
-        </p:txBody>
-      </p:sp>
-      <p:pic>
-        <p:nvPicPr>
-          <p:cNvPr id="46084" name="Picture 4"/>
-          <p:cNvPicPr>
-            <a:picLocks noChangeAspect="1" noChangeArrowheads="1"/>
-          </p:cNvPicPr>
+              <a:t>SystemC simulation</a:t>
+            </a:r>
+          </a:p>
+        </p:txBody>
+      </p:sp>
+      <p:sp>
+        <p:nvSpPr>
+          <p:cNvPr id="81922" name="Rectangle 2"/>
+          <p:cNvSpPr>
+            <a:spLocks noChangeArrowheads="1"/>
+          </p:cNvSpPr>
           <p:nvPr/>
-        </p:nvPicPr>
-        <p:blipFill>
-          <a:blip r:embed="rId2" cstate="print"/>
-          <a:srcRect/>
-          <a:stretch>
-            <a:fillRect/>
-          </a:stretch>
-        </p:blipFill>
+        </p:nvSpPr>
         <p:spPr bwMode="auto">
           <a:xfrm>
-            <a:off x="4787900" y="404813"/>
-            <a:ext cx="3876675" cy="5867400"/>
+            <a:off x="0" y="0"/>
+            <a:ext cx="9144000" cy="0"/>
           </a:xfrm>
           <a:prstGeom prst="rect">
             <a:avLst/>
@@ -5255,8 +5835,43 @@
             <a:headEnd/>
             <a:tailEnd/>
           </a:ln>
+          <a:effectLst/>
         </p:spPr>
-      </p:pic>
+        <p:txBody>
+          <a:bodyPr vert="horz" wrap="none" lIns="91440" tIns="45720" rIns="91440" bIns="45720" numCol="1" anchor="ctr" anchorCtr="0" compatLnSpc="1">
+            <a:prstTxWarp prst="textNoShape">
+              <a:avLst/>
+            </a:prstTxWarp>
+            <a:spAutoFit/>
+          </a:bodyPr>
+          <a:lstStyle/>
+          <a:p>
+            <a:endParaRPr lang="da-DK"/>
+          </a:p>
+        </p:txBody>
+      </p:sp>
+      <p:graphicFrame>
+        <p:nvGraphicFramePr>
+          <p:cNvPr id="81923" name="Object 3"/>
+          <p:cNvGraphicFramePr>
+            <a:graphicFrameLocks noChangeAspect="1"/>
+          </p:cNvGraphicFramePr>
+          <p:nvPr>
+            <p:ph idx="1"/>
+          </p:nvPr>
+        </p:nvGraphicFramePr>
+        <p:xfrm>
+          <a:off x="251520" y="1196752"/>
+          <a:ext cx="8615352" cy="5400600"/>
+        </p:xfrm>
+        <a:graphic>
+          <a:graphicData uri="http://schemas.openxmlformats.org/presentationml/2006/ole">
+            <p:oleObj spid="_x0000_s81923" name="Visio" r:id="rId3" imgW="10270671" imgH="3348582" progId="Visio.Drawing.11">
+              <p:embed/>
+            </p:oleObj>
+          </a:graphicData>
+        </a:graphic>
+      </p:graphicFrame>
     </p:spTree>
   </p:cSld>
   <p:clrMapOvr>
@@ -5291,7 +5906,7 @@
       </p:grpSpPr>
       <p:sp>
         <p:nvSpPr>
-          <p:cNvPr id="54274" name="Rectangle 2"/>
+          <p:cNvPr id="2" name="Titel 1"/>
           <p:cNvSpPr>
             <a:spLocks noGrp="1"/>
           </p:cNvSpPr>
@@ -5305,57 +5920,77 @@
           <a:lstStyle/>
           <a:p>
             <a:r>
-              <a:rPr lang="da-DK" smtClean="0"/>
-              <a:t>SystemC design (Audio)</a:t>
-            </a:r>
-          </a:p>
-        </p:txBody>
-      </p:sp>
-      <p:pic>
-        <p:nvPicPr>
-          <p:cNvPr id="54276" name="Picture 4"/>
-          <p:cNvPicPr>
-            <a:picLocks noChangeAspect="1" noChangeArrowheads="1"/>
-          </p:cNvPicPr>
-          <p:nvPr/>
-        </p:nvPicPr>
-        <p:blipFill>
-          <a:blip r:embed="rId2" cstate="print"/>
-          <a:srcRect l="7350" t="2519" r="7603" b="9277"/>
-          <a:stretch>
-            <a:fillRect/>
-          </a:stretch>
-        </p:blipFill>
-        <p:spPr bwMode="auto">
-          <a:xfrm>
-            <a:off x="179388" y="1211263"/>
-            <a:ext cx="8712200" cy="5646737"/>
-          </a:xfrm>
-          <a:prstGeom prst="rect">
-            <a:avLst/>
-          </a:prstGeom>
-          <a:noFill/>
-          <a:ln w="9525">
-            <a:noFill/>
-            <a:miter lim="800000"/>
-            <a:headEnd/>
-            <a:tailEnd/>
-          </a:ln>
-          <a:effectLst/>
-        </p:spPr>
-      </p:pic>
+              <a:rPr lang="da-DK" dirty="0" smtClean="0"/>
+              <a:t>Konklusion (1)</a:t>
+            </a:r>
+            <a:endParaRPr lang="da-DK" dirty="0"/>
+          </a:p>
+        </p:txBody>
+      </p:sp>
+      <p:sp>
+        <p:nvSpPr>
+          <p:cNvPr id="3" name="Pladsholder til indhold 2"/>
+          <p:cNvSpPr>
+            <a:spLocks noGrp="1"/>
+          </p:cNvSpPr>
+          <p:nvPr>
+            <p:ph idx="1"/>
+          </p:nvPr>
+        </p:nvSpPr>
+        <p:spPr/>
+        <p:txBody>
+          <a:bodyPr/>
+          <a:lstStyle/>
+          <a:p>
+            <a:r>
+              <a:rPr lang="da-DK" dirty="0" smtClean="0"/>
+              <a:t>INCOSE er meget tung at danse med, men har mange gode egenskaber og er god som tjekliste, men skal ikke følges slavisk</a:t>
+            </a:r>
+          </a:p>
+          <a:p>
+            <a:r>
+              <a:rPr lang="da-DK" dirty="0" err="1" smtClean="0"/>
+              <a:t>SysML</a:t>
+            </a:r>
+            <a:r>
+              <a:rPr lang="da-DK" dirty="0" smtClean="0"/>
+              <a:t> er et godt udkast til et fælles SW og HW sprog, men mangler noget modning (MARTE).</a:t>
+            </a:r>
+          </a:p>
+          <a:p>
+            <a:r>
+              <a:rPr lang="da-DK" dirty="0" err="1" smtClean="0"/>
+              <a:t>SystemC</a:t>
+            </a:r>
+            <a:r>
+              <a:rPr lang="da-DK" dirty="0" smtClean="0"/>
+              <a:t> er godt til HW simulering (SW udvikling kan fortsætte), men hvis der er lille design </a:t>
+            </a:r>
+            <a:r>
+              <a:rPr lang="da-DK" dirty="0" err="1" smtClean="0"/>
+              <a:t>risk</a:t>
+            </a:r>
+            <a:r>
+              <a:rPr lang="da-DK" dirty="0" smtClean="0"/>
+              <a:t> er det ikke tiden værd (måske hvis det kan autogenereres fra </a:t>
+            </a:r>
+            <a:r>
+              <a:rPr lang="da-DK" dirty="0" err="1" smtClean="0"/>
+              <a:t>SysML</a:t>
+            </a:r>
+            <a:r>
+              <a:rPr lang="da-DK" dirty="0" smtClean="0"/>
+              <a:t>)</a:t>
+            </a:r>
+            <a:endParaRPr lang="da-DK" dirty="0"/>
+          </a:p>
+        </p:txBody>
+      </p:sp>
     </p:spTree>
   </p:cSld>
   <p:clrMapOvr>
     <a:masterClrMapping/>
   </p:clrMapOvr>
-  <p:timing>
-    <p:tnLst>
-      <p:par>
-        <p:cTn id="1" dur="indefinite" restart="never" nodeType="tmRoot"/>
-      </p:par>
-    </p:tnLst>
-  </p:timing>
 </p:sld>
 </file>
 
@@ -5378,7 +6013,7 @@
       </p:grpSpPr>
       <p:sp>
         <p:nvSpPr>
-          <p:cNvPr id="55298" name="Rectangle 2"/>
+          <p:cNvPr id="2" name="Titel 1"/>
           <p:cNvSpPr>
             <a:spLocks noGrp="1"/>
           </p:cNvSpPr>
@@ -5392,43 +6027,105 @@
           <a:lstStyle/>
           <a:p>
             <a:r>
+              <a:rPr lang="da-DK" dirty="0" smtClean="0"/>
+              <a:t>Konklusion (2)</a:t>
+            </a:r>
+            <a:endParaRPr lang="da-DK" dirty="0"/>
+          </a:p>
+        </p:txBody>
+      </p:sp>
+      <p:sp>
+        <p:nvSpPr>
+          <p:cNvPr id="3" name="Pladsholder til indhold 2"/>
+          <p:cNvSpPr>
+            <a:spLocks noGrp="1"/>
+          </p:cNvSpPr>
+          <p:nvPr>
+            <p:ph idx="1"/>
+          </p:nvPr>
+        </p:nvSpPr>
+        <p:spPr/>
+        <p:txBody>
+          <a:bodyPr/>
+          <a:lstStyle/>
+          <a:p>
+            <a:r>
+              <a:rPr lang="da-DK" dirty="0" smtClean="0"/>
+              <a:t>Vi mangler FPGA </a:t>
+            </a:r>
+            <a:r>
+              <a:rPr lang="da-DK" dirty="0" err="1" smtClean="0"/>
+              <a:t>resourcer</a:t>
+            </a:r>
+            <a:r>
+              <a:rPr lang="da-DK" dirty="0" smtClean="0"/>
+              <a:t>, og bare analysen af en FPGA platform er svært uden dem.</a:t>
+            </a:r>
+          </a:p>
+          <a:p>
+            <a:r>
+              <a:rPr lang="da-DK" dirty="0" err="1" smtClean="0"/>
+              <a:t>Pareto</a:t>
+            </a:r>
+            <a:r>
+              <a:rPr lang="da-DK" dirty="0" smtClean="0"/>
+              <a:t> og design </a:t>
+            </a:r>
+            <a:r>
+              <a:rPr lang="da-DK" dirty="0" err="1" smtClean="0"/>
+              <a:t>space</a:t>
+            </a:r>
+            <a:r>
+              <a:rPr lang="da-DK" dirty="0" smtClean="0"/>
+              <a:t> </a:t>
+            </a:r>
+            <a:r>
+              <a:rPr lang="da-DK" dirty="0" err="1" smtClean="0"/>
+              <a:t>exploration</a:t>
+            </a:r>
+            <a:r>
+              <a:rPr lang="da-DK" dirty="0" smtClean="0"/>
+              <a:t> er godt til at sammenligne alternative platforme.</a:t>
+            </a:r>
+          </a:p>
+          <a:p>
+            <a:r>
+              <a:rPr lang="da-DK" dirty="0" smtClean="0"/>
+              <a:t>Med et </a:t>
+            </a:r>
+            <a:r>
+              <a:rPr lang="da-DK" dirty="0" err="1" smtClean="0"/>
+              <a:t>styk-tal</a:t>
+            </a:r>
+            <a:r>
+              <a:rPr lang="da-DK" dirty="0" smtClean="0"/>
+              <a:t> på 5-10000 stk. er det værd at betale lidt ekstra for </a:t>
+            </a:r>
+            <a:r>
               <a:rPr lang="da-DK" smtClean="0"/>
-              <a:t>SystemC simulation</a:t>
-            </a:r>
-          </a:p>
-        </p:txBody>
-      </p:sp>
-      <p:pic>
-        <p:nvPicPr>
-          <p:cNvPr id="55299" name="Picture 3"/>
-          <p:cNvPicPr>
-            <a:picLocks noGrp="1" noChangeAspect="1" noChangeArrowheads="1"/>
-          </p:cNvPicPr>
-          <p:nvPr>
-            <p:ph type="body" idx="1"/>
-          </p:nvPr>
-        </p:nvPicPr>
-        <p:blipFill>
-          <a:blip r:embed="rId2" cstate="print"/>
-          <a:srcRect/>
-          <a:stretch>
-            <a:fillRect/>
-          </a:stretch>
-        </p:blipFill>
-        <p:spPr/>
-      </p:pic>
+              <a:t>lavere risiko </a:t>
+            </a:r>
+            <a:r>
+              <a:rPr lang="da-DK" dirty="0" smtClean="0"/>
+              <a:t>(eksempel kode og mulighed for assistance samt simplere kommunikation). Anbefaling: CC430 med SKY ISM </a:t>
+            </a:r>
+            <a:r>
+              <a:rPr lang="da-DK" dirty="0" err="1" smtClean="0"/>
+              <a:t>front-end</a:t>
+            </a:r>
+            <a:r>
+              <a:rPr lang="da-DK" dirty="0" smtClean="0"/>
+              <a:t>.</a:t>
+            </a:r>
+            <a:endParaRPr lang="da-DK" dirty="0"/>
+          </a:p>
+        </p:txBody>
+      </p:sp>
     </p:spTree>
   </p:cSld>
   <p:clrMapOvr>
     <a:masterClrMapping/>
   </p:clrMapOvr>
-  <p:timing>
-    <p:tnLst>
-      <p:par>
-        <p:cTn id="1" dur="indefinite" restart="never" nodeType="tmRoot"/>
-      </p:par>
-    </p:tnLst>
-  </p:timing>
 </p:sld>
 </file>
 
@@ -5865,7 +6562,6 @@
               <a:rPr lang="da-DK" sz="2000" dirty="0" smtClean="0"/>
               <a:t> points</a:t>
             </a:r>
-            <a:endParaRPr lang="da-DK" sz="2000" dirty="0" smtClean="0"/>
           </a:p>
           <a:p>
             <a:pPr lvl="1"/>
@@ -6058,6 +6754,7 @@
             <a:endParaRPr lang="da-DK" dirty="0" smtClean="0"/>
           </a:p>
           <a:p>
+            <a:pPr lvl="1"/>
             <a:endParaRPr lang="da-DK" dirty="0" smtClean="0"/>
           </a:p>
         </p:txBody>
@@ -6102,7 +6799,11 @@
           <a:bodyPr/>
           <a:lstStyle/>
           <a:p>
-            <a:endParaRPr lang="da-DK"/>
+            <a:r>
+              <a:rPr lang="da-DK" dirty="0" smtClean="0"/>
+              <a:t>Projekt</a:t>
+            </a:r>
+            <a:endParaRPr lang="da-DK" dirty="0"/>
           </a:p>
         </p:txBody>
       </p:sp>
@@ -6121,7 +6822,136 @@
           <a:bodyPr/>
           <a:lstStyle/>
           <a:p>
-            <a:endParaRPr lang="da-DK"/>
+            <a:r>
+              <a:rPr lang="da-DK" dirty="0" smtClean="0"/>
+              <a:t>Proces</a:t>
+            </a:r>
+            <a:endParaRPr lang="da-DK" dirty="0" smtClean="0"/>
+          </a:p>
+          <a:p>
+            <a:pPr lvl="1"/>
+            <a:r>
+              <a:rPr lang="da-DK" dirty="0" smtClean="0"/>
+              <a:t>SRD/SRS (</a:t>
+            </a:r>
+            <a:r>
+              <a:rPr lang="da-DK" dirty="0" err="1" smtClean="0"/>
+              <a:t>Use</a:t>
+            </a:r>
+            <a:r>
+              <a:rPr lang="da-DK" dirty="0" smtClean="0"/>
+              <a:t> Cases, </a:t>
+            </a:r>
+            <a:r>
+              <a:rPr lang="da-DK" dirty="0" smtClean="0"/>
+              <a:t>risiko analyse, Kvalitets attributter)</a:t>
+            </a:r>
+            <a:endParaRPr lang="da-DK" dirty="0" smtClean="0"/>
+          </a:p>
+          <a:p>
+            <a:pPr lvl="1"/>
+            <a:r>
+              <a:rPr lang="da-DK" dirty="0" smtClean="0"/>
+              <a:t>System </a:t>
+            </a:r>
+            <a:r>
+              <a:rPr lang="da-DK" dirty="0" err="1" smtClean="0"/>
+              <a:t>Architecture</a:t>
+            </a:r>
+            <a:r>
+              <a:rPr lang="da-DK" dirty="0" smtClean="0"/>
+              <a:t> (</a:t>
+            </a:r>
+            <a:r>
+              <a:rPr lang="da-DK" dirty="0" err="1" smtClean="0"/>
+              <a:t>SysML</a:t>
+            </a:r>
+            <a:r>
+              <a:rPr lang="da-DK" dirty="0" smtClean="0"/>
+              <a:t>)</a:t>
+            </a:r>
+          </a:p>
+          <a:p>
+            <a:pPr lvl="1"/>
+            <a:r>
+              <a:rPr lang="da-DK" dirty="0" err="1" smtClean="0"/>
+              <a:t>Mapning</a:t>
+            </a:r>
+            <a:r>
+              <a:rPr lang="da-DK" dirty="0" smtClean="0"/>
+              <a:t> af System </a:t>
+            </a:r>
+            <a:r>
+              <a:rPr lang="da-DK" dirty="0" err="1" smtClean="0"/>
+              <a:t>Architecture</a:t>
+            </a:r>
+            <a:r>
+              <a:rPr lang="da-DK" dirty="0" smtClean="0"/>
+              <a:t> (Design </a:t>
+            </a:r>
+            <a:r>
+              <a:rPr lang="da-DK" dirty="0" err="1" smtClean="0"/>
+              <a:t>space</a:t>
+            </a:r>
+            <a:r>
+              <a:rPr lang="da-DK" dirty="0" smtClean="0"/>
+              <a:t> </a:t>
+            </a:r>
+            <a:r>
+              <a:rPr lang="da-DK" dirty="0" err="1" smtClean="0"/>
+              <a:t>exploration</a:t>
+            </a:r>
+            <a:r>
+              <a:rPr lang="da-DK" dirty="0" smtClean="0"/>
+              <a:t>, </a:t>
+            </a:r>
+            <a:r>
+              <a:rPr lang="da-DK" dirty="0" err="1" smtClean="0"/>
+              <a:t>Pareto</a:t>
+            </a:r>
+            <a:r>
+              <a:rPr lang="da-DK" dirty="0" smtClean="0"/>
+              <a:t>, LBA/LPT)</a:t>
+            </a:r>
+            <a:endParaRPr lang="da-DK" dirty="0" smtClean="0"/>
+          </a:p>
+          <a:p>
+            <a:pPr lvl="1"/>
+            <a:r>
+              <a:rPr lang="da-DK" dirty="0" err="1" smtClean="0"/>
+              <a:t>SysML</a:t>
+            </a:r>
+            <a:r>
+              <a:rPr lang="da-DK" dirty="0" smtClean="0"/>
+              <a:t> -&gt; </a:t>
+            </a:r>
+            <a:r>
+              <a:rPr lang="da-DK" dirty="0" err="1" smtClean="0"/>
+              <a:t>SystemC</a:t>
+            </a:r>
+            <a:endParaRPr lang="da-DK" dirty="0" smtClean="0"/>
+          </a:p>
+          <a:p>
+            <a:pPr lvl="1"/>
+            <a:r>
+              <a:rPr lang="da-DK" dirty="0" err="1" smtClean="0"/>
+              <a:t>SystemC</a:t>
+            </a:r>
+            <a:r>
+              <a:rPr lang="da-DK" dirty="0" smtClean="0"/>
+              <a:t> (TLM, TTLM, CAM)</a:t>
+            </a:r>
+          </a:p>
+          <a:p>
+            <a:pPr lvl="1"/>
+            <a:r>
+              <a:rPr lang="da-DK" dirty="0" smtClean="0"/>
+              <a:t>Konklusion</a:t>
+            </a:r>
+          </a:p>
+          <a:p>
+            <a:pPr lvl="1"/>
+            <a:endParaRPr lang="da-DK" dirty="0" smtClean="0"/>
           </a:p>
         </p:txBody>
       </p:sp>
@@ -6152,7 +6982,7 @@
       </p:grpSpPr>
       <p:sp>
         <p:nvSpPr>
-          <p:cNvPr id="44034" name="Rectangle 2"/>
+          <p:cNvPr id="2" name="Titel 1"/>
           <p:cNvSpPr>
             <a:spLocks noGrp="1"/>
           </p:cNvSpPr>
@@ -6166,21 +6996,43 @@
           <a:lstStyle/>
           <a:p>
             <a:r>
-              <a:rPr lang="da-DK" smtClean="0"/>
-              <a:t>R(V)TM </a:t>
-            </a:r>
+              <a:rPr lang="da-DK" dirty="0" smtClean="0"/>
+              <a:t>SRS/SRD</a:t>
+            </a:r>
+            <a:endParaRPr lang="da-DK" dirty="0"/>
+          </a:p>
+        </p:txBody>
+      </p:sp>
+      <p:sp>
+        <p:nvSpPr>
+          <p:cNvPr id="3" name="Pladsholder til indhold 2"/>
+          <p:cNvSpPr>
+            <a:spLocks noGrp="1"/>
+          </p:cNvSpPr>
+          <p:nvPr>
+            <p:ph idx="1"/>
+          </p:nvPr>
+        </p:nvSpPr>
+        <p:spPr/>
+        <p:txBody>
+          <a:bodyPr/>
+          <a:lstStyle/>
+          <a:p>
+            <a:r>
+              <a:rPr lang="da-DK" dirty="0" smtClean="0"/>
+              <a:t>R(V)TM</a:t>
+            </a:r>
+            <a:endParaRPr lang="da-DK" dirty="0"/>
           </a:p>
         </p:txBody>
       </p:sp>
       <p:pic>
         <p:nvPicPr>
-          <p:cNvPr id="44036" name="Picture 4"/>
+          <p:cNvPr id="4" name="Picture 4"/>
           <p:cNvPicPr>
-            <a:picLocks noGrp="1" noChangeAspect="1" noChangeArrowheads="1"/>
+            <a:picLocks noChangeAspect="1" noChangeArrowheads="1"/>
           </p:cNvPicPr>
-          <p:nvPr>
-            <p:ph type="body" idx="1"/>
-          </p:nvPr>
+          <p:nvPr/>
         </p:nvPicPr>
         <p:blipFill>
           <a:blip r:embed="rId2" cstate="print"/>
@@ -6189,11 +7041,21 @@
             <a:fillRect/>
           </a:stretch>
         </p:blipFill>
-        <p:spPr>
+        <p:spPr bwMode="auto">
           <a:xfrm>
-            <a:off x="611188" y="1628775"/>
+            <a:off x="611560" y="2348880"/>
             <a:ext cx="7993062" cy="3600450"/>
           </a:xfrm>
+          <a:prstGeom prst="rect">
+            <a:avLst/>
+          </a:prstGeom>
+          <a:noFill/>
+          <a:ln w="9525">
+            <a:noFill/>
+            <a:miter lim="800000"/>
+            <a:headEnd/>
+            <a:tailEnd/>
+          </a:ln>
         </p:spPr>
       </p:pic>
     </p:spTree>
@@ -6201,13 +7063,6 @@
   <p:clrMapOvr>
     <a:masterClrMapping/>
   </p:clrMapOvr>
-  <p:timing>
-    <p:tnLst>
-      <p:par>
-        <p:cTn id="1" dur="indefinite" restart="never" nodeType="tmRoot"/>
-      </p:par>
-    </p:tnLst>
-  </p:timing>
 </p:sld>
 </file>
 
@@ -6244,7 +7099,7 @@
           <a:lstStyle/>
           <a:p>
             <a:r>
-              <a:rPr lang="da-DK" smtClean="0"/>
+              <a:rPr lang="da-DK" dirty="0" smtClean="0"/>
               <a:t>Kvalitets attributter</a:t>
             </a:r>
           </a:p>
@@ -6269,9 +7124,39 @@
         </p:blipFill>
         <p:spPr>
           <a:xfrm>
-            <a:off x="395288" y="1628775"/>
+            <a:off x="755576" y="1628800"/>
             <a:ext cx="7705725" cy="1800225"/>
           </a:xfrm>
+        </p:spPr>
+      </p:pic>
+      <p:pic>
+        <p:nvPicPr>
+          <p:cNvPr id="4" name="Billede 3" descr="ironTriangle"/>
+          <p:cNvPicPr/>
+          <p:nvPr/>
+        </p:nvPicPr>
+        <p:blipFill>
+          <a:blip r:embed="rId3" cstate="print"/>
+          <a:srcRect/>
+          <a:stretch>
+            <a:fillRect/>
+          </a:stretch>
+        </p:blipFill>
+        <p:spPr bwMode="auto">
+          <a:xfrm>
+            <a:off x="3059832" y="3717032"/>
+            <a:ext cx="2495550" cy="1562100"/>
+          </a:xfrm>
+          <a:prstGeom prst="rect">
+            <a:avLst/>
+          </a:prstGeom>
+          <a:noFill/>
+          <a:ln w="9525">
+            <a:noFill/>
+            <a:miter lim="800000"/>
+            <a:headEnd/>
+            <a:tailEnd/>
+          </a:ln>
         </p:spPr>
       </p:pic>
     </p:spTree>

</xml_diff>

<commit_message>
Updating presentation with times and initial
</commit_message>
<xml_diff>
--- a/syseng_hwco/proj/Artifact/Presentations/Presentation_exam.pptx
+++ b/syseng_hwco/proj/Artifact/Presentations/Presentation_exam.pptx
@@ -4,6 +4,9 @@
   <p:sldMasterIdLst>
     <p:sldMasterId id="2147483648" r:id="rId1"/>
   </p:sldMasterIdLst>
+  <p:notesMasterIdLst>
+    <p:notesMasterId r:id="rId24"/>
+  </p:notesMasterIdLst>
   <p:sldIdLst>
     <p:sldId id="256" r:id="rId2"/>
     <p:sldId id="274" r:id="rId3"/>
@@ -13,8 +16,8 @@
     <p:sldId id="289" r:id="rId7"/>
     <p:sldId id="291" r:id="rId8"/>
     <p:sldId id="292" r:id="rId9"/>
-    <p:sldId id="276" r:id="rId10"/>
-    <p:sldId id="294" r:id="rId11"/>
+    <p:sldId id="294" r:id="rId10"/>
+    <p:sldId id="276" r:id="rId11"/>
     <p:sldId id="279" r:id="rId12"/>
     <p:sldId id="281" r:id="rId13"/>
     <p:sldId id="282" r:id="rId14"/>
@@ -26,9 +29,10 @@
     <p:sldId id="297" r:id="rId20"/>
     <p:sldId id="298" r:id="rId21"/>
     <p:sldId id="299" r:id="rId22"/>
+    <p:sldId id="300" r:id="rId23"/>
   </p:sldIdLst>
   <p:sldSz cx="9144000" cy="6858000" type="screen4x3"/>
-  <p:notesSz cx="6858000" cy="9144000"/>
+  <p:notesSz cx="6797675" cy="9926638"/>
   <p:defaultTextStyle>
     <a:defPPr>
       <a:defRPr lang="da-DK"/>
@@ -275,11 +279,11 @@
             </c:numRef>
           </c:yVal>
         </c:ser>
-        <c:axId val="67232512"/>
-        <c:axId val="67234432"/>
+        <c:axId val="73802496"/>
+        <c:axId val="73804416"/>
       </c:scatterChart>
       <c:valAx>
-        <c:axId val="67232512"/>
+        <c:axId val="73802496"/>
         <c:scaling>
           <c:orientation val="minMax"/>
         </c:scaling>
@@ -305,12 +309,12 @@
         <c:numFmt formatCode="General" sourceLinked="1"/>
         <c:majorTickMark val="none"/>
         <c:tickLblPos val="nextTo"/>
-        <c:crossAx val="67234432"/>
+        <c:crossAx val="73804416"/>
         <c:crosses val="autoZero"/>
         <c:crossBetween val="midCat"/>
       </c:valAx>
       <c:valAx>
-        <c:axId val="67234432"/>
+        <c:axId val="73804416"/>
         <c:scaling>
           <c:orientation val="minMax"/>
         </c:scaling>
@@ -337,7 +341,7 @@
         <c:numFmt formatCode="General" sourceLinked="1"/>
         <c:majorTickMark val="none"/>
         <c:tickLblPos val="nextTo"/>
-        <c:crossAx val="67232512"/>
+        <c:crossAx val="73802496"/>
         <c:crosses val="autoZero"/>
         <c:crossBetween val="midCat"/>
       </c:valAx>
@@ -364,6 +368,434 @@
   </c:spPr>
   <c:externalData r:id="rId1"/>
 </c:chartSpace>
+</file>
+
+<file path=ppt/notesMasters/notesMaster1.xml><?xml version="1.0" encoding="utf-8"?>
+<p:notesMaster xmlns:a="http://schemas.openxmlformats.org/drawingml/2006/main" xmlns:r="http://schemas.openxmlformats.org/officeDocument/2006/relationships" xmlns:p="http://schemas.openxmlformats.org/presentationml/2006/main">
+  <p:cSld>
+    <p:bg>
+      <p:bgRef idx="1001">
+        <a:schemeClr val="bg1"/>
+      </p:bgRef>
+    </p:bg>
+    <p:spTree>
+      <p:nvGrpSpPr>
+        <p:cNvPr id="1" name=""/>
+        <p:cNvGrpSpPr/>
+        <p:nvPr/>
+      </p:nvGrpSpPr>
+      <p:grpSpPr>
+        <a:xfrm>
+          <a:off x="0" y="0"/>
+          <a:ext cx="0" cy="0"/>
+          <a:chOff x="0" y="0"/>
+          <a:chExt cx="0" cy="0"/>
+        </a:xfrm>
+      </p:grpSpPr>
+      <p:sp>
+        <p:nvSpPr>
+          <p:cNvPr id="2" name="Pladsholder til sidehoved 1"/>
+          <p:cNvSpPr>
+            <a:spLocks noGrp="1"/>
+          </p:cNvSpPr>
+          <p:nvPr>
+            <p:ph type="hdr" sz="quarter"/>
+          </p:nvPr>
+        </p:nvSpPr>
+        <p:spPr>
+          <a:xfrm>
+            <a:off x="0" y="0"/>
+            <a:ext cx="2946400" cy="496888"/>
+          </a:xfrm>
+          <a:prstGeom prst="rect">
+            <a:avLst/>
+          </a:prstGeom>
+        </p:spPr>
+        <p:txBody>
+          <a:bodyPr vert="horz" lIns="91440" tIns="45720" rIns="91440" bIns="45720" rtlCol="0"/>
+          <a:lstStyle>
+            <a:lvl1pPr algn="l">
+              <a:defRPr sz="1200"/>
+            </a:lvl1pPr>
+          </a:lstStyle>
+          <a:p>
+            <a:endParaRPr lang="da-DK"/>
+          </a:p>
+        </p:txBody>
+      </p:sp>
+      <p:sp>
+        <p:nvSpPr>
+          <p:cNvPr id="3" name="Pladsholder til dato 2"/>
+          <p:cNvSpPr>
+            <a:spLocks noGrp="1"/>
+          </p:cNvSpPr>
+          <p:nvPr>
+            <p:ph type="dt" idx="1"/>
+          </p:nvPr>
+        </p:nvSpPr>
+        <p:spPr>
+          <a:xfrm>
+            <a:off x="3849688" y="0"/>
+            <a:ext cx="2946400" cy="496888"/>
+          </a:xfrm>
+          <a:prstGeom prst="rect">
+            <a:avLst/>
+          </a:prstGeom>
+        </p:spPr>
+        <p:txBody>
+          <a:bodyPr vert="horz" lIns="91440" tIns="45720" rIns="91440" bIns="45720" rtlCol="0"/>
+          <a:lstStyle>
+            <a:lvl1pPr algn="r">
+              <a:defRPr sz="1200"/>
+            </a:lvl1pPr>
+          </a:lstStyle>
+          <a:p>
+            <a:fld id="{150C6283-EC6C-4D4C-A4A9-62E01CB0B1D5}" type="datetimeFigureOut">
+              <a:rPr lang="da-DK" smtClean="0"/>
+              <a:t>23-03-2011</a:t>
+            </a:fld>
+            <a:endParaRPr lang="da-DK"/>
+          </a:p>
+        </p:txBody>
+      </p:sp>
+      <p:sp>
+        <p:nvSpPr>
+          <p:cNvPr id="4" name="Pladsholder til diasbillede 3"/>
+          <p:cNvSpPr>
+            <a:spLocks noGrp="1" noRot="1" noChangeAspect="1"/>
+          </p:cNvSpPr>
+          <p:nvPr>
+            <p:ph type="sldImg" idx="2"/>
+          </p:nvPr>
+        </p:nvSpPr>
+        <p:spPr>
+          <a:xfrm>
+            <a:off x="917575" y="744538"/>
+            <a:ext cx="4962525" cy="3722687"/>
+          </a:xfrm>
+          <a:prstGeom prst="rect">
+            <a:avLst/>
+          </a:prstGeom>
+          <a:noFill/>
+          <a:ln w="12700">
+            <a:solidFill>
+              <a:prstClr val="black"/>
+            </a:solidFill>
+          </a:ln>
+        </p:spPr>
+        <p:txBody>
+          <a:bodyPr vert="horz" lIns="91440" tIns="45720" rIns="91440" bIns="45720" rtlCol="0" anchor="ctr"/>
+          <a:lstStyle/>
+          <a:p>
+            <a:endParaRPr lang="da-DK"/>
+          </a:p>
+        </p:txBody>
+      </p:sp>
+      <p:sp>
+        <p:nvSpPr>
+          <p:cNvPr id="5" name="Pladsholder til noter 4"/>
+          <p:cNvSpPr>
+            <a:spLocks noGrp="1"/>
+          </p:cNvSpPr>
+          <p:nvPr>
+            <p:ph type="body" sz="quarter" idx="3"/>
+          </p:nvPr>
+        </p:nvSpPr>
+        <p:spPr>
+          <a:xfrm>
+            <a:off x="679450" y="4714875"/>
+            <a:ext cx="5438775" cy="4467225"/>
+          </a:xfrm>
+          <a:prstGeom prst="rect">
+            <a:avLst/>
+          </a:prstGeom>
+        </p:spPr>
+        <p:txBody>
+          <a:bodyPr vert="horz" lIns="91440" tIns="45720" rIns="91440" bIns="45720" rtlCol="0">
+            <a:normAutofit/>
+          </a:bodyPr>
+          <a:lstStyle/>
+          <a:p>
+            <a:pPr lvl="0"/>
+            <a:r>
+              <a:rPr lang="da-DK" smtClean="0"/>
+              <a:t>Klik for at redigere typografi i masteren</a:t>
+            </a:r>
+          </a:p>
+          <a:p>
+            <a:pPr lvl="1"/>
+            <a:r>
+              <a:rPr lang="da-DK" smtClean="0"/>
+              <a:t>Andet niveau</a:t>
+            </a:r>
+          </a:p>
+          <a:p>
+            <a:pPr lvl="2"/>
+            <a:r>
+              <a:rPr lang="da-DK" smtClean="0"/>
+              <a:t>Tredje niveau</a:t>
+            </a:r>
+          </a:p>
+          <a:p>
+            <a:pPr lvl="3"/>
+            <a:r>
+              <a:rPr lang="da-DK" smtClean="0"/>
+              <a:t>Fjerde niveau</a:t>
+            </a:r>
+          </a:p>
+          <a:p>
+            <a:pPr lvl="4"/>
+            <a:r>
+              <a:rPr lang="da-DK" smtClean="0"/>
+              <a:t>Femte niveau</a:t>
+            </a:r>
+            <a:endParaRPr lang="da-DK"/>
+          </a:p>
+        </p:txBody>
+      </p:sp>
+      <p:sp>
+        <p:nvSpPr>
+          <p:cNvPr id="6" name="Pladsholder til sidefod 5"/>
+          <p:cNvSpPr>
+            <a:spLocks noGrp="1"/>
+          </p:cNvSpPr>
+          <p:nvPr>
+            <p:ph type="ftr" sz="quarter" idx="4"/>
+          </p:nvPr>
+        </p:nvSpPr>
+        <p:spPr>
+          <a:xfrm>
+            <a:off x="0" y="9428163"/>
+            <a:ext cx="2946400" cy="496887"/>
+          </a:xfrm>
+          <a:prstGeom prst="rect">
+            <a:avLst/>
+          </a:prstGeom>
+        </p:spPr>
+        <p:txBody>
+          <a:bodyPr vert="horz" lIns="91440" tIns="45720" rIns="91440" bIns="45720" rtlCol="0" anchor="b"/>
+          <a:lstStyle>
+            <a:lvl1pPr algn="l">
+              <a:defRPr sz="1200"/>
+            </a:lvl1pPr>
+          </a:lstStyle>
+          <a:p>
+            <a:endParaRPr lang="da-DK"/>
+          </a:p>
+        </p:txBody>
+      </p:sp>
+      <p:sp>
+        <p:nvSpPr>
+          <p:cNvPr id="7" name="Pladsholder til diasnummer 6"/>
+          <p:cNvSpPr>
+            <a:spLocks noGrp="1"/>
+          </p:cNvSpPr>
+          <p:nvPr>
+            <p:ph type="sldNum" sz="quarter" idx="5"/>
+          </p:nvPr>
+        </p:nvSpPr>
+        <p:spPr>
+          <a:xfrm>
+            <a:off x="3849688" y="9428163"/>
+            <a:ext cx="2946400" cy="496887"/>
+          </a:xfrm>
+          <a:prstGeom prst="rect">
+            <a:avLst/>
+          </a:prstGeom>
+        </p:spPr>
+        <p:txBody>
+          <a:bodyPr vert="horz" lIns="91440" tIns="45720" rIns="91440" bIns="45720" rtlCol="0" anchor="b"/>
+          <a:lstStyle>
+            <a:lvl1pPr algn="r">
+              <a:defRPr sz="1200"/>
+            </a:lvl1pPr>
+          </a:lstStyle>
+          <a:p>
+            <a:fld id="{FF511A3C-A8C5-48D0-806C-6A3FDD0D7460}" type="slidenum">
+              <a:rPr lang="da-DK" smtClean="0"/>
+              <a:t>‹nr.›</a:t>
+            </a:fld>
+            <a:endParaRPr lang="da-DK"/>
+          </a:p>
+        </p:txBody>
+      </p:sp>
+    </p:spTree>
+  </p:cSld>
+  <p:clrMap bg1="lt1" tx1="dk1" bg2="lt2" tx2="dk2" accent1="accent1" accent2="accent2" accent3="accent3" accent4="accent4" accent5="accent5" accent6="accent6" hlink="hlink" folHlink="folHlink"/>
+  <p:notesStyle>
+    <a:lvl1pPr marL="0" algn="l" defTabSz="914400" rtl="0" eaLnBrk="1" latinLnBrk="0" hangingPunct="1">
+      <a:defRPr sz="1200" kern="1200">
+        <a:solidFill>
+          <a:schemeClr val="tx1"/>
+        </a:solidFill>
+        <a:latin typeface="+mn-lt"/>
+        <a:ea typeface="+mn-ea"/>
+        <a:cs typeface="+mn-cs"/>
+      </a:defRPr>
+    </a:lvl1pPr>
+    <a:lvl2pPr marL="457200" algn="l" defTabSz="914400" rtl="0" eaLnBrk="1" latinLnBrk="0" hangingPunct="1">
+      <a:defRPr sz="1200" kern="1200">
+        <a:solidFill>
+          <a:schemeClr val="tx1"/>
+        </a:solidFill>
+        <a:latin typeface="+mn-lt"/>
+        <a:ea typeface="+mn-ea"/>
+        <a:cs typeface="+mn-cs"/>
+      </a:defRPr>
+    </a:lvl2pPr>
+    <a:lvl3pPr marL="914400" algn="l" defTabSz="914400" rtl="0" eaLnBrk="1" latinLnBrk="0" hangingPunct="1">
+      <a:defRPr sz="1200" kern="1200">
+        <a:solidFill>
+          <a:schemeClr val="tx1"/>
+        </a:solidFill>
+        <a:latin typeface="+mn-lt"/>
+        <a:ea typeface="+mn-ea"/>
+        <a:cs typeface="+mn-cs"/>
+      </a:defRPr>
+    </a:lvl3pPr>
+    <a:lvl4pPr marL="1371600" algn="l" defTabSz="914400" rtl="0" eaLnBrk="1" latinLnBrk="0" hangingPunct="1">
+      <a:defRPr sz="1200" kern="1200">
+        <a:solidFill>
+          <a:schemeClr val="tx1"/>
+        </a:solidFill>
+        <a:latin typeface="+mn-lt"/>
+        <a:ea typeface="+mn-ea"/>
+        <a:cs typeface="+mn-cs"/>
+      </a:defRPr>
+    </a:lvl4pPr>
+    <a:lvl5pPr marL="1828800" algn="l" defTabSz="914400" rtl="0" eaLnBrk="1" latinLnBrk="0" hangingPunct="1">
+      <a:defRPr sz="1200" kern="1200">
+        <a:solidFill>
+          <a:schemeClr val="tx1"/>
+        </a:solidFill>
+        <a:latin typeface="+mn-lt"/>
+        <a:ea typeface="+mn-ea"/>
+        <a:cs typeface="+mn-cs"/>
+      </a:defRPr>
+    </a:lvl5pPr>
+    <a:lvl6pPr marL="2286000" algn="l" defTabSz="914400" rtl="0" eaLnBrk="1" latinLnBrk="0" hangingPunct="1">
+      <a:defRPr sz="1200" kern="1200">
+        <a:solidFill>
+          <a:schemeClr val="tx1"/>
+        </a:solidFill>
+        <a:latin typeface="+mn-lt"/>
+        <a:ea typeface="+mn-ea"/>
+        <a:cs typeface="+mn-cs"/>
+      </a:defRPr>
+    </a:lvl6pPr>
+    <a:lvl7pPr marL="2743200" algn="l" defTabSz="914400" rtl="0" eaLnBrk="1" latinLnBrk="0" hangingPunct="1">
+      <a:defRPr sz="1200" kern="1200">
+        <a:solidFill>
+          <a:schemeClr val="tx1"/>
+        </a:solidFill>
+        <a:latin typeface="+mn-lt"/>
+        <a:ea typeface="+mn-ea"/>
+        <a:cs typeface="+mn-cs"/>
+      </a:defRPr>
+    </a:lvl7pPr>
+    <a:lvl8pPr marL="3200400" algn="l" defTabSz="914400" rtl="0" eaLnBrk="1" latinLnBrk="0" hangingPunct="1">
+      <a:defRPr sz="1200" kern="1200">
+        <a:solidFill>
+          <a:schemeClr val="tx1"/>
+        </a:solidFill>
+        <a:latin typeface="+mn-lt"/>
+        <a:ea typeface="+mn-ea"/>
+        <a:cs typeface="+mn-cs"/>
+      </a:defRPr>
+    </a:lvl8pPr>
+    <a:lvl9pPr marL="3657600" algn="l" defTabSz="914400" rtl="0" eaLnBrk="1" latinLnBrk="0" hangingPunct="1">
+      <a:defRPr sz="1200" kern="1200">
+        <a:solidFill>
+          <a:schemeClr val="tx1"/>
+        </a:solidFill>
+        <a:latin typeface="+mn-lt"/>
+        <a:ea typeface="+mn-ea"/>
+        <a:cs typeface="+mn-cs"/>
+      </a:defRPr>
+    </a:lvl9pPr>
+  </p:notesStyle>
+</p:notesMaster>
+</file>
+
+<file path=ppt/notesSlides/notesSlide1.xml><?xml version="1.0" encoding="utf-8"?>
+<p:notes xmlns:a="http://schemas.openxmlformats.org/drawingml/2006/main" xmlns:r="http://schemas.openxmlformats.org/officeDocument/2006/relationships" xmlns:p="http://schemas.openxmlformats.org/presentationml/2006/main">
+  <p:cSld>
+    <p:spTree>
+      <p:nvGrpSpPr>
+        <p:cNvPr id="1" name=""/>
+        <p:cNvGrpSpPr/>
+        <p:nvPr/>
+      </p:nvGrpSpPr>
+      <p:grpSpPr>
+        <a:xfrm>
+          <a:off x="0" y="0"/>
+          <a:ext cx="0" cy="0"/>
+          <a:chOff x="0" y="0"/>
+          <a:chExt cx="0" cy="0"/>
+        </a:xfrm>
+      </p:grpSpPr>
+      <p:sp>
+        <p:nvSpPr>
+          <p:cNvPr id="2" name="Pladsholder til diasbillede 1"/>
+          <p:cNvSpPr>
+            <a:spLocks noGrp="1" noRot="1" noChangeAspect="1"/>
+          </p:cNvSpPr>
+          <p:nvPr>
+            <p:ph type="sldImg"/>
+          </p:nvPr>
+        </p:nvSpPr>
+        <p:spPr/>
+      </p:sp>
+      <p:sp>
+        <p:nvSpPr>
+          <p:cNvPr id="3" name="Pladsholder til noter 2"/>
+          <p:cNvSpPr>
+            <a:spLocks noGrp="1"/>
+          </p:cNvSpPr>
+          <p:nvPr>
+            <p:ph type="body" idx="1"/>
+          </p:nvPr>
+        </p:nvSpPr>
+        <p:spPr/>
+        <p:txBody>
+          <a:bodyPr>
+            <a:normAutofit/>
+          </a:bodyPr>
+          <a:lstStyle/>
+          <a:p>
+            <a:endParaRPr lang="da-DK"/>
+          </a:p>
+        </p:txBody>
+      </p:sp>
+      <p:sp>
+        <p:nvSpPr>
+          <p:cNvPr id="4" name="Pladsholder til diasnummer 3"/>
+          <p:cNvSpPr>
+            <a:spLocks noGrp="1"/>
+          </p:cNvSpPr>
+          <p:nvPr>
+            <p:ph type="sldNum" sz="quarter" idx="10"/>
+          </p:nvPr>
+        </p:nvSpPr>
+        <p:spPr/>
+        <p:txBody>
+          <a:bodyPr/>
+          <a:lstStyle/>
+          <a:p>
+            <a:fld id="{FF511A3C-A8C5-48D0-806C-6A3FDD0D7460}" type="slidenum">
+              <a:rPr lang="da-DK" smtClean="0"/>
+              <a:t>1</a:t>
+            </a:fld>
+            <a:endParaRPr lang="da-DK"/>
+          </a:p>
+        </p:txBody>
+      </p:sp>
+    </p:spTree>
+  </p:cSld>
+  <p:clrMapOvr>
+    <a:masterClrMapping/>
+  </p:clrMapOvr>
+</p:notes>
 </file>
 
 <file path=ppt/slideLayouts/slideLayout1.xml><?xml version="1.0" encoding="utf-8"?>
@@ -552,12 +984,9 @@
             <a:pPr>
               <a:defRPr/>
             </a:pPr>
-            <a:fld id="{DBEC9EB9-F934-44EE-B5EC-CBD00CCD4D1F}" type="datetimeFigureOut">
-              <a:rPr lang="da-DK"/>
-              <a:pPr>
-                <a:defRPr/>
-              </a:pPr>
-              <a:t>22-03-2011</a:t>
+            <a:fld id="{9255B89D-5513-4C10-B7BC-899DFBFD75C5}" type="datetime1">
+              <a:rPr lang="da-DK" smtClean="0"/>
+              <a:t>23-03-2011</a:t>
             </a:fld>
             <a:endParaRPr lang="da-DK"/>
           </a:p>
@@ -744,12 +1173,9 @@
             <a:pPr>
               <a:defRPr/>
             </a:pPr>
-            <a:fld id="{ECEB8837-3969-4BB7-B025-85EDB3C7B7C1}" type="datetimeFigureOut">
-              <a:rPr lang="da-DK"/>
-              <a:pPr>
-                <a:defRPr/>
-              </a:pPr>
-              <a:t>22-03-2011</a:t>
+            <a:fld id="{A52A3103-9420-425B-9B9B-AF7F91A337F5}" type="datetime1">
+              <a:rPr lang="da-DK" smtClean="0"/>
+              <a:t>23-03-2011</a:t>
             </a:fld>
             <a:endParaRPr lang="da-DK"/>
           </a:p>
@@ -946,12 +1372,9 @@
             <a:pPr>
               <a:defRPr/>
             </a:pPr>
-            <a:fld id="{8F9BFC38-A9A9-4E81-AF7C-78949233F06E}" type="datetimeFigureOut">
-              <a:rPr lang="da-DK"/>
-              <a:pPr>
-                <a:defRPr/>
-              </a:pPr>
-              <a:t>22-03-2011</a:t>
+            <a:fld id="{D16AC727-AE31-460A-A5E6-02B9ACCE974A}" type="datetime1">
+              <a:rPr lang="da-DK" smtClean="0"/>
+              <a:t>23-03-2011</a:t>
             </a:fld>
             <a:endParaRPr lang="da-DK"/>
           </a:p>
@@ -1262,12 +1685,9 @@
             <a:pPr>
               <a:defRPr/>
             </a:pPr>
-            <a:fld id="{8EEF2744-5DF2-4B8E-B9DA-99B9D0EA922B}" type="datetimeFigureOut">
-              <a:rPr lang="da-DK"/>
-              <a:pPr>
-                <a:defRPr/>
-              </a:pPr>
-              <a:t>22-03-2011</a:t>
+            <a:fld id="{A572AB9A-EA79-4AD5-8815-52F3480ED94F}" type="datetime1">
+              <a:rPr lang="da-DK" smtClean="0"/>
+              <a:t>23-03-2011</a:t>
             </a:fld>
             <a:endParaRPr lang="da-DK"/>
           </a:p>
@@ -1521,12 +1941,9 @@
             <a:pPr>
               <a:defRPr/>
             </a:pPr>
-            <a:fld id="{3D8B64E1-50E2-4139-BD3E-E1DAB101DDDB}" type="datetimeFigureOut">
-              <a:rPr lang="da-DK"/>
-              <a:pPr>
-                <a:defRPr/>
-              </a:pPr>
-              <a:t>22-03-2011</a:t>
+            <a:fld id="{353A0596-E7CC-43F4-936B-16684695A112}" type="datetime1">
+              <a:rPr lang="da-DK" smtClean="0"/>
+              <a:t>23-03-2011</a:t>
             </a:fld>
             <a:endParaRPr lang="da-DK"/>
           </a:p>
@@ -1695,12 +2112,9 @@
             <a:pPr>
               <a:defRPr/>
             </a:pPr>
-            <a:fld id="{DB350179-CC78-4ACF-AA03-3763742722EA}" type="datetimeFigureOut">
-              <a:rPr lang="da-DK"/>
-              <a:pPr>
-                <a:defRPr/>
-              </a:pPr>
-              <a:t>22-03-2011</a:t>
+            <a:fld id="{5092D5AA-C70B-42A7-B166-9B62CA967279}" type="datetime1">
+              <a:rPr lang="da-DK" smtClean="0"/>
+              <a:t>23-03-2011</a:t>
             </a:fld>
             <a:endParaRPr lang="da-DK"/>
           </a:p>
@@ -1887,12 +2301,9 @@
             <a:pPr>
               <a:defRPr/>
             </a:pPr>
-            <a:fld id="{95D5E78C-1905-4221-860E-D37A6959CAE2}" type="datetimeFigureOut">
-              <a:rPr lang="da-DK"/>
-              <a:pPr>
-                <a:defRPr/>
-              </a:pPr>
-              <a:t>22-03-2011</a:t>
+            <a:fld id="{C4561886-9F1D-4C8A-9F84-52CDD4D21C2A}" type="datetime1">
+              <a:rPr lang="da-DK" smtClean="0"/>
+              <a:t>23-03-2011</a:t>
             </a:fld>
             <a:endParaRPr lang="da-DK"/>
           </a:p>
@@ -2155,12 +2566,9 @@
             <a:pPr>
               <a:defRPr/>
             </a:pPr>
-            <a:fld id="{172F7EA2-D644-48E7-B24F-CE7DBF0F4ECA}" type="datetimeFigureOut">
-              <a:rPr lang="da-DK"/>
-              <a:pPr>
-                <a:defRPr/>
-              </a:pPr>
-              <a:t>22-03-2011</a:t>
+            <a:fld id="{754FB3CB-C4A4-4853-AF90-36B93B37E82A}" type="datetime1">
+              <a:rPr lang="da-DK" smtClean="0"/>
+              <a:t>23-03-2011</a:t>
             </a:fld>
             <a:endParaRPr lang="da-DK"/>
           </a:p>
@@ -2465,12 +2873,9 @@
             <a:pPr>
               <a:defRPr/>
             </a:pPr>
-            <a:fld id="{FB50F49F-E208-497A-A915-6CFBE0D1347D}" type="datetimeFigureOut">
-              <a:rPr lang="da-DK"/>
-              <a:pPr>
-                <a:defRPr/>
-              </a:pPr>
-              <a:t>22-03-2011</a:t>
+            <a:fld id="{72647F51-37D7-4094-A151-8AA432E3F4B3}" type="datetime1">
+              <a:rPr lang="da-DK" smtClean="0"/>
+              <a:t>23-03-2011</a:t>
             </a:fld>
             <a:endParaRPr lang="da-DK"/>
           </a:p>
@@ -2909,12 +3314,9 @@
             <a:pPr>
               <a:defRPr/>
             </a:pPr>
-            <a:fld id="{448BA0D3-44D1-4193-A785-A197FC687E19}" type="datetimeFigureOut">
-              <a:rPr lang="da-DK"/>
-              <a:pPr>
-                <a:defRPr/>
-              </a:pPr>
-              <a:t>22-03-2011</a:t>
+            <a:fld id="{FE3EEEF7-3D61-4DA8-8A08-6E037F317103}" type="datetime1">
+              <a:rPr lang="da-DK" smtClean="0"/>
+              <a:t>23-03-2011</a:t>
             </a:fld>
             <a:endParaRPr lang="da-DK"/>
           </a:p>
@@ -3049,12 +3451,9 @@
             <a:pPr>
               <a:defRPr/>
             </a:pPr>
-            <a:fld id="{56E2DFE3-C63E-4C0B-9006-C698DE36D2D8}" type="datetimeFigureOut">
-              <a:rPr lang="da-DK"/>
-              <a:pPr>
-                <a:defRPr/>
-              </a:pPr>
-              <a:t>22-03-2011</a:t>
+            <a:fld id="{D010CB87-37CC-4C01-B66D-6F6EF341866E}" type="datetime1">
+              <a:rPr lang="da-DK" smtClean="0"/>
+              <a:t>23-03-2011</a:t>
             </a:fld>
             <a:endParaRPr lang="da-DK"/>
           </a:p>
@@ -3166,12 +3565,9 @@
             <a:pPr>
               <a:defRPr/>
             </a:pPr>
-            <a:fld id="{9A42DAE6-2A82-40B1-90F1-C8613FCF74D7}" type="datetimeFigureOut">
-              <a:rPr lang="da-DK"/>
-              <a:pPr>
-                <a:defRPr/>
-              </a:pPr>
-              <a:t>22-03-2011</a:t>
+            <a:fld id="{FD8B9D75-0E0F-4254-9696-D2756DF25289}" type="datetime1">
+              <a:rPr lang="da-DK" smtClean="0"/>
+              <a:t>23-03-2011</a:t>
             </a:fld>
             <a:endParaRPr lang="da-DK"/>
           </a:p>
@@ -3465,12 +3861,9 @@
             <a:pPr>
               <a:defRPr/>
             </a:pPr>
-            <a:fld id="{78C5426D-3BBE-42D0-8299-97D48880A097}" type="datetimeFigureOut">
-              <a:rPr lang="da-DK"/>
-              <a:pPr>
-                <a:defRPr/>
-              </a:pPr>
-              <a:t>22-03-2011</a:t>
+            <a:fld id="{6A000EA5-D43A-4E14-9898-943A1EF0ECF2}" type="datetime1">
+              <a:rPr lang="da-DK" smtClean="0"/>
+              <a:t>23-03-2011</a:t>
             </a:fld>
             <a:endParaRPr lang="da-DK"/>
           </a:p>
@@ -3743,12 +4136,9 @@
             <a:pPr>
               <a:defRPr/>
             </a:pPr>
-            <a:fld id="{DC58B831-7B65-4181-A98E-B74E2CC247BA}" type="datetimeFigureOut">
-              <a:rPr lang="da-DK"/>
-              <a:pPr>
-                <a:defRPr/>
-              </a:pPr>
-              <a:t>22-03-2011</a:t>
+            <a:fld id="{F5352F8A-D794-4D54-B814-ABA9C702EA20}" type="datetime1">
+              <a:rPr lang="da-DK" smtClean="0"/>
+              <a:t>23-03-2011</a:t>
             </a:fld>
             <a:endParaRPr lang="da-DK"/>
           </a:p>
@@ -3998,12 +4388,9 @@
             <a:pPr>
               <a:defRPr/>
             </a:pPr>
-            <a:fld id="{7B7F726D-79E7-4CE6-ACF2-6A898BFFA7D2}" type="datetimeFigureOut">
-              <a:rPr lang="da-DK"/>
-              <a:pPr>
-                <a:defRPr/>
-              </a:pPr>
-              <a:t>22-03-2011</a:t>
+            <a:fld id="{687117F0-EFE0-41AD-A339-A736C0A86F6E}" type="datetime1">
+              <a:rPr lang="da-DK" smtClean="0"/>
+              <a:t>23-03-2011</a:t>
             </a:fld>
             <a:endParaRPr lang="da-DK"/>
           </a:p>
@@ -4129,6 +4516,7 @@
     <p:sldLayoutId id="2147483650" r:id="rId13"/>
     <p:sldLayoutId id="2147483649" r:id="rId14"/>
   </p:sldLayoutIdLst>
+  <p:hf sldNum="0" hdr="0" ftr="0" dt="0"/>
   <p:txStyles>
     <p:titleStyle>
       <a:lvl1pPr algn="ctr" rtl="0" eaLnBrk="0" fontAlgn="base" hangingPunct="0">
@@ -4583,6 +4971,36 @@
           </a:p>
         </p:txBody>
       </p:sp>
+      <p:sp>
+        <p:nvSpPr>
+          <p:cNvPr id="4" name="Tekstboks 3"/>
+          <p:cNvSpPr txBox="1"/>
+          <p:nvPr/>
+        </p:nvSpPr>
+        <p:spPr>
+          <a:xfrm>
+            <a:off x="8172400" y="116632"/>
+            <a:ext cx="851515" cy="369332"/>
+          </a:xfrm>
+          <a:prstGeom prst="rect">
+            <a:avLst/>
+          </a:prstGeom>
+          <a:noFill/>
+        </p:spPr>
+        <p:txBody>
+          <a:bodyPr wrap="none" rtlCol="0">
+            <a:spAutoFit/>
+          </a:bodyPr>
+          <a:lstStyle/>
+          <a:p>
+            <a:r>
+              <a:rPr lang="da-DK" dirty="0" smtClean="0"/>
+              <a:t>A;0:00</a:t>
+            </a:r>
+            <a:endParaRPr lang="da-DK" dirty="0"/>
+          </a:p>
+        </p:txBody>
+      </p:sp>
     </p:spTree>
   </p:cSld>
   <p:clrMapOvr>
@@ -4617,7 +5035,7 @@
       </p:grpSpPr>
       <p:sp>
         <p:nvSpPr>
-          <p:cNvPr id="2" name="Titel 1"/>
+          <p:cNvPr id="43010" name="Rectangle 2"/>
           <p:cNvSpPr>
             <a:spLocks noGrp="1"/>
           </p:cNvSpPr>
@@ -4632,33 +5050,53 @@
           <a:p>
             <a:r>
               <a:rPr lang="da-DK" dirty="0" smtClean="0"/>
-              <a:t>Risiko analyse</a:t>
-            </a:r>
-            <a:endParaRPr lang="da-DK" dirty="0"/>
+              <a:t>Kvalitetsattributter</a:t>
+            </a:r>
+            <a:endParaRPr lang="da-DK" dirty="0" smtClean="0"/>
           </a:p>
         </p:txBody>
       </p:sp>
       <p:pic>
         <p:nvPicPr>
-          <p:cNvPr id="4" name="Pladsholder til indhold 3"/>
+          <p:cNvPr id="43011" name="Picture 3"/>
           <p:cNvPicPr>
-            <a:picLocks noGrp="1"/>
+            <a:picLocks noGrp="1" noChangeAspect="1" noChangeArrowheads="1"/>
           </p:cNvPicPr>
           <p:nvPr>
-            <p:ph idx="1"/>
+            <p:ph type="body" idx="1"/>
           </p:nvPr>
         </p:nvPicPr>
         <p:blipFill>
           <a:blip r:embed="rId2" cstate="print"/>
-          <a:srcRect l="920"/>
+          <a:srcRect l="1871" t="29253" r="4495" b="30972"/>
+          <a:stretch>
+            <a:fillRect/>
+          </a:stretch>
+        </p:blipFill>
+        <p:spPr>
+          <a:xfrm>
+            <a:off x="755576" y="1628800"/>
+            <a:ext cx="7705725" cy="1800225"/>
+          </a:xfrm>
+        </p:spPr>
+      </p:pic>
+      <p:pic>
+        <p:nvPicPr>
+          <p:cNvPr id="4" name="Billede 3" descr="ironTriangle"/>
+          <p:cNvPicPr/>
+          <p:nvPr/>
+        </p:nvPicPr>
+        <p:blipFill>
+          <a:blip r:embed="rId3" cstate="print"/>
+          <a:srcRect/>
           <a:stretch>
             <a:fillRect/>
           </a:stretch>
         </p:blipFill>
         <p:spPr bwMode="auto">
           <a:xfrm>
-            <a:off x="1043608" y="1772816"/>
-            <a:ext cx="7200800" cy="4320480"/>
+            <a:off x="3059832" y="3717032"/>
+            <a:ext cx="2495550" cy="1562100"/>
           </a:xfrm>
           <a:prstGeom prst="rect">
             <a:avLst/>
@@ -4672,11 +5110,86 @@
           </a:ln>
         </p:spPr>
       </p:pic>
+      <p:sp>
+        <p:nvSpPr>
+          <p:cNvPr id="5" name="Tekstboks 4"/>
+          <p:cNvSpPr txBox="1"/>
+          <p:nvPr/>
+        </p:nvSpPr>
+        <p:spPr>
+          <a:xfrm>
+            <a:off x="7740352" y="116632"/>
+            <a:ext cx="1296144" cy="369332"/>
+          </a:xfrm>
+          <a:prstGeom prst="rect">
+            <a:avLst/>
+          </a:prstGeom>
+          <a:noFill/>
+        </p:spPr>
+        <p:txBody>
+          <a:bodyPr wrap="square" rtlCol="0">
+            <a:spAutoFit/>
+          </a:bodyPr>
+          <a:lstStyle/>
+          <a:p>
+            <a:r>
+              <a:rPr lang="da-DK" dirty="0" smtClean="0"/>
+              <a:t>A;5:20(30)</a:t>
+            </a:r>
+            <a:endParaRPr lang="da-DK" dirty="0"/>
+          </a:p>
+        </p:txBody>
+      </p:sp>
+      <p:sp>
+        <p:nvSpPr>
+          <p:cNvPr id="6" name="Tekstboks 5"/>
+          <p:cNvSpPr txBox="1"/>
+          <p:nvPr/>
+        </p:nvSpPr>
+        <p:spPr>
+          <a:xfrm>
+            <a:off x="683568" y="5733256"/>
+            <a:ext cx="3698448" cy="369332"/>
+          </a:xfrm>
+          <a:prstGeom prst="rect">
+            <a:avLst/>
+          </a:prstGeom>
+          <a:noFill/>
+        </p:spPr>
+        <p:txBody>
+          <a:bodyPr wrap="none" rtlCol="0">
+            <a:spAutoFit/>
+          </a:bodyPr>
+          <a:lstStyle/>
+          <a:p>
+            <a:r>
+              <a:rPr lang="da-DK" dirty="0" smtClean="0"/>
+              <a:t>Evt. tilføj </a:t>
+            </a:r>
+            <a:r>
+              <a:rPr lang="da-DK" dirty="0" err="1" smtClean="0"/>
+              <a:t>Cost</a:t>
+            </a:r>
+            <a:r>
+              <a:rPr lang="da-DK" dirty="0" smtClean="0"/>
+              <a:t> (Forretningsattribut)</a:t>
+            </a:r>
+            <a:endParaRPr lang="da-DK" dirty="0"/>
+          </a:p>
+        </p:txBody>
+      </p:sp>
     </p:spTree>
   </p:cSld>
   <p:clrMapOvr>
     <a:masterClrMapping/>
   </p:clrMapOvr>
+  <p:timing>
+    <p:tnLst>
+      <p:par>
+        <p:cTn id="1" dur="indefinite" restart="never" nodeType="tmRoot"/>
+      </p:par>
+    </p:tnLst>
+  </p:timing>
 </p:sld>
 </file>
 
@@ -4713,9 +5226,10 @@
           <a:lstStyle/>
           <a:p>
             <a:r>
-              <a:rPr lang="da-DK" smtClean="0"/>
+              <a:rPr lang="da-DK" dirty="0" err="1" smtClean="0"/>
               <a:t>SysML</a:t>
             </a:r>
+            <a:endParaRPr lang="da-DK" dirty="0" smtClean="0"/>
           </a:p>
         </p:txBody>
       </p:sp>
@@ -4774,6 +5288,36 @@
           </a:graphicData>
         </a:graphic>
       </p:graphicFrame>
+      <p:sp>
+        <p:nvSpPr>
+          <p:cNvPr id="5" name="Tekstboks 4"/>
+          <p:cNvSpPr txBox="1"/>
+          <p:nvPr/>
+        </p:nvSpPr>
+        <p:spPr>
+          <a:xfrm>
+            <a:off x="7740352" y="116632"/>
+            <a:ext cx="1296144" cy="369332"/>
+          </a:xfrm>
+          <a:prstGeom prst="rect">
+            <a:avLst/>
+          </a:prstGeom>
+          <a:noFill/>
+        </p:spPr>
+        <p:txBody>
+          <a:bodyPr wrap="square" rtlCol="0">
+            <a:spAutoFit/>
+          </a:bodyPr>
+          <a:lstStyle/>
+          <a:p>
+            <a:r>
+              <a:rPr lang="da-DK" dirty="0" smtClean="0"/>
+              <a:t>A;6:20(60)</a:t>
+            </a:r>
+            <a:endParaRPr lang="da-DK" dirty="0"/>
+          </a:p>
+        </p:txBody>
+      </p:sp>
     </p:spTree>
   </p:cSld>
   <p:clrMapOvr>
@@ -4933,6 +5477,36 @@
           </a:graphicData>
         </a:graphic>
       </p:graphicFrame>
+      <p:sp>
+        <p:nvSpPr>
+          <p:cNvPr id="6" name="Tekstboks 5"/>
+          <p:cNvSpPr txBox="1"/>
+          <p:nvPr/>
+        </p:nvSpPr>
+        <p:spPr>
+          <a:xfrm>
+            <a:off x="7740352" y="116632"/>
+            <a:ext cx="1296144" cy="369332"/>
+          </a:xfrm>
+          <a:prstGeom prst="rect">
+            <a:avLst/>
+          </a:prstGeom>
+          <a:noFill/>
+        </p:spPr>
+        <p:txBody>
+          <a:bodyPr wrap="square" rtlCol="0">
+            <a:spAutoFit/>
+          </a:bodyPr>
+          <a:lstStyle/>
+          <a:p>
+            <a:r>
+              <a:rPr lang="da-DK" dirty="0" smtClean="0"/>
+              <a:t>A;7:20(60)</a:t>
+            </a:r>
+            <a:endParaRPr lang="da-DK" dirty="0"/>
+          </a:p>
+        </p:txBody>
+      </p:sp>
     </p:spTree>
   </p:cSld>
   <p:clrMapOvr>
@@ -5027,6 +5601,36 @@
           <a:effectLst/>
         </p:spPr>
       </p:pic>
+      <p:sp>
+        <p:nvSpPr>
+          <p:cNvPr id="4" name="Tekstboks 3"/>
+          <p:cNvSpPr txBox="1"/>
+          <p:nvPr/>
+        </p:nvSpPr>
+        <p:spPr>
+          <a:xfrm>
+            <a:off x="7740352" y="116632"/>
+            <a:ext cx="1296144" cy="369332"/>
+          </a:xfrm>
+          <a:prstGeom prst="rect">
+            <a:avLst/>
+          </a:prstGeom>
+          <a:noFill/>
+        </p:spPr>
+        <p:txBody>
+          <a:bodyPr wrap="square" rtlCol="0">
+            <a:spAutoFit/>
+          </a:bodyPr>
+          <a:lstStyle/>
+          <a:p>
+            <a:r>
+              <a:rPr lang="da-DK" dirty="0" smtClean="0"/>
+              <a:t>J;8:20(60)</a:t>
+            </a:r>
+            <a:endParaRPr lang="da-DK" dirty="0"/>
+          </a:p>
+        </p:txBody>
+      </p:sp>
     </p:spTree>
   </p:cSld>
   <p:clrMapOvr>
@@ -5106,7 +5710,7 @@
         </p:nvGraphicFramePr>
         <p:xfrm>
           <a:off x="457200" y="1600200"/>
-          <a:ext cx="8229600" cy="2761488"/>
+          <a:ext cx="8229600" cy="2736787"/>
         </p:xfrm>
         <a:graphic>
           <a:graphicData uri="http://schemas.openxmlformats.org/drawingml/2006/table">
@@ -5632,6 +6236,36 @@
           </a:p>
         </p:txBody>
       </p:sp>
+      <p:sp>
+        <p:nvSpPr>
+          <p:cNvPr id="6" name="Tekstboks 5"/>
+          <p:cNvSpPr txBox="1"/>
+          <p:nvPr/>
+        </p:nvSpPr>
+        <p:spPr>
+          <a:xfrm>
+            <a:off x="7740352" y="116632"/>
+            <a:ext cx="1296144" cy="369332"/>
+          </a:xfrm>
+          <a:prstGeom prst="rect">
+            <a:avLst/>
+          </a:prstGeom>
+          <a:noFill/>
+        </p:spPr>
+        <p:txBody>
+          <a:bodyPr wrap="square" rtlCol="0">
+            <a:spAutoFit/>
+          </a:bodyPr>
+          <a:lstStyle/>
+          <a:p>
+            <a:r>
+              <a:rPr lang="da-DK" dirty="0" smtClean="0"/>
+              <a:t>A;9:20(60)</a:t>
+            </a:r>
+            <a:endParaRPr lang="da-DK" dirty="0"/>
+          </a:p>
+        </p:txBody>
+      </p:sp>
     </p:spTree>
   </p:cSld>
   <p:clrMapOvr>
@@ -5704,6 +6338,36 @@
           </a:graphicData>
         </a:graphic>
       </p:graphicFrame>
+      <p:sp>
+        <p:nvSpPr>
+          <p:cNvPr id="5" name="Tekstboks 4"/>
+          <p:cNvSpPr txBox="1"/>
+          <p:nvPr/>
+        </p:nvSpPr>
+        <p:spPr>
+          <a:xfrm>
+            <a:off x="7668344" y="116632"/>
+            <a:ext cx="1368152" cy="369332"/>
+          </a:xfrm>
+          <a:prstGeom prst="rect">
+            <a:avLst/>
+          </a:prstGeom>
+          <a:noFill/>
+        </p:spPr>
+        <p:txBody>
+          <a:bodyPr wrap="square" rtlCol="0">
+            <a:spAutoFit/>
+          </a:bodyPr>
+          <a:lstStyle/>
+          <a:p>
+            <a:r>
+              <a:rPr lang="da-DK" dirty="0" smtClean="0"/>
+              <a:t>J;10:20(60)</a:t>
+            </a:r>
+            <a:endParaRPr lang="da-DK" dirty="0"/>
+          </a:p>
+        </p:txBody>
+      </p:sp>
     </p:spTree>
   </p:cSld>
   <p:clrMapOvr>
@@ -5809,6 +6473,36 @@
           </a:graphicData>
         </a:graphic>
       </p:graphicFrame>
+      <p:sp>
+        <p:nvSpPr>
+          <p:cNvPr id="5" name="Tekstboks 4"/>
+          <p:cNvSpPr txBox="1"/>
+          <p:nvPr/>
+        </p:nvSpPr>
+        <p:spPr>
+          <a:xfrm>
+            <a:off x="7668344" y="116632"/>
+            <a:ext cx="1368152" cy="369332"/>
+          </a:xfrm>
+          <a:prstGeom prst="rect">
+            <a:avLst/>
+          </a:prstGeom>
+          <a:noFill/>
+        </p:spPr>
+        <p:txBody>
+          <a:bodyPr wrap="square" rtlCol="0">
+            <a:spAutoFit/>
+          </a:bodyPr>
+          <a:lstStyle/>
+          <a:p>
+            <a:r>
+              <a:rPr lang="da-DK" dirty="0" smtClean="0"/>
+              <a:t>S;11:20(60)</a:t>
+            </a:r>
+            <a:endParaRPr lang="da-DK" dirty="0"/>
+          </a:p>
+        </p:txBody>
+      </p:sp>
     </p:spTree>
   </p:cSld>
   <p:clrMapOvr>
@@ -5923,6 +6617,36 @@
           </a:graphicData>
         </a:graphic>
       </p:graphicFrame>
+      <p:sp>
+        <p:nvSpPr>
+          <p:cNvPr id="5" name="Tekstboks 4"/>
+          <p:cNvSpPr txBox="1"/>
+          <p:nvPr/>
+        </p:nvSpPr>
+        <p:spPr>
+          <a:xfrm>
+            <a:off x="7596336" y="116632"/>
+            <a:ext cx="1440160" cy="369332"/>
+          </a:xfrm>
+          <a:prstGeom prst="rect">
+            <a:avLst/>
+          </a:prstGeom>
+          <a:noFill/>
+        </p:spPr>
+        <p:txBody>
+          <a:bodyPr wrap="square" rtlCol="0">
+            <a:spAutoFit/>
+          </a:bodyPr>
+          <a:lstStyle/>
+          <a:p>
+            <a:r>
+              <a:rPr lang="da-DK" dirty="0" smtClean="0"/>
+              <a:t>S;12:20(60)</a:t>
+            </a:r>
+            <a:endParaRPr lang="da-DK" dirty="0"/>
+          </a:p>
+        </p:txBody>
+      </p:sp>
     </p:spTree>
   </p:cSld>
   <p:clrMapOvr>
@@ -5988,7 +6712,12 @@
             <p:ph idx="1"/>
           </p:nvPr>
         </p:nvSpPr>
-        <p:spPr/>
+        <p:spPr>
+          <a:xfrm>
+            <a:off x="395536" y="1340768"/>
+            <a:ext cx="8229600" cy="4525963"/>
+          </a:xfrm>
+        </p:spPr>
         <p:txBody>
           <a:bodyPr/>
           <a:lstStyle/>
@@ -6005,8 +6734,21 @@
             </a:r>
             <a:r>
               <a:rPr lang="da-DK" dirty="0" smtClean="0"/>
-              <a:t> er et godt udkast til et fælles SW og HW sprog, men mangler noget modning (MARTE).</a:t>
-            </a:r>
+              <a:t> er et godt udkast til et fælles SW og HW </a:t>
+            </a:r>
+            <a:r>
+              <a:rPr lang="da-DK" dirty="0" smtClean="0"/>
+              <a:t>modelleringssprog</a:t>
+            </a:r>
+            <a:r>
+              <a:rPr lang="da-DK" dirty="0" smtClean="0"/>
+              <a:t>, men mangler noget </a:t>
+            </a:r>
+            <a:r>
+              <a:rPr lang="da-DK" dirty="0" smtClean="0"/>
+              <a:t>modning.</a:t>
+            </a:r>
+            <a:endParaRPr lang="da-DK" dirty="0" smtClean="0"/>
           </a:p>
           <a:p>
             <a:r>
@@ -6032,6 +6774,36 @@
             <a:r>
               <a:rPr lang="da-DK" dirty="0" smtClean="0"/>
               <a:t>)</a:t>
+            </a:r>
+            <a:endParaRPr lang="da-DK" dirty="0"/>
+          </a:p>
+        </p:txBody>
+      </p:sp>
+      <p:sp>
+        <p:nvSpPr>
+          <p:cNvPr id="5" name="Tekstboks 4"/>
+          <p:cNvSpPr txBox="1"/>
+          <p:nvPr/>
+        </p:nvSpPr>
+        <p:spPr>
+          <a:xfrm>
+            <a:off x="7596336" y="116632"/>
+            <a:ext cx="1440160" cy="369332"/>
+          </a:xfrm>
+          <a:prstGeom prst="rect">
+            <a:avLst/>
+          </a:prstGeom>
+          <a:noFill/>
+        </p:spPr>
+        <p:txBody>
+          <a:bodyPr wrap="square" rtlCol="0">
+            <a:spAutoFit/>
+          </a:bodyPr>
+          <a:lstStyle/>
+          <a:p>
+            <a:r>
+              <a:rPr lang="da-DK" dirty="0" smtClean="0"/>
+              <a:t>S;13:00(40)</a:t>
             </a:r>
             <a:endParaRPr lang="da-DK" dirty="0"/>
           </a:p>
@@ -6150,15 +6922,15 @@
             </a:r>
             <a:r>
               <a:rPr lang="da-DK" dirty="0" smtClean="0"/>
-              <a:t> på 5-10000 stk. er det værd at betale lidt ekstra for </a:t>
-            </a:r>
-            <a:r>
-              <a:rPr lang="da-DK" smtClean="0"/>
-              <a:t>lavere risiko </a:t>
-            </a:r>
-            <a:r>
-              <a:rPr lang="da-DK" dirty="0" smtClean="0"/>
-              <a:t>(eksempel kode og mulighed for assistance samt simplere kommunikation). Anbefaling: CC430 med SKY ISM </a:t>
+              <a:t> på </a:t>
+            </a:r>
+            <a:r>
+              <a:rPr lang="da-DK" dirty="0" smtClean="0"/>
+              <a:t>5k-10k </a:t>
+            </a:r>
+            <a:r>
+              <a:rPr lang="da-DK" dirty="0" smtClean="0"/>
+              <a:t>stk. er det værd at betale lidt ekstra for lavere risiko (eksempel kode og mulighed for assistance samt simplere kommunikation). Anbefaling: CC430 med SKY ISM </a:t>
             </a:r>
             <a:r>
               <a:rPr lang="da-DK" dirty="0" err="1" smtClean="0"/>
@@ -6167,6 +6939,36 @@
             <a:r>
               <a:rPr lang="da-DK" dirty="0" smtClean="0"/>
               <a:t>.</a:t>
+            </a:r>
+            <a:endParaRPr lang="da-DK" dirty="0"/>
+          </a:p>
+        </p:txBody>
+      </p:sp>
+      <p:sp>
+        <p:nvSpPr>
+          <p:cNvPr id="4" name="Tekstboks 3"/>
+          <p:cNvSpPr txBox="1"/>
+          <p:nvPr/>
+        </p:nvSpPr>
+        <p:spPr>
+          <a:xfrm>
+            <a:off x="7596336" y="116632"/>
+            <a:ext cx="1440160" cy="369332"/>
+          </a:xfrm>
+          <a:prstGeom prst="rect">
+            <a:avLst/>
+          </a:prstGeom>
+          <a:noFill/>
+        </p:spPr>
+        <p:txBody>
+          <a:bodyPr wrap="square" rtlCol="0">
+            <a:spAutoFit/>
+          </a:bodyPr>
+          <a:lstStyle/>
+          <a:p>
+            <a:r>
+              <a:rPr lang="da-DK" dirty="0" smtClean="0"/>
+              <a:t>S;13:40(40)</a:t>
             </a:r>
             <a:endParaRPr lang="da-DK" dirty="0"/>
           </a:p>
@@ -6229,7 +7031,12 @@
             <p:ph type="body" idx="1"/>
           </p:nvPr>
         </p:nvSpPr>
-        <p:spPr/>
+        <p:spPr>
+          <a:xfrm>
+            <a:off x="467544" y="1484784"/>
+            <a:ext cx="8229600" cy="4525963"/>
+          </a:xfrm>
+        </p:spPr>
         <p:txBody>
           <a:bodyPr/>
           <a:lstStyle/>
@@ -6270,6 +7077,18 @@
             <a:pPr lvl="1"/>
             <a:r>
               <a:rPr lang="da-DK" dirty="0" err="1" smtClean="0"/>
+              <a:t>Mapning</a:t>
+            </a:r>
+            <a:r>
+              <a:rPr lang="da-DK" dirty="0" smtClean="0"/>
+              <a:t> af arkitektur</a:t>
+            </a:r>
+            <a:endParaRPr lang="da-DK" dirty="0" smtClean="0"/>
+          </a:p>
+          <a:p>
+            <a:pPr lvl="1"/>
+            <a:r>
+              <a:rPr lang="da-DK" dirty="0" err="1" smtClean="0"/>
               <a:t>SystemC</a:t>
             </a:r>
             <a:endParaRPr lang="da-DK" dirty="0" smtClean="0"/>
@@ -6298,6 +7117,36 @@
           </a:p>
           <a:p>
             <a:endParaRPr lang="da-DK" dirty="0" smtClean="0"/>
+          </a:p>
+        </p:txBody>
+      </p:sp>
+      <p:sp>
+        <p:nvSpPr>
+          <p:cNvPr id="4" name="Tekstboks 3"/>
+          <p:cNvSpPr txBox="1"/>
+          <p:nvPr/>
+        </p:nvSpPr>
+        <p:spPr>
+          <a:xfrm>
+            <a:off x="7740352" y="116632"/>
+            <a:ext cx="1261884" cy="369332"/>
+          </a:xfrm>
+          <a:prstGeom prst="rect">
+            <a:avLst/>
+          </a:prstGeom>
+          <a:noFill/>
+        </p:spPr>
+        <p:txBody>
+          <a:bodyPr wrap="none" rtlCol="0">
+            <a:spAutoFit/>
+          </a:bodyPr>
+          <a:lstStyle/>
+          <a:p>
+            <a:r>
+              <a:rPr lang="da-DK" dirty="0" smtClean="0"/>
+              <a:t>A;0:30(30)</a:t>
+            </a:r>
+            <a:endParaRPr lang="da-DK" dirty="0"/>
           </a:p>
         </p:txBody>
       </p:sp>
@@ -6452,6 +7301,36 @@
           </a:p>
         </p:txBody>
       </p:sp>
+      <p:sp>
+        <p:nvSpPr>
+          <p:cNvPr id="4" name="Tekstboks 3"/>
+          <p:cNvSpPr txBox="1"/>
+          <p:nvPr/>
+        </p:nvSpPr>
+        <p:spPr>
+          <a:xfrm>
+            <a:off x="7596336" y="116632"/>
+            <a:ext cx="1440160" cy="369332"/>
+          </a:xfrm>
+          <a:prstGeom prst="rect">
+            <a:avLst/>
+          </a:prstGeom>
+          <a:noFill/>
+        </p:spPr>
+        <p:txBody>
+          <a:bodyPr wrap="square" rtlCol="0">
+            <a:spAutoFit/>
+          </a:bodyPr>
+          <a:lstStyle/>
+          <a:p>
+            <a:r>
+              <a:rPr lang="da-DK" dirty="0" smtClean="0"/>
+              <a:t>S;14:20(40)</a:t>
+            </a:r>
+            <a:endParaRPr lang="da-DK" dirty="0"/>
+          </a:p>
+        </p:txBody>
+      </p:sp>
     </p:spTree>
   </p:cSld>
   <p:clrMapOvr>
@@ -6521,11 +7400,7 @@
           <a:p>
             <a:r>
               <a:rPr lang="da-DK" dirty="0" smtClean="0"/>
-              <a:t>Vi har overvejet kvaliteten af de i teorien anbefalede metoder samt deres alternativer </a:t>
-            </a:r>
-            <a:r>
-              <a:rPr lang="da-DK" dirty="0" smtClean="0"/>
-              <a:t>(Kendt platform (LBA/LPT), </a:t>
+              <a:t>Vi har overvejet kvaliteten af de i teorien anbefalede metoder samt deres alternativer (Kendt platform (LBA/LPT), </a:t>
             </a:r>
             <a:r>
               <a:rPr lang="da-DK" dirty="0" err="1" smtClean="0"/>
@@ -6613,9 +7488,109 @@
               <a:rPr lang="da-DK" dirty="0" smtClean="0"/>
               <a:t>” forståeligt.</a:t>
             </a:r>
-            <a:endParaRPr lang="da-DK" dirty="0" smtClean="0"/>
-          </a:p>
-          <a:p>
+          </a:p>
+          <a:p>
+            <a:endParaRPr lang="da-DK" dirty="0"/>
+          </a:p>
+        </p:txBody>
+      </p:sp>
+      <p:sp>
+        <p:nvSpPr>
+          <p:cNvPr id="4" name="Tekstboks 3"/>
+          <p:cNvSpPr txBox="1"/>
+          <p:nvPr/>
+        </p:nvSpPr>
+        <p:spPr>
+          <a:xfrm>
+            <a:off x="7596336" y="116632"/>
+            <a:ext cx="1440160" cy="369332"/>
+          </a:xfrm>
+          <a:prstGeom prst="rect">
+            <a:avLst/>
+          </a:prstGeom>
+          <a:noFill/>
+        </p:spPr>
+        <p:txBody>
+          <a:bodyPr wrap="square" rtlCol="0">
+            <a:spAutoFit/>
+          </a:bodyPr>
+          <a:lstStyle/>
+          <a:p>
+            <a:r>
+              <a:rPr lang="da-DK" dirty="0" smtClean="0"/>
+              <a:t>S;15:00(40)</a:t>
+            </a:r>
+            <a:endParaRPr lang="da-DK" dirty="0"/>
+          </a:p>
+        </p:txBody>
+      </p:sp>
+    </p:spTree>
+  </p:cSld>
+  <p:clrMapOvr>
+    <a:masterClrMapping/>
+  </p:clrMapOvr>
+</p:sld>
+</file>
+
+<file path=ppt/slides/slide22.xml><?xml version="1.0" encoding="utf-8"?>
+<p:sld xmlns:a="http://schemas.openxmlformats.org/drawingml/2006/main" xmlns:r="http://schemas.openxmlformats.org/officeDocument/2006/relationships" xmlns:p="http://schemas.openxmlformats.org/presentationml/2006/main">
+  <p:cSld>
+    <p:spTree>
+      <p:nvGrpSpPr>
+        <p:cNvPr id="1" name=""/>
+        <p:cNvGrpSpPr/>
+        <p:nvPr/>
+      </p:nvGrpSpPr>
+      <p:grpSpPr>
+        <a:xfrm>
+          <a:off x="0" y="0"/>
+          <a:ext cx="0" cy="0"/>
+          <a:chOff x="0" y="0"/>
+          <a:chExt cx="0" cy="0"/>
+        </a:xfrm>
+      </p:grpSpPr>
+      <p:sp>
+        <p:nvSpPr>
+          <p:cNvPr id="2" name="Titel 1"/>
+          <p:cNvSpPr>
+            <a:spLocks noGrp="1"/>
+          </p:cNvSpPr>
+          <p:nvPr>
+            <p:ph type="title"/>
+          </p:nvPr>
+        </p:nvSpPr>
+        <p:spPr/>
+        <p:txBody>
+          <a:bodyPr/>
+          <a:lstStyle/>
+          <a:p>
+            <a:r>
+              <a:rPr lang="da-DK" dirty="0" smtClean="0"/>
+              <a:t>Spørgsmål</a:t>
+            </a:r>
+            <a:endParaRPr lang="da-DK" dirty="0"/>
+          </a:p>
+        </p:txBody>
+      </p:sp>
+      <p:sp>
+        <p:nvSpPr>
+          <p:cNvPr id="3" name="Pladsholder til indhold 2"/>
+          <p:cNvSpPr>
+            <a:spLocks noGrp="1"/>
+          </p:cNvSpPr>
+          <p:nvPr>
+            <p:ph idx="1"/>
+          </p:nvPr>
+        </p:nvSpPr>
+        <p:spPr/>
+        <p:txBody>
+          <a:bodyPr/>
+          <a:lstStyle/>
+          <a:p>
+            <a:r>
+              <a:rPr lang="da-DK" dirty="0" smtClean="0"/>
+              <a:t>?</a:t>
+            </a:r>
             <a:endParaRPr lang="da-DK" dirty="0"/>
           </a:p>
         </p:txBody>
@@ -6726,6 +7701,40 @@
               <a:buNone/>
             </a:pPr>
             <a:endParaRPr lang="da-DK" dirty="0" smtClean="0"/>
+          </a:p>
+        </p:txBody>
+      </p:sp>
+      <p:sp>
+        <p:nvSpPr>
+          <p:cNvPr id="4" name="Tekstboks 3"/>
+          <p:cNvSpPr txBox="1"/>
+          <p:nvPr/>
+        </p:nvSpPr>
+        <p:spPr>
+          <a:xfrm>
+            <a:off x="7812360" y="116632"/>
+            <a:ext cx="1261884" cy="369332"/>
+          </a:xfrm>
+          <a:prstGeom prst="rect">
+            <a:avLst/>
+          </a:prstGeom>
+          <a:noFill/>
+        </p:spPr>
+        <p:txBody>
+          <a:bodyPr wrap="none" rtlCol="0">
+            <a:spAutoFit/>
+          </a:bodyPr>
+          <a:lstStyle/>
+          <a:p>
+            <a:r>
+              <a:rPr lang="da-DK" dirty="0" smtClean="0"/>
+              <a:t>A;1:00(30</a:t>
+            </a:r>
+            <a:r>
+              <a:rPr lang="da-DK" dirty="0" smtClean="0"/>
+              <a:t>)</a:t>
+            </a:r>
+            <a:endParaRPr lang="da-DK" dirty="0"/>
           </a:p>
         </p:txBody>
       </p:sp>
@@ -6818,6 +7827,36 @@
           </a:ln>
         </p:spPr>
       </p:pic>
+      <p:sp>
+        <p:nvSpPr>
+          <p:cNvPr id="5" name="Tekstboks 4"/>
+          <p:cNvSpPr txBox="1"/>
+          <p:nvPr/>
+        </p:nvSpPr>
+        <p:spPr>
+          <a:xfrm>
+            <a:off x="7740352" y="116632"/>
+            <a:ext cx="1296144" cy="369332"/>
+          </a:xfrm>
+          <a:prstGeom prst="rect">
+            <a:avLst/>
+          </a:prstGeom>
+          <a:noFill/>
+        </p:spPr>
+        <p:txBody>
+          <a:bodyPr wrap="square" rtlCol="0">
+            <a:spAutoFit/>
+          </a:bodyPr>
+          <a:lstStyle/>
+          <a:p>
+            <a:r>
+              <a:rPr lang="da-DK" dirty="0" smtClean="0"/>
+              <a:t>A;1:10(10)</a:t>
+            </a:r>
+            <a:endParaRPr lang="da-DK" dirty="0"/>
+          </a:p>
+        </p:txBody>
+      </p:sp>
     </p:spTree>
   </p:cSld>
   <p:clrMapOvr>
@@ -6993,6 +8032,36 @@
           </a:p>
         </p:txBody>
       </p:sp>
+      <p:sp>
+        <p:nvSpPr>
+          <p:cNvPr id="4" name="Tekstboks 3"/>
+          <p:cNvSpPr txBox="1"/>
+          <p:nvPr/>
+        </p:nvSpPr>
+        <p:spPr>
+          <a:xfrm>
+            <a:off x="7740352" y="116632"/>
+            <a:ext cx="1296144" cy="369332"/>
+          </a:xfrm>
+          <a:prstGeom prst="rect">
+            <a:avLst/>
+          </a:prstGeom>
+          <a:noFill/>
+        </p:spPr>
+        <p:txBody>
+          <a:bodyPr wrap="square" rtlCol="0">
+            <a:spAutoFit/>
+          </a:bodyPr>
+          <a:lstStyle/>
+          <a:p>
+            <a:r>
+              <a:rPr lang="da-DK" dirty="0" smtClean="0"/>
+              <a:t>A;2:10(60)</a:t>
+            </a:r>
+            <a:endParaRPr lang="da-DK" dirty="0"/>
+          </a:p>
+        </p:txBody>
+      </p:sp>
     </p:spTree>
   </p:cSld>
   <p:clrMapOvr>
@@ -7122,6 +8191,36 @@
           </a:p>
         </p:txBody>
       </p:sp>
+      <p:sp>
+        <p:nvSpPr>
+          <p:cNvPr id="4" name="Tekstboks 3"/>
+          <p:cNvSpPr txBox="1"/>
+          <p:nvPr/>
+        </p:nvSpPr>
+        <p:spPr>
+          <a:xfrm>
+            <a:off x="7740352" y="116632"/>
+            <a:ext cx="1296144" cy="369332"/>
+          </a:xfrm>
+          <a:prstGeom prst="rect">
+            <a:avLst/>
+          </a:prstGeom>
+          <a:noFill/>
+        </p:spPr>
+        <p:txBody>
+          <a:bodyPr wrap="square" rtlCol="0">
+            <a:spAutoFit/>
+          </a:bodyPr>
+          <a:lstStyle/>
+          <a:p>
+            <a:r>
+              <a:rPr lang="da-DK" dirty="0" smtClean="0"/>
+              <a:t>J;2:20(10)</a:t>
+            </a:r>
+            <a:endParaRPr lang="da-DK" dirty="0"/>
+          </a:p>
+        </p:txBody>
+      </p:sp>
     </p:spTree>
   </p:cSld>
   <p:clrMapOvr>
@@ -7308,6 +8407,36 @@
           <a:p>
             <a:pPr lvl="1"/>
             <a:endParaRPr lang="da-DK" dirty="0" smtClean="0"/>
+          </a:p>
+        </p:txBody>
+      </p:sp>
+      <p:sp>
+        <p:nvSpPr>
+          <p:cNvPr id="4" name="Tekstboks 3"/>
+          <p:cNvSpPr txBox="1"/>
+          <p:nvPr/>
+        </p:nvSpPr>
+        <p:spPr>
+          <a:xfrm>
+            <a:off x="7740352" y="116632"/>
+            <a:ext cx="1296144" cy="369332"/>
+          </a:xfrm>
+          <a:prstGeom prst="rect">
+            <a:avLst/>
+          </a:prstGeom>
+          <a:noFill/>
+        </p:spPr>
+        <p:txBody>
+          <a:bodyPr wrap="square" rtlCol="0">
+            <a:spAutoFit/>
+          </a:bodyPr>
+          <a:lstStyle/>
+          <a:p>
+            <a:r>
+              <a:rPr lang="da-DK" dirty="0" smtClean="0"/>
+              <a:t>J;3:20(60)</a:t>
+            </a:r>
+            <a:endParaRPr lang="da-DK" dirty="0"/>
           </a:p>
         </p:txBody>
       </p:sp>
@@ -7414,6 +8543,36 @@
           </a:ln>
         </p:spPr>
       </p:pic>
+      <p:sp>
+        <p:nvSpPr>
+          <p:cNvPr id="5" name="Tekstboks 4"/>
+          <p:cNvSpPr txBox="1"/>
+          <p:nvPr/>
+        </p:nvSpPr>
+        <p:spPr>
+          <a:xfrm>
+            <a:off x="7740352" y="116632"/>
+            <a:ext cx="1296144" cy="369332"/>
+          </a:xfrm>
+          <a:prstGeom prst="rect">
+            <a:avLst/>
+          </a:prstGeom>
+          <a:noFill/>
+        </p:spPr>
+        <p:txBody>
+          <a:bodyPr wrap="square" rtlCol="0">
+            <a:spAutoFit/>
+          </a:bodyPr>
+          <a:lstStyle/>
+          <a:p>
+            <a:r>
+              <a:rPr lang="da-DK" dirty="0" smtClean="0"/>
+              <a:t>J;3:50(30)</a:t>
+            </a:r>
+            <a:endParaRPr lang="da-DK" dirty="0"/>
+          </a:p>
+        </p:txBody>
+      </p:sp>
     </p:spTree>
   </p:cSld>
   <p:clrMapOvr>
@@ -7441,7 +8600,7 @@
       </p:grpSpPr>
       <p:sp>
         <p:nvSpPr>
-          <p:cNvPr id="43010" name="Rectangle 2"/>
+          <p:cNvPr id="2" name="Titel 1"/>
           <p:cNvSpPr>
             <a:spLocks noGrp="1"/>
           </p:cNvSpPr>
@@ -7456,52 +8615,33 @@
           <a:p>
             <a:r>
               <a:rPr lang="da-DK" dirty="0" smtClean="0"/>
-              <a:t>Kvalitets attributter</a:t>
-            </a:r>
+              <a:t>Risiko analyse</a:t>
+            </a:r>
+            <a:endParaRPr lang="da-DK" dirty="0"/>
           </a:p>
         </p:txBody>
       </p:sp>
       <p:pic>
         <p:nvPicPr>
-          <p:cNvPr id="43011" name="Picture 3"/>
+          <p:cNvPr id="4" name="Pladsholder til indhold 3"/>
           <p:cNvPicPr>
-            <a:picLocks noGrp="1" noChangeAspect="1" noChangeArrowheads="1"/>
+            <a:picLocks noGrp="1"/>
           </p:cNvPicPr>
           <p:nvPr>
-            <p:ph type="body" idx="1"/>
+            <p:ph idx="1"/>
           </p:nvPr>
         </p:nvPicPr>
         <p:blipFill>
           <a:blip r:embed="rId2" cstate="print"/>
-          <a:srcRect l="1871" t="29253" r="4495" b="30972"/>
-          <a:stretch>
-            <a:fillRect/>
-          </a:stretch>
-        </p:blipFill>
-        <p:spPr>
-          <a:xfrm>
-            <a:off x="755576" y="1628800"/>
-            <a:ext cx="7705725" cy="1800225"/>
-          </a:xfrm>
-        </p:spPr>
-      </p:pic>
-      <p:pic>
-        <p:nvPicPr>
-          <p:cNvPr id="4" name="Billede 3" descr="ironTriangle"/>
-          <p:cNvPicPr/>
-          <p:nvPr/>
-        </p:nvPicPr>
-        <p:blipFill>
-          <a:blip r:embed="rId3" cstate="print"/>
-          <a:srcRect/>
+          <a:srcRect l="920"/>
           <a:stretch>
             <a:fillRect/>
           </a:stretch>
         </p:blipFill>
         <p:spPr bwMode="auto">
           <a:xfrm>
-            <a:off x="3059832" y="3717032"/>
-            <a:ext cx="2495550" cy="1562100"/>
+            <a:off x="1043608" y="1772816"/>
+            <a:ext cx="7200800" cy="4320480"/>
           </a:xfrm>
           <a:prstGeom prst="rect">
             <a:avLst/>
@@ -7515,18 +8655,41 @@
           </a:ln>
         </p:spPr>
       </p:pic>
+      <p:sp>
+        <p:nvSpPr>
+          <p:cNvPr id="5" name="Tekstboks 4"/>
+          <p:cNvSpPr txBox="1"/>
+          <p:nvPr/>
+        </p:nvSpPr>
+        <p:spPr>
+          <a:xfrm>
+            <a:off x="7740352" y="116632"/>
+            <a:ext cx="1296144" cy="369332"/>
+          </a:xfrm>
+          <a:prstGeom prst="rect">
+            <a:avLst/>
+          </a:prstGeom>
+          <a:noFill/>
+        </p:spPr>
+        <p:txBody>
+          <a:bodyPr wrap="square" rtlCol="0">
+            <a:spAutoFit/>
+          </a:bodyPr>
+          <a:lstStyle/>
+          <a:p>
+            <a:r>
+              <a:rPr lang="da-DK" dirty="0" smtClean="0"/>
+              <a:t>J;4:50(60)</a:t>
+            </a:r>
+            <a:endParaRPr lang="da-DK" dirty="0"/>
+          </a:p>
+        </p:txBody>
+      </p:sp>
     </p:spTree>
   </p:cSld>
   <p:clrMapOvr>
     <a:masterClrMapping/>
   </p:clrMapOvr>
-  <p:timing>
-    <p:tnLst>
-      <p:par>
-        <p:cTn id="1" dur="indefinite" restart="never" nodeType="tmRoot"/>
-      </p:par>
-    </p:tnLst>
-  </p:timing>
 </p:sld>
 </file>
 
@@ -7811,4 +8974,287 @@
   <a:objectDefaults/>
   <a:extraClrSchemeLst/>
 </a:theme>
+</file>
+
+<file path=ppt/theme/theme2.xml><?xml version="1.0" encoding="utf-8"?>
+<a:theme xmlns:a="http://schemas.openxmlformats.org/drawingml/2006/main" name="Kontortema">
+  <a:themeElements>
+    <a:clrScheme name="Kontor">
+      <a:dk1>
+        <a:sysClr val="windowText" lastClr="000000"/>
+      </a:dk1>
+      <a:lt1>
+        <a:sysClr val="window" lastClr="FFFFFF"/>
+      </a:lt1>
+      <a:dk2>
+        <a:srgbClr val="1F497D"/>
+      </a:dk2>
+      <a:lt2>
+        <a:srgbClr val="EEECE1"/>
+      </a:lt2>
+      <a:accent1>
+        <a:srgbClr val="4F81BD"/>
+      </a:accent1>
+      <a:accent2>
+        <a:srgbClr val="C0504D"/>
+      </a:accent2>
+      <a:accent3>
+        <a:srgbClr val="9BBB59"/>
+      </a:accent3>
+      <a:accent4>
+        <a:srgbClr val="8064A2"/>
+      </a:accent4>
+      <a:accent5>
+        <a:srgbClr val="4BACC6"/>
+      </a:accent5>
+      <a:accent6>
+        <a:srgbClr val="F79646"/>
+      </a:accent6>
+      <a:hlink>
+        <a:srgbClr val="0000FF"/>
+      </a:hlink>
+      <a:folHlink>
+        <a:srgbClr val="800080"/>
+      </a:folHlink>
+    </a:clrScheme>
+    <a:fontScheme name="Kontor">
+      <a:majorFont>
+        <a:latin typeface="Calibri"/>
+        <a:ea typeface=""/>
+        <a:cs typeface=""/>
+        <a:font script="Jpan" typeface="ＭＳ Ｐゴシック"/>
+        <a:font script="Hang" typeface="맑은 고딕"/>
+        <a:font script="Hans" typeface="宋体"/>
+        <a:font script="Hant" typeface="新細明體"/>
+        <a:font script="Arab" typeface="Times New Roman"/>
+        <a:font script="Hebr" typeface="Times New Roman"/>
+        <a:font script="Thai" typeface="Angsana New"/>
+        <a:font script="Ethi" typeface="Nyala"/>
+        <a:font script="Beng" typeface="Vrinda"/>
+        <a:font script="Gujr" typeface="Shruti"/>
+        <a:font script="Khmr" typeface="MoolBoran"/>
+        <a:font script="Knda" typeface="Tunga"/>
+        <a:font script="Guru" typeface="Raavi"/>
+        <a:font script="Cans" typeface="Euphemia"/>
+        <a:font script="Cher" typeface="Plantagenet Cherokee"/>
+        <a:font script="Yiii" typeface="Microsoft Yi Baiti"/>
+        <a:font script="Tibt" typeface="Microsoft Himalaya"/>
+        <a:font script="Thaa" typeface="MV Boli"/>
+        <a:font script="Deva" typeface="Mangal"/>
+        <a:font script="Telu" typeface="Gautami"/>
+        <a:font script="Taml" typeface="Latha"/>
+        <a:font script="Syrc" typeface="Estrangelo Edessa"/>
+        <a:font script="Orya" typeface="Kalinga"/>
+        <a:font script="Mlym" typeface="Kartika"/>
+        <a:font script="Laoo" typeface="DokChampa"/>
+        <a:font script="Sinh" typeface="Iskoola Pota"/>
+        <a:font script="Mong" typeface="Mongolian Baiti"/>
+        <a:font script="Viet" typeface="Times New Roman"/>
+        <a:font script="Uigh" typeface="Microsoft Uighur"/>
+      </a:majorFont>
+      <a:minorFont>
+        <a:latin typeface="Calibri"/>
+        <a:ea typeface=""/>
+        <a:cs typeface=""/>
+        <a:font script="Jpan" typeface="ＭＳ Ｐゴシック"/>
+        <a:font script="Hang" typeface="맑은 고딕"/>
+        <a:font script="Hans" typeface="宋体"/>
+        <a:font script="Hant" typeface="新細明體"/>
+        <a:font script="Arab" typeface="Arial"/>
+        <a:font script="Hebr" typeface="Arial"/>
+        <a:font script="Thai" typeface="Cordia New"/>
+        <a:font script="Ethi" typeface="Nyala"/>
+        <a:font script="Beng" typeface="Vrinda"/>
+        <a:font script="Gujr" typeface="Shruti"/>
+        <a:font script="Khmr" typeface="DaunPenh"/>
+        <a:font script="Knda" typeface="Tunga"/>
+        <a:font script="Guru" typeface="Raavi"/>
+        <a:font script="Cans" typeface="Euphemia"/>
+        <a:font script="Cher" typeface="Plantagenet Cherokee"/>
+        <a:font script="Yiii" typeface="Microsoft Yi Baiti"/>
+        <a:font script="Tibt" typeface="Microsoft Himalaya"/>
+        <a:font script="Thaa" typeface="MV Boli"/>
+        <a:font script="Deva" typeface="Mangal"/>
+        <a:font script="Telu" typeface="Gautami"/>
+        <a:font script="Taml" typeface="Latha"/>
+        <a:font script="Syrc" typeface="Estrangelo Edessa"/>
+        <a:font script="Orya" typeface="Kalinga"/>
+        <a:font script="Mlym" typeface="Kartika"/>
+        <a:font script="Laoo" typeface="DokChampa"/>
+        <a:font script="Sinh" typeface="Iskoola Pota"/>
+        <a:font script="Mong" typeface="Mongolian Baiti"/>
+        <a:font script="Viet" typeface="Arial"/>
+        <a:font script="Uigh" typeface="Microsoft Uighur"/>
+      </a:minorFont>
+    </a:fontScheme>
+    <a:fmtScheme name="Kontor">
+      <a:fillStyleLst>
+        <a:solidFill>
+          <a:schemeClr val="phClr"/>
+        </a:solidFill>
+        <a:gradFill rotWithShape="1">
+          <a:gsLst>
+            <a:gs pos="0">
+              <a:schemeClr val="phClr">
+                <a:tint val="50000"/>
+                <a:satMod val="300000"/>
+              </a:schemeClr>
+            </a:gs>
+            <a:gs pos="35000">
+              <a:schemeClr val="phClr">
+                <a:tint val="37000"/>
+                <a:satMod val="300000"/>
+              </a:schemeClr>
+            </a:gs>
+            <a:gs pos="100000">
+              <a:schemeClr val="phClr">
+                <a:tint val="15000"/>
+                <a:satMod val="350000"/>
+              </a:schemeClr>
+            </a:gs>
+          </a:gsLst>
+          <a:lin ang="16200000" scaled="1"/>
+        </a:gradFill>
+        <a:gradFill rotWithShape="1">
+          <a:gsLst>
+            <a:gs pos="0">
+              <a:schemeClr val="phClr">
+                <a:shade val="51000"/>
+                <a:satMod val="130000"/>
+              </a:schemeClr>
+            </a:gs>
+            <a:gs pos="80000">
+              <a:schemeClr val="phClr">
+                <a:shade val="93000"/>
+                <a:satMod val="130000"/>
+              </a:schemeClr>
+            </a:gs>
+            <a:gs pos="100000">
+              <a:schemeClr val="phClr">
+                <a:shade val="94000"/>
+                <a:satMod val="135000"/>
+              </a:schemeClr>
+            </a:gs>
+          </a:gsLst>
+          <a:lin ang="16200000" scaled="0"/>
+        </a:gradFill>
+      </a:fillStyleLst>
+      <a:lnStyleLst>
+        <a:ln w="9525" cap="flat" cmpd="sng" algn="ctr">
+          <a:solidFill>
+            <a:schemeClr val="phClr">
+              <a:shade val="95000"/>
+              <a:satMod val="105000"/>
+            </a:schemeClr>
+          </a:solidFill>
+          <a:prstDash val="solid"/>
+        </a:ln>
+        <a:ln w="25400" cap="flat" cmpd="sng" algn="ctr">
+          <a:solidFill>
+            <a:schemeClr val="phClr"/>
+          </a:solidFill>
+          <a:prstDash val="solid"/>
+        </a:ln>
+        <a:ln w="38100" cap="flat" cmpd="sng" algn="ctr">
+          <a:solidFill>
+            <a:schemeClr val="phClr"/>
+          </a:solidFill>
+          <a:prstDash val="solid"/>
+        </a:ln>
+      </a:lnStyleLst>
+      <a:effectStyleLst>
+        <a:effectStyle>
+          <a:effectLst>
+            <a:outerShdw blurRad="40000" dist="20000" dir="5400000" rotWithShape="0">
+              <a:srgbClr val="000000">
+                <a:alpha val="38000"/>
+              </a:srgbClr>
+            </a:outerShdw>
+          </a:effectLst>
+        </a:effectStyle>
+        <a:effectStyle>
+          <a:effectLst>
+            <a:outerShdw blurRad="40000" dist="23000" dir="5400000" rotWithShape="0">
+              <a:srgbClr val="000000">
+                <a:alpha val="35000"/>
+              </a:srgbClr>
+            </a:outerShdw>
+          </a:effectLst>
+        </a:effectStyle>
+        <a:effectStyle>
+          <a:effectLst>
+            <a:outerShdw blurRad="40000" dist="23000" dir="5400000" rotWithShape="0">
+              <a:srgbClr val="000000">
+                <a:alpha val="35000"/>
+              </a:srgbClr>
+            </a:outerShdw>
+          </a:effectLst>
+          <a:scene3d>
+            <a:camera prst="orthographicFront">
+              <a:rot lat="0" lon="0" rev="0"/>
+            </a:camera>
+            <a:lightRig rig="threePt" dir="t">
+              <a:rot lat="0" lon="0" rev="1200000"/>
+            </a:lightRig>
+          </a:scene3d>
+          <a:sp3d>
+            <a:bevelT w="63500" h="25400"/>
+          </a:sp3d>
+        </a:effectStyle>
+      </a:effectStyleLst>
+      <a:bgFillStyleLst>
+        <a:solidFill>
+          <a:schemeClr val="phClr"/>
+        </a:solidFill>
+        <a:gradFill rotWithShape="1">
+          <a:gsLst>
+            <a:gs pos="0">
+              <a:schemeClr val="phClr">
+                <a:tint val="40000"/>
+                <a:satMod val="350000"/>
+              </a:schemeClr>
+            </a:gs>
+            <a:gs pos="40000">
+              <a:schemeClr val="phClr">
+                <a:tint val="45000"/>
+                <a:shade val="99000"/>
+                <a:satMod val="350000"/>
+              </a:schemeClr>
+            </a:gs>
+            <a:gs pos="100000">
+              <a:schemeClr val="phClr">
+                <a:shade val="20000"/>
+                <a:satMod val="255000"/>
+              </a:schemeClr>
+            </a:gs>
+          </a:gsLst>
+          <a:path path="circle">
+            <a:fillToRect l="50000" t="-80000" r="50000" b="180000"/>
+          </a:path>
+        </a:gradFill>
+        <a:gradFill rotWithShape="1">
+          <a:gsLst>
+            <a:gs pos="0">
+              <a:schemeClr val="phClr">
+                <a:tint val="80000"/>
+                <a:satMod val="300000"/>
+              </a:schemeClr>
+            </a:gs>
+            <a:gs pos="100000">
+              <a:schemeClr val="phClr">
+                <a:shade val="30000"/>
+                <a:satMod val="200000"/>
+              </a:schemeClr>
+            </a:gs>
+          </a:gsLst>
+          <a:path path="circle">
+            <a:fillToRect l="50000" t="50000" r="50000" b="50000"/>
+          </a:path>
+        </a:gradFill>
+      </a:bgFillStyleLst>
+    </a:fmtScheme>
+  </a:themeElements>
+  <a:objectDefaults/>
+  <a:extraClrSchemeLst/>
+</a:theme>
 </file>
</xml_diff>

<commit_message>
Adding slideshow and MARTE resources
</commit_message>
<xml_diff>
--- a/syseng_hwco/proj/Artifact/Presentations/Presentation_exam.pptx
+++ b/syseng_hwco/proj/Artifact/Presentations/Presentation_exam.pptx
@@ -279,11 +279,11 @@
             </c:numRef>
           </c:yVal>
         </c:ser>
-        <c:axId val="73802496"/>
-        <c:axId val="73804416"/>
+        <c:axId val="117819264"/>
+        <c:axId val="118146944"/>
       </c:scatterChart>
       <c:valAx>
-        <c:axId val="73802496"/>
+        <c:axId val="117819264"/>
         <c:scaling>
           <c:orientation val="minMax"/>
         </c:scaling>
@@ -309,12 +309,12 @@
         <c:numFmt formatCode="General" sourceLinked="1"/>
         <c:majorTickMark val="none"/>
         <c:tickLblPos val="nextTo"/>
-        <c:crossAx val="73804416"/>
+        <c:crossAx val="118146944"/>
         <c:crosses val="autoZero"/>
         <c:crossBetween val="midCat"/>
       </c:valAx>
       <c:valAx>
-        <c:axId val="73804416"/>
+        <c:axId val="118146944"/>
         <c:scaling>
           <c:orientation val="minMax"/>
         </c:scaling>
@@ -341,7 +341,7 @@
         <c:numFmt formatCode="General" sourceLinked="1"/>
         <c:majorTickMark val="none"/>
         <c:tickLblPos val="nextTo"/>
-        <c:crossAx val="73802496"/>
+        <c:crossAx val="117819264"/>
         <c:crosses val="autoZero"/>
         <c:crossBetween val="midCat"/>
       </c:valAx>
@@ -452,6 +452,7 @@
           <a:p>
             <a:fld id="{150C6283-EC6C-4D4C-A4A9-62E01CB0B1D5}" type="datetimeFigureOut">
               <a:rPr lang="da-DK" smtClean="0"/>
+              <a:pPr/>
               <a:t>23-03-2011</a:t>
             </a:fld>
             <a:endParaRPr lang="da-DK"/>
@@ -613,6 +614,7 @@
           <a:p>
             <a:fld id="{FF511A3C-A8C5-48D0-806C-6A3FDD0D7460}" type="slidenum">
               <a:rPr lang="da-DK" smtClean="0"/>
+              <a:pPr/>
               <a:t>‹nr.›</a:t>
             </a:fld>
             <a:endParaRPr lang="da-DK"/>
@@ -784,6 +786,7 @@
           <a:p>
             <a:fld id="{FF511A3C-A8C5-48D0-806C-6A3FDD0D7460}" type="slidenum">
               <a:rPr lang="da-DK" smtClean="0"/>
+              <a:pPr/>
               <a:t>1</a:t>
             </a:fld>
             <a:endParaRPr lang="da-DK"/>
@@ -984,7 +987,7 @@
             <a:pPr>
               <a:defRPr/>
             </a:pPr>
-            <a:fld id="{9255B89D-5513-4C10-B7BC-899DFBFD75C5}" type="datetime1">
+            <a:fld id="{7BC31662-28BA-4109-AD77-F59CA7E24FC1}" type="datetime1">
               <a:rPr lang="da-DK" smtClean="0"/>
               <a:t>23-03-2011</a:t>
             </a:fld>
@@ -1173,7 +1176,7 @@
             <a:pPr>
               <a:defRPr/>
             </a:pPr>
-            <a:fld id="{A52A3103-9420-425B-9B9B-AF7F91A337F5}" type="datetime1">
+            <a:fld id="{5CD8F062-C107-44B0-8166-3E9C5962FFB1}" type="datetime1">
               <a:rPr lang="da-DK" smtClean="0"/>
               <a:t>23-03-2011</a:t>
             </a:fld>
@@ -1372,7 +1375,7 @@
             <a:pPr>
               <a:defRPr/>
             </a:pPr>
-            <a:fld id="{D16AC727-AE31-460A-A5E6-02B9ACCE974A}" type="datetime1">
+            <a:fld id="{03B76286-9426-4C40-B71F-0460C09D6E32}" type="datetime1">
               <a:rPr lang="da-DK" smtClean="0"/>
               <a:t>23-03-2011</a:t>
             </a:fld>
@@ -1685,7 +1688,7 @@
             <a:pPr>
               <a:defRPr/>
             </a:pPr>
-            <a:fld id="{A572AB9A-EA79-4AD5-8815-52F3480ED94F}" type="datetime1">
+            <a:fld id="{C30BF68C-B351-4CEF-8667-5218E6D0E64C}" type="datetime1">
               <a:rPr lang="da-DK" smtClean="0"/>
               <a:t>23-03-2011</a:t>
             </a:fld>
@@ -1941,7 +1944,7 @@
             <a:pPr>
               <a:defRPr/>
             </a:pPr>
-            <a:fld id="{353A0596-E7CC-43F4-936B-16684695A112}" type="datetime1">
+            <a:fld id="{2F77887F-2110-4733-B992-589F37D2049B}" type="datetime1">
               <a:rPr lang="da-DK" smtClean="0"/>
               <a:t>23-03-2011</a:t>
             </a:fld>
@@ -2112,7 +2115,7 @@
             <a:pPr>
               <a:defRPr/>
             </a:pPr>
-            <a:fld id="{5092D5AA-C70B-42A7-B166-9B62CA967279}" type="datetime1">
+            <a:fld id="{20FD2454-F6CF-4DFE-B13F-D912C0ECA690}" type="datetime1">
               <a:rPr lang="da-DK" smtClean="0"/>
               <a:t>23-03-2011</a:t>
             </a:fld>
@@ -2301,7 +2304,7 @@
             <a:pPr>
               <a:defRPr/>
             </a:pPr>
-            <a:fld id="{C4561886-9F1D-4C8A-9F84-52CDD4D21C2A}" type="datetime1">
+            <a:fld id="{3CCE61D6-B40F-49BD-875D-D26996AF58A7}" type="datetime1">
               <a:rPr lang="da-DK" smtClean="0"/>
               <a:t>23-03-2011</a:t>
             </a:fld>
@@ -2566,7 +2569,7 @@
             <a:pPr>
               <a:defRPr/>
             </a:pPr>
-            <a:fld id="{754FB3CB-C4A4-4853-AF90-36B93B37E82A}" type="datetime1">
+            <a:fld id="{409D5924-BC6C-45BA-B8C0-F2658B9BB019}" type="datetime1">
               <a:rPr lang="da-DK" smtClean="0"/>
               <a:t>23-03-2011</a:t>
             </a:fld>
@@ -2873,7 +2876,7 @@
             <a:pPr>
               <a:defRPr/>
             </a:pPr>
-            <a:fld id="{72647F51-37D7-4094-A151-8AA432E3F4B3}" type="datetime1">
+            <a:fld id="{F6AB8CDC-A008-4373-AC60-209B22B2D56F}" type="datetime1">
               <a:rPr lang="da-DK" smtClean="0"/>
               <a:t>23-03-2011</a:t>
             </a:fld>
@@ -3314,7 +3317,7 @@
             <a:pPr>
               <a:defRPr/>
             </a:pPr>
-            <a:fld id="{FE3EEEF7-3D61-4DA8-8A08-6E037F317103}" type="datetime1">
+            <a:fld id="{7DA72B2A-BBA7-4AC9-83E2-25871310D41C}" type="datetime1">
               <a:rPr lang="da-DK" smtClean="0"/>
               <a:t>23-03-2011</a:t>
             </a:fld>
@@ -3451,7 +3454,7 @@
             <a:pPr>
               <a:defRPr/>
             </a:pPr>
-            <a:fld id="{D010CB87-37CC-4C01-B66D-6F6EF341866E}" type="datetime1">
+            <a:fld id="{8CC95C70-7CF1-42BE-AC58-9AB82B022839}" type="datetime1">
               <a:rPr lang="da-DK" smtClean="0"/>
               <a:t>23-03-2011</a:t>
             </a:fld>
@@ -3565,7 +3568,7 @@
             <a:pPr>
               <a:defRPr/>
             </a:pPr>
-            <a:fld id="{FD8B9D75-0E0F-4254-9696-D2756DF25289}" type="datetime1">
+            <a:fld id="{832EF492-2B80-4867-91D3-F3A8D1C85EFE}" type="datetime1">
               <a:rPr lang="da-DK" smtClean="0"/>
               <a:t>23-03-2011</a:t>
             </a:fld>
@@ -3861,7 +3864,7 @@
             <a:pPr>
               <a:defRPr/>
             </a:pPr>
-            <a:fld id="{6A000EA5-D43A-4E14-9898-943A1EF0ECF2}" type="datetime1">
+            <a:fld id="{DC1B26B1-95E8-427A-9D4A-449186F038BA}" type="datetime1">
               <a:rPr lang="da-DK" smtClean="0"/>
               <a:t>23-03-2011</a:t>
             </a:fld>
@@ -4136,7 +4139,7 @@
             <a:pPr>
               <a:defRPr/>
             </a:pPr>
-            <a:fld id="{F5352F8A-D794-4D54-B814-ABA9C702EA20}" type="datetime1">
+            <a:fld id="{5F31FDC7-EE93-4C20-8EC8-C7FF21CE07A4}" type="datetime1">
               <a:rPr lang="da-DK" smtClean="0"/>
               <a:t>23-03-2011</a:t>
             </a:fld>
@@ -4388,7 +4391,7 @@
             <a:pPr>
               <a:defRPr/>
             </a:pPr>
-            <a:fld id="{687117F0-EFE0-41AD-A339-A736C0A86F6E}" type="datetime1">
+            <a:fld id="{5F7D3E21-FB43-4BBA-B356-2B0D0A06CB4A}" type="datetime1">
               <a:rPr lang="da-DK" smtClean="0"/>
               <a:t>23-03-2011</a:t>
             </a:fld>
@@ -4516,7 +4519,7 @@
     <p:sldLayoutId id="2147483650" r:id="rId13"/>
     <p:sldLayoutId id="2147483649" r:id="rId14"/>
   </p:sldLayoutIdLst>
-  <p:hf sldNum="0" hdr="0" ftr="0" dt="0"/>
+  <p:hf hdr="0" ftr="0" dt="0"/>
   <p:txStyles>
     <p:titleStyle>
       <a:lvl1pPr algn="ctr" rtl="0" eaLnBrk="0" fontAlgn="base" hangingPunct="0">
@@ -5001,6 +5004,35 @@
           </a:p>
         </p:txBody>
       </p:sp>
+      <p:sp>
+        <p:nvSpPr>
+          <p:cNvPr id="5" name="Pladsholder til diasnummer 4"/>
+          <p:cNvSpPr>
+            <a:spLocks noGrp="1"/>
+          </p:cNvSpPr>
+          <p:nvPr>
+            <p:ph type="sldNum" sz="quarter" idx="12"/>
+          </p:nvPr>
+        </p:nvSpPr>
+        <p:spPr/>
+        <p:txBody>
+          <a:bodyPr/>
+          <a:lstStyle/>
+          <a:p>
+            <a:pPr>
+              <a:defRPr/>
+            </a:pPr>
+            <a:fld id="{4584ACF4-94D7-4BF3-A3AF-0F53DC49EF6C}" type="slidenum">
+              <a:rPr lang="da-DK" smtClean="0"/>
+              <a:pPr>
+                <a:defRPr/>
+              </a:pPr>
+              <a:t>1</a:t>
+            </a:fld>
+            <a:endParaRPr lang="da-DK"/>
+          </a:p>
+        </p:txBody>
+      </p:sp>
     </p:spTree>
   </p:cSld>
   <p:clrMapOvr>
@@ -5052,7 +5084,6 @@
               <a:rPr lang="da-DK" dirty="0" smtClean="0"/>
               <a:t>Kvalitetsattributter</a:t>
             </a:r>
-            <a:endParaRPr lang="da-DK" dirty="0" smtClean="0"/>
           </a:p>
         </p:txBody>
       </p:sp>
@@ -5178,6 +5209,35 @@
           </a:p>
         </p:txBody>
       </p:sp>
+      <p:sp>
+        <p:nvSpPr>
+          <p:cNvPr id="7" name="Pladsholder til diasnummer 6"/>
+          <p:cNvSpPr>
+            <a:spLocks noGrp="1"/>
+          </p:cNvSpPr>
+          <p:nvPr>
+            <p:ph type="sldNum" sz="quarter" idx="12"/>
+          </p:nvPr>
+        </p:nvSpPr>
+        <p:spPr/>
+        <p:txBody>
+          <a:bodyPr/>
+          <a:lstStyle/>
+          <a:p>
+            <a:pPr>
+              <a:defRPr/>
+            </a:pPr>
+            <a:fld id="{9486A8B5-6214-4EB3-9C64-E9EE82F4F1A3}" type="slidenum">
+              <a:rPr lang="da-DK" smtClean="0"/>
+              <a:pPr>
+                <a:defRPr/>
+              </a:pPr>
+              <a:t>10</a:t>
+            </a:fld>
+            <a:endParaRPr lang="da-DK"/>
+          </a:p>
+        </p:txBody>
+      </p:sp>
     </p:spTree>
   </p:cSld>
   <p:clrMapOvr>
@@ -5318,6 +5378,35 @@
           </a:p>
         </p:txBody>
       </p:sp>
+      <p:sp>
+        <p:nvSpPr>
+          <p:cNvPr id="6" name="Pladsholder til diasnummer 5"/>
+          <p:cNvSpPr>
+            <a:spLocks noGrp="1"/>
+          </p:cNvSpPr>
+          <p:nvPr>
+            <p:ph type="sldNum" sz="quarter" idx="12"/>
+          </p:nvPr>
+        </p:nvSpPr>
+        <p:spPr/>
+        <p:txBody>
+          <a:bodyPr/>
+          <a:lstStyle/>
+          <a:p>
+            <a:pPr>
+              <a:defRPr/>
+            </a:pPr>
+            <a:fld id="{9486A8B5-6214-4EB3-9C64-E9EE82F4F1A3}" type="slidenum">
+              <a:rPr lang="da-DK" smtClean="0"/>
+              <a:pPr>
+                <a:defRPr/>
+              </a:pPr>
+              <a:t>11</a:t>
+            </a:fld>
+            <a:endParaRPr lang="da-DK"/>
+          </a:p>
+        </p:txBody>
+      </p:sp>
     </p:spTree>
   </p:cSld>
   <p:clrMapOvr>
@@ -5504,6 +5593,35 @@
               <a:t>A;7:20(60)</a:t>
             </a:r>
             <a:endParaRPr lang="da-DK" dirty="0"/>
+          </a:p>
+        </p:txBody>
+      </p:sp>
+      <p:sp>
+        <p:nvSpPr>
+          <p:cNvPr id="7" name="Pladsholder til diasnummer 6"/>
+          <p:cNvSpPr>
+            <a:spLocks noGrp="1"/>
+          </p:cNvSpPr>
+          <p:nvPr>
+            <p:ph type="sldNum" sz="quarter" idx="12"/>
+          </p:nvPr>
+        </p:nvSpPr>
+        <p:spPr/>
+        <p:txBody>
+          <a:bodyPr/>
+          <a:lstStyle/>
+          <a:p>
+            <a:pPr>
+              <a:defRPr/>
+            </a:pPr>
+            <a:fld id="{9486A8B5-6214-4EB3-9C64-E9EE82F4F1A3}" type="slidenum">
+              <a:rPr lang="da-DK" smtClean="0"/>
+              <a:pPr>
+                <a:defRPr/>
+              </a:pPr>
+              <a:t>12</a:t>
+            </a:fld>
+            <a:endParaRPr lang="da-DK"/>
           </a:p>
         </p:txBody>
       </p:sp>
@@ -5631,6 +5749,35 @@
           </a:p>
         </p:txBody>
       </p:sp>
+      <p:sp>
+        <p:nvSpPr>
+          <p:cNvPr id="5" name="Pladsholder til diasnummer 4"/>
+          <p:cNvSpPr>
+            <a:spLocks noGrp="1"/>
+          </p:cNvSpPr>
+          <p:nvPr>
+            <p:ph type="sldNum" sz="quarter" idx="12"/>
+          </p:nvPr>
+        </p:nvSpPr>
+        <p:spPr/>
+        <p:txBody>
+          <a:bodyPr/>
+          <a:lstStyle/>
+          <a:p>
+            <a:pPr>
+              <a:defRPr/>
+            </a:pPr>
+            <a:fld id="{9486A8B5-6214-4EB3-9C64-E9EE82F4F1A3}" type="slidenum">
+              <a:rPr lang="da-DK" smtClean="0"/>
+              <a:pPr>
+                <a:defRPr/>
+              </a:pPr>
+              <a:t>13</a:t>
+            </a:fld>
+            <a:endParaRPr lang="da-DK"/>
+          </a:p>
+        </p:txBody>
+      </p:sp>
     </p:spTree>
   </p:cSld>
   <p:clrMapOvr>
@@ -5710,7 +5857,7 @@
         </p:nvGraphicFramePr>
         <p:xfrm>
           <a:off x="457200" y="1600200"/>
-          <a:ext cx="8229600" cy="2736787"/>
+          <a:ext cx="8229600" cy="2761488"/>
         </p:xfrm>
         <a:graphic>
           <a:graphicData uri="http://schemas.openxmlformats.org/drawingml/2006/table">
@@ -6266,6 +6413,35 @@
           </a:p>
         </p:txBody>
       </p:sp>
+      <p:sp>
+        <p:nvSpPr>
+          <p:cNvPr id="7" name="Pladsholder til diasnummer 6"/>
+          <p:cNvSpPr>
+            <a:spLocks noGrp="1"/>
+          </p:cNvSpPr>
+          <p:nvPr>
+            <p:ph type="sldNum" sz="quarter" idx="12"/>
+          </p:nvPr>
+        </p:nvSpPr>
+        <p:spPr/>
+        <p:txBody>
+          <a:bodyPr/>
+          <a:lstStyle/>
+          <a:p>
+            <a:pPr>
+              <a:defRPr/>
+            </a:pPr>
+            <a:fld id="{9486A8B5-6214-4EB3-9C64-E9EE82F4F1A3}" type="slidenum">
+              <a:rPr lang="da-DK" smtClean="0"/>
+              <a:pPr>
+                <a:defRPr/>
+              </a:pPr>
+              <a:t>14</a:t>
+            </a:fld>
+            <a:endParaRPr lang="da-DK"/>
+          </a:p>
+        </p:txBody>
+      </p:sp>
     </p:spTree>
   </p:cSld>
   <p:clrMapOvr>
@@ -6368,6 +6544,35 @@
           </a:p>
         </p:txBody>
       </p:sp>
+      <p:sp>
+        <p:nvSpPr>
+          <p:cNvPr id="6" name="Pladsholder til diasnummer 5"/>
+          <p:cNvSpPr>
+            <a:spLocks noGrp="1"/>
+          </p:cNvSpPr>
+          <p:nvPr>
+            <p:ph type="sldNum" sz="quarter" idx="12"/>
+          </p:nvPr>
+        </p:nvSpPr>
+        <p:spPr/>
+        <p:txBody>
+          <a:bodyPr/>
+          <a:lstStyle/>
+          <a:p>
+            <a:pPr>
+              <a:defRPr/>
+            </a:pPr>
+            <a:fld id="{9486A8B5-6214-4EB3-9C64-E9EE82F4F1A3}" type="slidenum">
+              <a:rPr lang="da-DK" smtClean="0"/>
+              <a:pPr>
+                <a:defRPr/>
+              </a:pPr>
+              <a:t>15</a:t>
+            </a:fld>
+            <a:endParaRPr lang="da-DK"/>
+          </a:p>
+        </p:txBody>
+      </p:sp>
     </p:spTree>
   </p:cSld>
   <p:clrMapOvr>
@@ -6500,6 +6705,35 @@
               <a:t>S;11:20(60)</a:t>
             </a:r>
             <a:endParaRPr lang="da-DK" dirty="0"/>
+          </a:p>
+        </p:txBody>
+      </p:sp>
+      <p:sp>
+        <p:nvSpPr>
+          <p:cNvPr id="6" name="Pladsholder til diasnummer 5"/>
+          <p:cNvSpPr>
+            <a:spLocks noGrp="1"/>
+          </p:cNvSpPr>
+          <p:nvPr>
+            <p:ph type="sldNum" sz="quarter" idx="12"/>
+          </p:nvPr>
+        </p:nvSpPr>
+        <p:spPr/>
+        <p:txBody>
+          <a:bodyPr/>
+          <a:lstStyle/>
+          <a:p>
+            <a:pPr>
+              <a:defRPr/>
+            </a:pPr>
+            <a:fld id="{9486A8B5-6214-4EB3-9C64-E9EE82F4F1A3}" type="slidenum">
+              <a:rPr lang="da-DK" smtClean="0"/>
+              <a:pPr>
+                <a:defRPr/>
+              </a:pPr>
+              <a:t>16</a:t>
+            </a:fld>
+            <a:endParaRPr lang="da-DK"/>
           </a:p>
         </p:txBody>
       </p:sp>
@@ -6647,6 +6881,35 @@
           </a:p>
         </p:txBody>
       </p:sp>
+      <p:sp>
+        <p:nvSpPr>
+          <p:cNvPr id="6" name="Pladsholder til diasnummer 5"/>
+          <p:cNvSpPr>
+            <a:spLocks noGrp="1"/>
+          </p:cNvSpPr>
+          <p:nvPr>
+            <p:ph type="sldNum" sz="quarter" idx="12"/>
+          </p:nvPr>
+        </p:nvSpPr>
+        <p:spPr/>
+        <p:txBody>
+          <a:bodyPr/>
+          <a:lstStyle/>
+          <a:p>
+            <a:pPr>
+              <a:defRPr/>
+            </a:pPr>
+            <a:fld id="{9486A8B5-6214-4EB3-9C64-E9EE82F4F1A3}" type="slidenum">
+              <a:rPr lang="da-DK" smtClean="0"/>
+              <a:pPr>
+                <a:defRPr/>
+              </a:pPr>
+              <a:t>17</a:t>
+            </a:fld>
+            <a:endParaRPr lang="da-DK"/>
+          </a:p>
+        </p:txBody>
+      </p:sp>
     </p:spTree>
   </p:cSld>
   <p:clrMapOvr>
@@ -6734,21 +6997,8 @@
             </a:r>
             <a:r>
               <a:rPr lang="da-DK" dirty="0" smtClean="0"/>
-              <a:t> er et godt udkast til et fælles SW og HW </a:t>
-            </a:r>
-            <a:r>
-              <a:rPr lang="da-DK" dirty="0" smtClean="0"/>
-              <a:t>modelleringssprog</a:t>
-            </a:r>
-            <a:r>
-              <a:rPr lang="da-DK" dirty="0" smtClean="0"/>
-              <a:t>, men mangler noget </a:t>
-            </a:r>
-            <a:r>
-              <a:rPr lang="da-DK" dirty="0" smtClean="0"/>
-              <a:t>modning.</a:t>
-            </a:r>
-            <a:endParaRPr lang="da-DK" dirty="0" smtClean="0"/>
+              <a:t> er et godt udkast til et fælles SW og HW modelleringssprog, men mangler noget modning.</a:t>
+            </a:r>
           </a:p>
           <a:p>
             <a:r>
@@ -6806,6 +7056,35 @@
               <a:t>S;13:00(40)</a:t>
             </a:r>
             <a:endParaRPr lang="da-DK" dirty="0"/>
+          </a:p>
+        </p:txBody>
+      </p:sp>
+      <p:sp>
+        <p:nvSpPr>
+          <p:cNvPr id="6" name="Pladsholder til diasnummer 5"/>
+          <p:cNvSpPr>
+            <a:spLocks noGrp="1"/>
+          </p:cNvSpPr>
+          <p:nvPr>
+            <p:ph type="sldNum" sz="quarter" idx="12"/>
+          </p:nvPr>
+        </p:nvSpPr>
+        <p:spPr/>
+        <p:txBody>
+          <a:bodyPr/>
+          <a:lstStyle/>
+          <a:p>
+            <a:pPr>
+              <a:defRPr/>
+            </a:pPr>
+            <a:fld id="{9486A8B5-6214-4EB3-9C64-E9EE82F4F1A3}" type="slidenum">
+              <a:rPr lang="da-DK" smtClean="0"/>
+              <a:pPr>
+                <a:defRPr/>
+              </a:pPr>
+              <a:t>18</a:t>
+            </a:fld>
+            <a:endParaRPr lang="da-DK"/>
           </a:p>
         </p:txBody>
       </p:sp>
@@ -6922,15 +7201,7 @@
             </a:r>
             <a:r>
               <a:rPr lang="da-DK" dirty="0" smtClean="0"/>
-              <a:t> på </a:t>
-            </a:r>
-            <a:r>
-              <a:rPr lang="da-DK" dirty="0" smtClean="0"/>
-              <a:t>5k-10k </a:t>
-            </a:r>
-            <a:r>
-              <a:rPr lang="da-DK" dirty="0" smtClean="0"/>
-              <a:t>stk. er det værd at betale lidt ekstra for lavere risiko (eksempel kode og mulighed for assistance samt simplere kommunikation). Anbefaling: CC430 med SKY ISM </a:t>
+              <a:t> på 5k-10k stk. er det værd at betale lidt ekstra for lavere risiko (eksempel kode og mulighed for assistance samt simplere kommunikation). Anbefaling: CC430 med SKY ISM </a:t>
             </a:r>
             <a:r>
               <a:rPr lang="da-DK" dirty="0" err="1" smtClean="0"/>
@@ -6971,6 +7242,35 @@
               <a:t>S;13:40(40)</a:t>
             </a:r>
             <a:endParaRPr lang="da-DK" dirty="0"/>
+          </a:p>
+        </p:txBody>
+      </p:sp>
+      <p:sp>
+        <p:nvSpPr>
+          <p:cNvPr id="5" name="Pladsholder til diasnummer 4"/>
+          <p:cNvSpPr>
+            <a:spLocks noGrp="1"/>
+          </p:cNvSpPr>
+          <p:nvPr>
+            <p:ph type="sldNum" sz="quarter" idx="12"/>
+          </p:nvPr>
+        </p:nvSpPr>
+        <p:spPr/>
+        <p:txBody>
+          <a:bodyPr/>
+          <a:lstStyle/>
+          <a:p>
+            <a:pPr>
+              <a:defRPr/>
+            </a:pPr>
+            <a:fld id="{9486A8B5-6214-4EB3-9C64-E9EE82F4F1A3}" type="slidenum">
+              <a:rPr lang="da-DK" smtClean="0"/>
+              <a:pPr>
+                <a:defRPr/>
+              </a:pPr>
+              <a:t>19</a:t>
+            </a:fld>
+            <a:endParaRPr lang="da-DK"/>
           </a:p>
         </p:txBody>
       </p:sp>
@@ -7083,7 +7383,6 @@
               <a:rPr lang="da-DK" dirty="0" smtClean="0"/>
               <a:t> af arkitektur</a:t>
             </a:r>
-            <a:endParaRPr lang="da-DK" dirty="0" smtClean="0"/>
           </a:p>
           <a:p>
             <a:pPr lvl="1"/>
@@ -7147,6 +7446,35 @@
               <a:t>A;0:30(30)</a:t>
             </a:r>
             <a:endParaRPr lang="da-DK" dirty="0"/>
+          </a:p>
+        </p:txBody>
+      </p:sp>
+      <p:sp>
+        <p:nvSpPr>
+          <p:cNvPr id="5" name="Pladsholder til diasnummer 4"/>
+          <p:cNvSpPr>
+            <a:spLocks noGrp="1"/>
+          </p:cNvSpPr>
+          <p:nvPr>
+            <p:ph type="sldNum" sz="quarter" idx="12"/>
+          </p:nvPr>
+        </p:nvSpPr>
+        <p:spPr/>
+        <p:txBody>
+          <a:bodyPr/>
+          <a:lstStyle/>
+          <a:p>
+            <a:pPr>
+              <a:defRPr/>
+            </a:pPr>
+            <a:fld id="{9486A8B5-6214-4EB3-9C64-E9EE82F4F1A3}" type="slidenum">
+              <a:rPr lang="da-DK" smtClean="0"/>
+              <a:pPr>
+                <a:defRPr/>
+              </a:pPr>
+              <a:t>2</a:t>
+            </a:fld>
+            <a:endParaRPr lang="da-DK"/>
           </a:p>
         </p:txBody>
       </p:sp>
@@ -7331,6 +7659,35 @@
           </a:p>
         </p:txBody>
       </p:sp>
+      <p:sp>
+        <p:nvSpPr>
+          <p:cNvPr id="5" name="Pladsholder til diasnummer 4"/>
+          <p:cNvSpPr>
+            <a:spLocks noGrp="1"/>
+          </p:cNvSpPr>
+          <p:nvPr>
+            <p:ph type="sldNum" sz="quarter" idx="12"/>
+          </p:nvPr>
+        </p:nvSpPr>
+        <p:spPr/>
+        <p:txBody>
+          <a:bodyPr/>
+          <a:lstStyle/>
+          <a:p>
+            <a:pPr>
+              <a:defRPr/>
+            </a:pPr>
+            <a:fld id="{9486A8B5-6214-4EB3-9C64-E9EE82F4F1A3}" type="slidenum">
+              <a:rPr lang="da-DK" smtClean="0"/>
+              <a:pPr>
+                <a:defRPr/>
+              </a:pPr>
+              <a:t>20</a:t>
+            </a:fld>
+            <a:endParaRPr lang="da-DK"/>
+          </a:p>
+        </p:txBody>
+      </p:sp>
     </p:spTree>
   </p:cSld>
   <p:clrMapOvr>
@@ -7524,6 +7881,35 @@
           </a:p>
         </p:txBody>
       </p:sp>
+      <p:sp>
+        <p:nvSpPr>
+          <p:cNvPr id="5" name="Pladsholder til diasnummer 4"/>
+          <p:cNvSpPr>
+            <a:spLocks noGrp="1"/>
+          </p:cNvSpPr>
+          <p:nvPr>
+            <p:ph type="sldNum" sz="quarter" idx="12"/>
+          </p:nvPr>
+        </p:nvSpPr>
+        <p:spPr/>
+        <p:txBody>
+          <a:bodyPr/>
+          <a:lstStyle/>
+          <a:p>
+            <a:pPr>
+              <a:defRPr/>
+            </a:pPr>
+            <a:fld id="{9486A8B5-6214-4EB3-9C64-E9EE82F4F1A3}" type="slidenum">
+              <a:rPr lang="da-DK" smtClean="0"/>
+              <a:pPr>
+                <a:defRPr/>
+              </a:pPr>
+              <a:t>21</a:t>
+            </a:fld>
+            <a:endParaRPr lang="da-DK"/>
+          </a:p>
+        </p:txBody>
+      </p:sp>
     </p:spTree>
   </p:cSld>
   <p:clrMapOvr>
@@ -7595,6 +7981,35 @@
           </a:p>
         </p:txBody>
       </p:sp>
+      <p:sp>
+        <p:nvSpPr>
+          <p:cNvPr id="4" name="Pladsholder til diasnummer 3"/>
+          <p:cNvSpPr>
+            <a:spLocks noGrp="1"/>
+          </p:cNvSpPr>
+          <p:nvPr>
+            <p:ph type="sldNum" sz="quarter" idx="12"/>
+          </p:nvPr>
+        </p:nvSpPr>
+        <p:spPr/>
+        <p:txBody>
+          <a:bodyPr/>
+          <a:lstStyle/>
+          <a:p>
+            <a:pPr>
+              <a:defRPr/>
+            </a:pPr>
+            <a:fld id="{9486A8B5-6214-4EB3-9C64-E9EE82F4F1A3}" type="slidenum">
+              <a:rPr lang="da-DK" smtClean="0"/>
+              <a:pPr>
+                <a:defRPr/>
+              </a:pPr>
+              <a:t>22</a:t>
+            </a:fld>
+            <a:endParaRPr lang="da-DK"/>
+          </a:p>
+        </p:txBody>
+      </p:sp>
     </p:spTree>
   </p:cSld>
   <p:clrMapOvr>
@@ -7728,13 +8143,38 @@
           <a:p>
             <a:r>
               <a:rPr lang="da-DK" dirty="0" smtClean="0"/>
-              <a:t>A;1:00(30</a:t>
-            </a:r>
-            <a:r>
-              <a:rPr lang="da-DK" dirty="0" smtClean="0"/>
-              <a:t>)</a:t>
+              <a:t>A;1:00(30)</a:t>
             </a:r>
             <a:endParaRPr lang="da-DK" dirty="0"/>
+          </a:p>
+        </p:txBody>
+      </p:sp>
+      <p:sp>
+        <p:nvSpPr>
+          <p:cNvPr id="5" name="Pladsholder til diasnummer 4"/>
+          <p:cNvSpPr>
+            <a:spLocks noGrp="1"/>
+          </p:cNvSpPr>
+          <p:nvPr>
+            <p:ph type="sldNum" sz="quarter" idx="12"/>
+          </p:nvPr>
+        </p:nvSpPr>
+        <p:spPr/>
+        <p:txBody>
+          <a:bodyPr/>
+          <a:lstStyle/>
+          <a:p>
+            <a:pPr>
+              <a:defRPr/>
+            </a:pPr>
+            <a:fld id="{9486A8B5-6214-4EB3-9C64-E9EE82F4F1A3}" type="slidenum">
+              <a:rPr lang="da-DK" smtClean="0"/>
+              <a:pPr>
+                <a:defRPr/>
+              </a:pPr>
+              <a:t>3</a:t>
+            </a:fld>
+            <a:endParaRPr lang="da-DK"/>
           </a:p>
         </p:txBody>
       </p:sp>
@@ -7857,6 +8297,35 @@
           </a:p>
         </p:txBody>
       </p:sp>
+      <p:sp>
+        <p:nvSpPr>
+          <p:cNvPr id="6" name="Pladsholder til diasnummer 5"/>
+          <p:cNvSpPr>
+            <a:spLocks noGrp="1"/>
+          </p:cNvSpPr>
+          <p:nvPr>
+            <p:ph type="sldNum" sz="quarter" idx="12"/>
+          </p:nvPr>
+        </p:nvSpPr>
+        <p:spPr/>
+        <p:txBody>
+          <a:bodyPr/>
+          <a:lstStyle/>
+          <a:p>
+            <a:pPr>
+              <a:defRPr/>
+            </a:pPr>
+            <a:fld id="{9486A8B5-6214-4EB3-9C64-E9EE82F4F1A3}" type="slidenum">
+              <a:rPr lang="da-DK" smtClean="0"/>
+              <a:pPr>
+                <a:defRPr/>
+              </a:pPr>
+              <a:t>4</a:t>
+            </a:fld>
+            <a:endParaRPr lang="da-DK"/>
+          </a:p>
+        </p:txBody>
+      </p:sp>
     </p:spTree>
   </p:cSld>
   <p:clrMapOvr>
@@ -8062,6 +8531,35 @@
           </a:p>
         </p:txBody>
       </p:sp>
+      <p:sp>
+        <p:nvSpPr>
+          <p:cNvPr id="5" name="Pladsholder til diasnummer 4"/>
+          <p:cNvSpPr>
+            <a:spLocks noGrp="1"/>
+          </p:cNvSpPr>
+          <p:nvPr>
+            <p:ph type="sldNum" sz="quarter" idx="12"/>
+          </p:nvPr>
+        </p:nvSpPr>
+        <p:spPr/>
+        <p:txBody>
+          <a:bodyPr/>
+          <a:lstStyle/>
+          <a:p>
+            <a:pPr>
+              <a:defRPr/>
+            </a:pPr>
+            <a:fld id="{9486A8B5-6214-4EB3-9C64-E9EE82F4F1A3}" type="slidenum">
+              <a:rPr lang="da-DK" smtClean="0"/>
+              <a:pPr>
+                <a:defRPr/>
+              </a:pPr>
+              <a:t>5</a:t>
+            </a:fld>
+            <a:endParaRPr lang="da-DK"/>
+          </a:p>
+        </p:txBody>
+      </p:sp>
     </p:spTree>
   </p:cSld>
   <p:clrMapOvr>
@@ -8221,6 +8719,35 @@
           </a:p>
         </p:txBody>
       </p:sp>
+      <p:sp>
+        <p:nvSpPr>
+          <p:cNvPr id="5" name="Pladsholder til diasnummer 4"/>
+          <p:cNvSpPr>
+            <a:spLocks noGrp="1"/>
+          </p:cNvSpPr>
+          <p:nvPr>
+            <p:ph type="sldNum" sz="quarter" idx="12"/>
+          </p:nvPr>
+        </p:nvSpPr>
+        <p:spPr/>
+        <p:txBody>
+          <a:bodyPr/>
+          <a:lstStyle/>
+          <a:p>
+            <a:pPr>
+              <a:defRPr/>
+            </a:pPr>
+            <a:fld id="{9486A8B5-6214-4EB3-9C64-E9EE82F4F1A3}" type="slidenum">
+              <a:rPr lang="da-DK" smtClean="0"/>
+              <a:pPr>
+                <a:defRPr/>
+              </a:pPr>
+              <a:t>6</a:t>
+            </a:fld>
+            <a:endParaRPr lang="da-DK"/>
+          </a:p>
+        </p:txBody>
+      </p:sp>
     </p:spTree>
   </p:cSld>
   <p:clrMapOvr>
@@ -8437,6 +8964,35 @@
               <a:t>J;3:20(60)</a:t>
             </a:r>
             <a:endParaRPr lang="da-DK" dirty="0"/>
+          </a:p>
+        </p:txBody>
+      </p:sp>
+      <p:sp>
+        <p:nvSpPr>
+          <p:cNvPr id="5" name="Pladsholder til diasnummer 4"/>
+          <p:cNvSpPr>
+            <a:spLocks noGrp="1"/>
+          </p:cNvSpPr>
+          <p:nvPr>
+            <p:ph type="sldNum" sz="quarter" idx="12"/>
+          </p:nvPr>
+        </p:nvSpPr>
+        <p:spPr/>
+        <p:txBody>
+          <a:bodyPr/>
+          <a:lstStyle/>
+          <a:p>
+            <a:pPr>
+              <a:defRPr/>
+            </a:pPr>
+            <a:fld id="{9486A8B5-6214-4EB3-9C64-E9EE82F4F1A3}" type="slidenum">
+              <a:rPr lang="da-DK" smtClean="0"/>
+              <a:pPr>
+                <a:defRPr/>
+              </a:pPr>
+              <a:t>7</a:t>
+            </a:fld>
+            <a:endParaRPr lang="da-DK"/>
           </a:p>
         </p:txBody>
       </p:sp>
@@ -8573,6 +9129,35 @@
           </a:p>
         </p:txBody>
       </p:sp>
+      <p:sp>
+        <p:nvSpPr>
+          <p:cNvPr id="6" name="Pladsholder til diasnummer 5"/>
+          <p:cNvSpPr>
+            <a:spLocks noGrp="1"/>
+          </p:cNvSpPr>
+          <p:nvPr>
+            <p:ph type="sldNum" sz="quarter" idx="12"/>
+          </p:nvPr>
+        </p:nvSpPr>
+        <p:spPr/>
+        <p:txBody>
+          <a:bodyPr/>
+          <a:lstStyle/>
+          <a:p>
+            <a:pPr>
+              <a:defRPr/>
+            </a:pPr>
+            <a:fld id="{9486A8B5-6214-4EB3-9C64-E9EE82F4F1A3}" type="slidenum">
+              <a:rPr lang="da-DK" smtClean="0"/>
+              <a:pPr>
+                <a:defRPr/>
+              </a:pPr>
+              <a:t>8</a:t>
+            </a:fld>
+            <a:endParaRPr lang="da-DK"/>
+          </a:p>
+        </p:txBody>
+      </p:sp>
     </p:spTree>
   </p:cSld>
   <p:clrMapOvr>
@@ -8682,6 +9267,35 @@
               <a:t>J;4:50(60)</a:t>
             </a:r>
             <a:endParaRPr lang="da-DK" dirty="0"/>
+          </a:p>
+        </p:txBody>
+      </p:sp>
+      <p:sp>
+        <p:nvSpPr>
+          <p:cNvPr id="6" name="Pladsholder til diasnummer 5"/>
+          <p:cNvSpPr>
+            <a:spLocks noGrp="1"/>
+          </p:cNvSpPr>
+          <p:nvPr>
+            <p:ph type="sldNum" sz="quarter" idx="12"/>
+          </p:nvPr>
+        </p:nvSpPr>
+        <p:spPr/>
+        <p:txBody>
+          <a:bodyPr/>
+          <a:lstStyle/>
+          <a:p>
+            <a:pPr>
+              <a:defRPr/>
+            </a:pPr>
+            <a:fld id="{9486A8B5-6214-4EB3-9C64-E9EE82F4F1A3}" type="slidenum">
+              <a:rPr lang="da-DK" smtClean="0"/>
+              <a:pPr>
+                <a:defRPr/>
+              </a:pPr>
+              <a:t>9</a:t>
+            </a:fld>
+            <a:endParaRPr lang="da-DK"/>
           </a:p>
         </p:txBody>
       </p:sp>

</xml_diff>